<commit_message>
2014 03 26 17:00
Edição na apresentação
</commit_message>
<xml_diff>
--- a/SAS/Planejamento/Docs/Apresentação do projeto.pptx
+++ b/SAS/Planejamento/Docs/Apresentação do projeto.pptx
@@ -9,6 +9,7 @@
     <p:sldId id="257" r:id="rId3"/>
     <p:sldId id="258" r:id="rId4"/>
     <p:sldId id="260" r:id="rId5"/>
+    <p:sldId id="261" r:id="rId6"/>
   </p:sldIdLst>
   <p:sldSz cx="9144000" cy="6858000" type="screen4x3"/>
   <p:notesSz cx="6858000" cy="9144000"/>
@@ -1668,7 +1669,7 @@
 <dgm:dataModel xmlns:dgm="http://schemas.openxmlformats.org/drawingml/2006/diagram" xmlns:a="http://schemas.openxmlformats.org/drawingml/2006/main">
   <dgm:ptLst>
     <dgm:pt modelId="{739AC528-84CD-4C4C-9AAA-944987E13663}" type="doc">
-      <dgm:prSet loTypeId="urn:microsoft.com/office/officeart/2005/8/layout/list1" loCatId="list" qsTypeId="urn:microsoft.com/office/officeart/2005/8/quickstyle/simple1" qsCatId="simple" csTypeId="urn:microsoft.com/office/officeart/2005/8/colors/accent1_2" csCatId="accent1" phldr="1"/>
+      <dgm:prSet loTypeId="urn:microsoft.com/office/officeart/2005/8/layout/list1" loCatId="list" qsTypeId="urn:microsoft.com/office/officeart/2005/8/quickstyle/3d1" qsCatId="3D" csTypeId="urn:microsoft.com/office/officeart/2005/8/colors/accent1_2" csCatId="accent1" phldr="1"/>
       <dgm:spPr/>
       <dgm:t>
         <a:bodyPr/>
@@ -1686,10 +1687,18 @@
         <a:lstStyle/>
         <a:p>
           <a:r>
-            <a:rPr lang="pt-BR" dirty="0" smtClean="0"/>
+            <a:rPr lang="pt-BR" b="1" dirty="0" smtClean="0">
+              <a:solidFill>
+                <a:srgbClr val="7030A0"/>
+              </a:solidFill>
+            </a:rPr>
             <a:t>Dinamização de registro de atividades</a:t>
           </a:r>
-          <a:endParaRPr lang="pt-BR" dirty="0"/>
+          <a:endParaRPr lang="pt-BR" b="1" dirty="0">
+            <a:solidFill>
+              <a:srgbClr val="7030A0"/>
+            </a:solidFill>
+          </a:endParaRPr>
         </a:p>
       </dgm:t>
     </dgm:pt>
@@ -1723,10 +1732,18 @@
         <a:lstStyle/>
         <a:p>
           <a:r>
-            <a:rPr lang="pt-BR" dirty="0" smtClean="0"/>
+            <a:rPr lang="pt-BR" b="1" dirty="0" smtClean="0">
+              <a:solidFill>
+                <a:srgbClr val="7030A0"/>
+              </a:solidFill>
+            </a:rPr>
             <a:t> Acesso web em dispositivos moveis</a:t>
           </a:r>
-          <a:endParaRPr lang="pt-BR" dirty="0"/>
+          <a:endParaRPr lang="pt-BR" b="1" dirty="0">
+            <a:solidFill>
+              <a:srgbClr val="7030A0"/>
+            </a:solidFill>
+          </a:endParaRPr>
         </a:p>
       </dgm:t>
     </dgm:pt>
@@ -1760,10 +1777,18 @@
         <a:lstStyle/>
         <a:p>
           <a:r>
-            <a:rPr lang="pt-BR" dirty="0" smtClean="0"/>
+            <a:rPr lang="pt-BR" b="1" dirty="0" smtClean="0">
+              <a:solidFill>
+                <a:srgbClr val="7030A0"/>
+              </a:solidFill>
+            </a:rPr>
             <a:t>Trabalho em grupo em ambiente multiusuário</a:t>
           </a:r>
-          <a:endParaRPr lang="pt-BR" dirty="0"/>
+          <a:endParaRPr lang="pt-BR" b="1" dirty="0">
+            <a:solidFill>
+              <a:srgbClr val="7030A0"/>
+            </a:solidFill>
+          </a:endParaRPr>
         </a:p>
       </dgm:t>
     </dgm:pt>
@@ -1797,10 +1822,18 @@
         <a:lstStyle/>
         <a:p>
           <a:r>
-            <a:rPr lang="pt-BR" dirty="0" smtClean="0"/>
+            <a:rPr lang="pt-BR" b="1" dirty="0" smtClean="0">
+              <a:solidFill>
+                <a:srgbClr val="7030A0"/>
+              </a:solidFill>
+            </a:rPr>
             <a:t>Controles de acadêmicos </a:t>
           </a:r>
-          <a:endParaRPr lang="pt-BR" dirty="0"/>
+          <a:endParaRPr lang="pt-BR" b="1" dirty="0">
+            <a:solidFill>
+              <a:srgbClr val="7030A0"/>
+            </a:solidFill>
+          </a:endParaRPr>
         </a:p>
       </dgm:t>
     </dgm:pt>
@@ -1834,10 +1867,18 @@
         <a:lstStyle/>
         <a:p>
           <a:r>
-            <a:rPr lang="pt-BR" dirty="0" smtClean="0"/>
+            <a:rPr lang="pt-BR" b="1" dirty="0" smtClean="0">
+              <a:solidFill>
+                <a:srgbClr val="7030A0"/>
+              </a:solidFill>
+            </a:rPr>
             <a:t>Controles financeiros</a:t>
           </a:r>
-          <a:endParaRPr lang="pt-BR" dirty="0"/>
+          <a:endParaRPr lang="pt-BR" b="1" dirty="0">
+            <a:solidFill>
+              <a:srgbClr val="7030A0"/>
+            </a:solidFill>
+          </a:endParaRPr>
         </a:p>
       </dgm:t>
     </dgm:pt>
@@ -1871,10 +1912,18 @@
         <a:lstStyle/>
         <a:p>
           <a:r>
-            <a:rPr lang="pt-BR" dirty="0" smtClean="0"/>
+            <a:rPr lang="pt-BR" b="1" dirty="0" smtClean="0">
+              <a:solidFill>
+                <a:srgbClr val="7030A0"/>
+              </a:solidFill>
+            </a:rPr>
             <a:t>Controle de contas a pagar</a:t>
           </a:r>
-          <a:endParaRPr lang="pt-BR" dirty="0"/>
+          <a:endParaRPr lang="pt-BR" b="1" dirty="0">
+            <a:solidFill>
+              <a:srgbClr val="7030A0"/>
+            </a:solidFill>
+          </a:endParaRPr>
         </a:p>
       </dgm:t>
     </dgm:pt>
@@ -1909,14 +1958,35 @@
         </dgm:presLayoutVars>
       </dgm:prSet>
       <dgm:spPr/>
+      <dgm:t>
+        <a:bodyPr/>
+        <a:lstStyle/>
+        <a:p>
+          <a:endParaRPr lang="pt-BR"/>
+        </a:p>
+      </dgm:t>
     </dgm:pt>
     <dgm:pt modelId="{B34D6D7E-5F2E-4AC9-BD73-0DDE9F8BB618}" type="pres">
       <dgm:prSet presAssocID="{64726959-BFCF-468E-8583-201CF07ACAB4}" presName="parentLin" presStyleCnt="0"/>
       <dgm:spPr/>
+      <dgm:t>
+        <a:bodyPr/>
+        <a:lstStyle/>
+        <a:p>
+          <a:endParaRPr lang="pt-BR"/>
+        </a:p>
+      </dgm:t>
     </dgm:pt>
     <dgm:pt modelId="{5CF09D25-445D-4024-9E09-27B9086F12C2}" type="pres">
       <dgm:prSet presAssocID="{64726959-BFCF-468E-8583-201CF07ACAB4}" presName="parentLeftMargin" presStyleLbl="node1" presStyleIdx="0" presStyleCnt="6"/>
       <dgm:spPr/>
+      <dgm:t>
+        <a:bodyPr/>
+        <a:lstStyle/>
+        <a:p>
+          <a:endParaRPr lang="pt-BR"/>
+        </a:p>
+      </dgm:t>
     </dgm:pt>
     <dgm:pt modelId="{B171C0C5-1265-474F-9A24-5267C4DEA6BB}" type="pres">
       <dgm:prSet presAssocID="{64726959-BFCF-468E-8583-201CF07ACAB4}" presName="parentText" presStyleLbl="node1" presStyleIdx="0" presStyleCnt="6">
@@ -1937,6 +2007,13 @@
     <dgm:pt modelId="{7AD01FD0-F69D-4BCE-A896-8ABB35BAACA9}" type="pres">
       <dgm:prSet presAssocID="{64726959-BFCF-468E-8583-201CF07ACAB4}" presName="negativeSpace" presStyleCnt="0"/>
       <dgm:spPr/>
+      <dgm:t>
+        <a:bodyPr/>
+        <a:lstStyle/>
+        <a:p>
+          <a:endParaRPr lang="pt-BR"/>
+        </a:p>
+      </dgm:t>
     </dgm:pt>
     <dgm:pt modelId="{AA8514B8-7EBB-4287-ACDB-81BB8EE3A65E}" type="pres">
       <dgm:prSet presAssocID="{64726959-BFCF-468E-8583-201CF07ACAB4}" presName="childText" presStyleLbl="conFgAcc1" presStyleIdx="0" presStyleCnt="6">
@@ -1945,18 +2022,46 @@
         </dgm:presLayoutVars>
       </dgm:prSet>
       <dgm:spPr/>
+      <dgm:t>
+        <a:bodyPr/>
+        <a:lstStyle/>
+        <a:p>
+          <a:endParaRPr lang="pt-BR"/>
+        </a:p>
+      </dgm:t>
     </dgm:pt>
     <dgm:pt modelId="{5F326BF0-420D-4866-A2BD-614369AB09BD}" type="pres">
       <dgm:prSet presAssocID="{8835803B-4868-4BFF-8B3A-814A6D4954C8}" presName="spaceBetweenRectangles" presStyleCnt="0"/>
       <dgm:spPr/>
+      <dgm:t>
+        <a:bodyPr/>
+        <a:lstStyle/>
+        <a:p>
+          <a:endParaRPr lang="pt-BR"/>
+        </a:p>
+      </dgm:t>
     </dgm:pt>
     <dgm:pt modelId="{170F142A-5E5C-46E4-829F-5448D761498F}" type="pres">
       <dgm:prSet presAssocID="{EBE94DE7-18A9-4985-A440-D262D93A6316}" presName="parentLin" presStyleCnt="0"/>
       <dgm:spPr/>
+      <dgm:t>
+        <a:bodyPr/>
+        <a:lstStyle/>
+        <a:p>
+          <a:endParaRPr lang="pt-BR"/>
+        </a:p>
+      </dgm:t>
     </dgm:pt>
     <dgm:pt modelId="{62A2C154-6AB5-4321-A742-C06A0E020873}" type="pres">
       <dgm:prSet presAssocID="{EBE94DE7-18A9-4985-A440-D262D93A6316}" presName="parentLeftMargin" presStyleLbl="node1" presStyleIdx="0" presStyleCnt="6"/>
       <dgm:spPr/>
+      <dgm:t>
+        <a:bodyPr/>
+        <a:lstStyle/>
+        <a:p>
+          <a:endParaRPr lang="pt-BR"/>
+        </a:p>
+      </dgm:t>
     </dgm:pt>
     <dgm:pt modelId="{9939078C-FCDB-4354-9260-A7140D211969}" type="pres">
       <dgm:prSet presAssocID="{EBE94DE7-18A9-4985-A440-D262D93A6316}" presName="parentText" presStyleLbl="node1" presStyleIdx="1" presStyleCnt="6">
@@ -1977,6 +2082,13 @@
     <dgm:pt modelId="{6402AF25-A1ED-4143-822D-2DE397E15ECF}" type="pres">
       <dgm:prSet presAssocID="{EBE94DE7-18A9-4985-A440-D262D93A6316}" presName="negativeSpace" presStyleCnt="0"/>
       <dgm:spPr/>
+      <dgm:t>
+        <a:bodyPr/>
+        <a:lstStyle/>
+        <a:p>
+          <a:endParaRPr lang="pt-BR"/>
+        </a:p>
+      </dgm:t>
     </dgm:pt>
     <dgm:pt modelId="{122429B3-75B2-4400-B819-CC67C8478699}" type="pres">
       <dgm:prSet presAssocID="{EBE94DE7-18A9-4985-A440-D262D93A6316}" presName="childText" presStyleLbl="conFgAcc1" presStyleIdx="1" presStyleCnt="6">
@@ -1985,18 +2097,46 @@
         </dgm:presLayoutVars>
       </dgm:prSet>
       <dgm:spPr/>
+      <dgm:t>
+        <a:bodyPr/>
+        <a:lstStyle/>
+        <a:p>
+          <a:endParaRPr lang="pt-BR"/>
+        </a:p>
+      </dgm:t>
     </dgm:pt>
     <dgm:pt modelId="{32DA1C74-5B5F-427E-8C8D-CACF3F061A44}" type="pres">
       <dgm:prSet presAssocID="{11D717CD-56AA-45FC-9323-4DF14FDC4A6F}" presName="spaceBetweenRectangles" presStyleCnt="0"/>
       <dgm:spPr/>
+      <dgm:t>
+        <a:bodyPr/>
+        <a:lstStyle/>
+        <a:p>
+          <a:endParaRPr lang="pt-BR"/>
+        </a:p>
+      </dgm:t>
     </dgm:pt>
     <dgm:pt modelId="{849981CC-C8B4-4BA1-B450-ED50D8A4886D}" type="pres">
       <dgm:prSet presAssocID="{22558875-04DE-48A8-8D08-7DF713D16D36}" presName="parentLin" presStyleCnt="0"/>
       <dgm:spPr/>
+      <dgm:t>
+        <a:bodyPr/>
+        <a:lstStyle/>
+        <a:p>
+          <a:endParaRPr lang="pt-BR"/>
+        </a:p>
+      </dgm:t>
     </dgm:pt>
     <dgm:pt modelId="{7CCD4125-60BB-4322-B726-7F91B5CDFF30}" type="pres">
       <dgm:prSet presAssocID="{22558875-04DE-48A8-8D08-7DF713D16D36}" presName="parentLeftMargin" presStyleLbl="node1" presStyleIdx="1" presStyleCnt="6"/>
       <dgm:spPr/>
+      <dgm:t>
+        <a:bodyPr/>
+        <a:lstStyle/>
+        <a:p>
+          <a:endParaRPr lang="pt-BR"/>
+        </a:p>
+      </dgm:t>
     </dgm:pt>
     <dgm:pt modelId="{D78DBF14-3A29-4E42-B56E-7380E92A6552}" type="pres">
       <dgm:prSet presAssocID="{22558875-04DE-48A8-8D08-7DF713D16D36}" presName="parentText" presStyleLbl="node1" presStyleIdx="2" presStyleCnt="6">
@@ -2017,6 +2157,13 @@
     <dgm:pt modelId="{91B10306-6E6E-43CB-B07F-95D2F566D304}" type="pres">
       <dgm:prSet presAssocID="{22558875-04DE-48A8-8D08-7DF713D16D36}" presName="negativeSpace" presStyleCnt="0"/>
       <dgm:spPr/>
+      <dgm:t>
+        <a:bodyPr/>
+        <a:lstStyle/>
+        <a:p>
+          <a:endParaRPr lang="pt-BR"/>
+        </a:p>
+      </dgm:t>
     </dgm:pt>
     <dgm:pt modelId="{06A3C85D-CDEB-4A13-9986-AD53F22D8EA9}" type="pres">
       <dgm:prSet presAssocID="{22558875-04DE-48A8-8D08-7DF713D16D36}" presName="childText" presStyleLbl="conFgAcc1" presStyleIdx="2" presStyleCnt="6">
@@ -2025,18 +2172,46 @@
         </dgm:presLayoutVars>
       </dgm:prSet>
       <dgm:spPr/>
+      <dgm:t>
+        <a:bodyPr/>
+        <a:lstStyle/>
+        <a:p>
+          <a:endParaRPr lang="pt-BR"/>
+        </a:p>
+      </dgm:t>
     </dgm:pt>
     <dgm:pt modelId="{80A60F21-F2F5-418D-853F-D7EBBA576D8F}" type="pres">
       <dgm:prSet presAssocID="{6C26663C-5E0F-469C-A84B-4E7D60C2ACED}" presName="spaceBetweenRectangles" presStyleCnt="0"/>
       <dgm:spPr/>
+      <dgm:t>
+        <a:bodyPr/>
+        <a:lstStyle/>
+        <a:p>
+          <a:endParaRPr lang="pt-BR"/>
+        </a:p>
+      </dgm:t>
     </dgm:pt>
     <dgm:pt modelId="{A9AF5B02-C771-4CE1-AF38-8D7E7F443749}" type="pres">
       <dgm:prSet presAssocID="{C0424938-EAAD-4AFD-89AA-F9DAA339B8CE}" presName="parentLin" presStyleCnt="0"/>
       <dgm:spPr/>
+      <dgm:t>
+        <a:bodyPr/>
+        <a:lstStyle/>
+        <a:p>
+          <a:endParaRPr lang="pt-BR"/>
+        </a:p>
+      </dgm:t>
     </dgm:pt>
     <dgm:pt modelId="{3572EF4A-4D38-4BBD-9DE4-D188D70E2CAD}" type="pres">
       <dgm:prSet presAssocID="{C0424938-EAAD-4AFD-89AA-F9DAA339B8CE}" presName="parentLeftMargin" presStyleLbl="node1" presStyleIdx="2" presStyleCnt="6"/>
       <dgm:spPr/>
+      <dgm:t>
+        <a:bodyPr/>
+        <a:lstStyle/>
+        <a:p>
+          <a:endParaRPr lang="pt-BR"/>
+        </a:p>
+      </dgm:t>
     </dgm:pt>
     <dgm:pt modelId="{6C17C5F1-150A-491F-92CE-A1BE931BB55D}" type="pres">
       <dgm:prSet presAssocID="{C0424938-EAAD-4AFD-89AA-F9DAA339B8CE}" presName="parentText" presStyleLbl="node1" presStyleIdx="3" presStyleCnt="6">
@@ -2057,6 +2232,13 @@
     <dgm:pt modelId="{D97F3F94-0B46-4D37-A8E1-1DAC68B681CD}" type="pres">
       <dgm:prSet presAssocID="{C0424938-EAAD-4AFD-89AA-F9DAA339B8CE}" presName="negativeSpace" presStyleCnt="0"/>
       <dgm:spPr/>
+      <dgm:t>
+        <a:bodyPr/>
+        <a:lstStyle/>
+        <a:p>
+          <a:endParaRPr lang="pt-BR"/>
+        </a:p>
+      </dgm:t>
     </dgm:pt>
     <dgm:pt modelId="{BC58E8B0-740A-43C6-B230-1401E78D7A5B}" type="pres">
       <dgm:prSet presAssocID="{C0424938-EAAD-4AFD-89AA-F9DAA339B8CE}" presName="childText" presStyleLbl="conFgAcc1" presStyleIdx="3" presStyleCnt="6">
@@ -2065,18 +2247,46 @@
         </dgm:presLayoutVars>
       </dgm:prSet>
       <dgm:spPr/>
+      <dgm:t>
+        <a:bodyPr/>
+        <a:lstStyle/>
+        <a:p>
+          <a:endParaRPr lang="pt-BR"/>
+        </a:p>
+      </dgm:t>
     </dgm:pt>
     <dgm:pt modelId="{61A1A8FC-AD23-4E2F-A533-544CD04D1CA9}" type="pres">
       <dgm:prSet presAssocID="{EBF62A40-6125-4DD5-8EDA-1F45E06B9030}" presName="spaceBetweenRectangles" presStyleCnt="0"/>
       <dgm:spPr/>
+      <dgm:t>
+        <a:bodyPr/>
+        <a:lstStyle/>
+        <a:p>
+          <a:endParaRPr lang="pt-BR"/>
+        </a:p>
+      </dgm:t>
     </dgm:pt>
     <dgm:pt modelId="{74BE06AF-D1B6-41E2-B7D7-F20A5E34FB20}" type="pres">
       <dgm:prSet presAssocID="{B682214D-3E19-400B-B148-C04F02C27327}" presName="parentLin" presStyleCnt="0"/>
       <dgm:spPr/>
+      <dgm:t>
+        <a:bodyPr/>
+        <a:lstStyle/>
+        <a:p>
+          <a:endParaRPr lang="pt-BR"/>
+        </a:p>
+      </dgm:t>
     </dgm:pt>
     <dgm:pt modelId="{846A3F17-1641-4BB9-AC38-13C0E8AB7383}" type="pres">
       <dgm:prSet presAssocID="{B682214D-3E19-400B-B148-C04F02C27327}" presName="parentLeftMargin" presStyleLbl="node1" presStyleIdx="3" presStyleCnt="6"/>
       <dgm:spPr/>
+      <dgm:t>
+        <a:bodyPr/>
+        <a:lstStyle/>
+        <a:p>
+          <a:endParaRPr lang="pt-BR"/>
+        </a:p>
+      </dgm:t>
     </dgm:pt>
     <dgm:pt modelId="{231A70AB-9760-4FFF-B875-5D31C52D60AE}" type="pres">
       <dgm:prSet presAssocID="{B682214D-3E19-400B-B148-C04F02C27327}" presName="parentText" presStyleLbl="node1" presStyleIdx="4" presStyleCnt="6">
@@ -2097,6 +2307,13 @@
     <dgm:pt modelId="{8C9EB15F-97BA-48C2-B233-1F99DD2283F3}" type="pres">
       <dgm:prSet presAssocID="{B682214D-3E19-400B-B148-C04F02C27327}" presName="negativeSpace" presStyleCnt="0"/>
       <dgm:spPr/>
+      <dgm:t>
+        <a:bodyPr/>
+        <a:lstStyle/>
+        <a:p>
+          <a:endParaRPr lang="pt-BR"/>
+        </a:p>
+      </dgm:t>
     </dgm:pt>
     <dgm:pt modelId="{7D8B9C6D-02C3-420B-906C-B43C36EE3306}" type="pres">
       <dgm:prSet presAssocID="{B682214D-3E19-400B-B148-C04F02C27327}" presName="childText" presStyleLbl="conFgAcc1" presStyleIdx="4" presStyleCnt="6">
@@ -2105,18 +2322,46 @@
         </dgm:presLayoutVars>
       </dgm:prSet>
       <dgm:spPr/>
+      <dgm:t>
+        <a:bodyPr/>
+        <a:lstStyle/>
+        <a:p>
+          <a:endParaRPr lang="pt-BR"/>
+        </a:p>
+      </dgm:t>
     </dgm:pt>
     <dgm:pt modelId="{27077A43-AF2C-4BB7-B135-57882141D0A7}" type="pres">
       <dgm:prSet presAssocID="{4037F445-FC2C-47AE-89AE-E418F2282E02}" presName="spaceBetweenRectangles" presStyleCnt="0"/>
       <dgm:spPr/>
+      <dgm:t>
+        <a:bodyPr/>
+        <a:lstStyle/>
+        <a:p>
+          <a:endParaRPr lang="pt-BR"/>
+        </a:p>
+      </dgm:t>
     </dgm:pt>
     <dgm:pt modelId="{211C6EE7-56DB-4520-8C76-4F6B73CA2F85}" type="pres">
       <dgm:prSet presAssocID="{34E518D1-49BF-45FE-BD69-68CCC11C553D}" presName="parentLin" presStyleCnt="0"/>
       <dgm:spPr/>
+      <dgm:t>
+        <a:bodyPr/>
+        <a:lstStyle/>
+        <a:p>
+          <a:endParaRPr lang="pt-BR"/>
+        </a:p>
+      </dgm:t>
     </dgm:pt>
     <dgm:pt modelId="{390F44BF-71AC-4D9F-BF5E-075FA28FE010}" type="pres">
       <dgm:prSet presAssocID="{34E518D1-49BF-45FE-BD69-68CCC11C553D}" presName="parentLeftMargin" presStyleLbl="node1" presStyleIdx="4" presStyleCnt="6"/>
       <dgm:spPr/>
+      <dgm:t>
+        <a:bodyPr/>
+        <a:lstStyle/>
+        <a:p>
+          <a:endParaRPr lang="pt-BR"/>
+        </a:p>
+      </dgm:t>
     </dgm:pt>
     <dgm:pt modelId="{029B9D8C-4A77-4645-9520-CB1F079C0081}" type="pres">
       <dgm:prSet presAssocID="{34E518D1-49BF-45FE-BD69-68CCC11C553D}" presName="parentText" presStyleLbl="node1" presStyleIdx="5" presStyleCnt="6">
@@ -2137,6 +2382,13 @@
     <dgm:pt modelId="{B327A79A-4795-4643-80F9-37F2D55457DE}" type="pres">
       <dgm:prSet presAssocID="{34E518D1-49BF-45FE-BD69-68CCC11C553D}" presName="negativeSpace" presStyleCnt="0"/>
       <dgm:spPr/>
+      <dgm:t>
+        <a:bodyPr/>
+        <a:lstStyle/>
+        <a:p>
+          <a:endParaRPr lang="pt-BR"/>
+        </a:p>
+      </dgm:t>
     </dgm:pt>
     <dgm:pt modelId="{338DDB9A-A6BB-4D1C-8303-E07E7D076CB7}" type="pres">
       <dgm:prSet presAssocID="{34E518D1-49BF-45FE-BD69-68CCC11C553D}" presName="childText" presStyleLbl="conFgAcc1" presStyleIdx="5" presStyleCnt="6">
@@ -2145,6 +2397,13 @@
         </dgm:presLayoutVars>
       </dgm:prSet>
       <dgm:spPr/>
+      <dgm:t>
+        <a:bodyPr/>
+        <a:lstStyle/>
+        <a:p>
+          <a:endParaRPr lang="pt-BR"/>
+        </a:p>
+      </dgm:t>
     </dgm:pt>
   </dgm:ptLst>
   <dgm:cxnLst>
@@ -2250,14 +2509,14 @@
         <a:lstStyle/>
         <a:p>
           <a:r>
-            <a:rPr lang="pt-BR" sz="2000" b="1" dirty="0" smtClean="0">
+            <a:rPr lang="pt-BR" sz="1600" b="1" dirty="0" smtClean="0">
               <a:solidFill>
                 <a:srgbClr val="0070C0"/>
               </a:solidFill>
             </a:rPr>
             <a:t>Base de dados </a:t>
           </a:r>
-          <a:endParaRPr lang="pt-BR" sz="2000" b="1" dirty="0">
+          <a:endParaRPr lang="pt-BR" sz="1600" b="1" dirty="0">
             <a:solidFill>
               <a:srgbClr val="0070C0"/>
             </a:solidFill>
@@ -2310,14 +2569,14 @@
         <a:lstStyle/>
         <a:p>
           <a:r>
-            <a:rPr lang="pt-BR" sz="2000" b="1" dirty="0" smtClean="0">
+            <a:rPr lang="pt-BR" sz="1600" b="1" dirty="0" smtClean="0">
               <a:solidFill>
                 <a:srgbClr val="0070C0"/>
               </a:solidFill>
             </a:rPr>
             <a:t>Aplicação</a:t>
           </a:r>
-          <a:endParaRPr lang="pt-BR" sz="2000" b="1" dirty="0">
+          <a:endParaRPr lang="pt-BR" sz="1600" b="1" dirty="0">
             <a:solidFill>
               <a:srgbClr val="0070C0"/>
             </a:solidFill>
@@ -2370,14 +2629,14 @@
         <a:lstStyle/>
         <a:p>
           <a:r>
-            <a:rPr lang="pt-BR" sz="2000" b="1" dirty="0" smtClean="0">
+            <a:rPr lang="pt-BR" sz="1600" b="1" dirty="0" smtClean="0">
               <a:solidFill>
                 <a:srgbClr val="0070C0"/>
               </a:solidFill>
             </a:rPr>
             <a:t>Usuário</a:t>
           </a:r>
-          <a:endParaRPr lang="pt-BR" sz="2000" b="1" dirty="0">
+          <a:endParaRPr lang="pt-BR" sz="1600" b="1" dirty="0">
             <a:solidFill>
               <a:srgbClr val="0070C0"/>
             </a:solidFill>
@@ -2407,31 +2666,24 @@
         </a:p>
       </dgm:t>
     </dgm:pt>
-    <dgm:pt modelId="{3608A19D-5895-4CCB-AE7C-602B7B47F013}">
+    <dgm:pt modelId="{2F3DF7DE-E5C9-4440-80D1-538313244BE6}">
       <dgm:prSet phldrT="[Texto]" custT="1">
         <dgm:style>
-          <a:lnRef idx="1">
-            <a:schemeClr val="accent4"/>
+          <a:lnRef idx="0">
+            <a:schemeClr val="accent6"/>
           </a:lnRef>
           <a:fillRef idx="3">
-            <a:schemeClr val="accent4"/>
+            <a:schemeClr val="accent6"/>
           </a:fillRef>
-          <a:effectRef idx="2">
-            <a:schemeClr val="accent4"/>
+          <a:effectRef idx="3">
+            <a:schemeClr val="accent6"/>
           </a:effectRef>
           <a:fontRef idx="minor">
             <a:schemeClr val="lt1"/>
           </a:fontRef>
         </dgm:style>
       </dgm:prSet>
-      <dgm:spPr>
-        <a:solidFill>
-          <a:srgbClr val="C00000"/>
-        </a:solidFill>
-        <a:effectLst>
-          <a:reflection blurRad="6350" stA="52000" endA="300" endPos="35000" dir="5400000" sy="-100000" algn="bl" rotWithShape="0"/>
-        </a:effectLst>
-      </dgm:spPr>
+      <dgm:spPr/>
       <dgm:t>
         <a:bodyPr/>
         <a:lstStyle/>
@@ -2439,213 +2691,17 @@
           <a:r>
             <a:rPr lang="pt-BR" sz="1600" b="1" dirty="0" smtClean="0">
               <a:solidFill>
-                <a:schemeClr val="accent6">
-                  <a:lumMod val="60000"/>
-                  <a:lumOff val="40000"/>
+                <a:schemeClr val="bg1">
+                  <a:lumMod val="85000"/>
                 </a:schemeClr>
               </a:solidFill>
             </a:rPr>
-            <a:t>Ambiente de servidor</a:t>
+            <a:t>Processa de solicitações de usuário</a:t>
           </a:r>
           <a:endParaRPr lang="pt-BR" sz="1600" b="1" dirty="0">
             <a:solidFill>
-              <a:schemeClr val="accent6">
-                <a:lumMod val="60000"/>
-                <a:lumOff val="40000"/>
-              </a:schemeClr>
-            </a:solidFill>
-          </a:endParaRPr>
-        </a:p>
-      </dgm:t>
-    </dgm:pt>
-    <dgm:pt modelId="{F6ED7F5C-3473-4CB6-A854-8AAB4553A7BF}" type="parTrans" cxnId="{84076030-E45A-4466-9EAA-5CA3C5F3D1A7}">
-      <dgm:prSet/>
-      <dgm:spPr/>
-      <dgm:t>
-        <a:bodyPr/>
-        <a:lstStyle/>
-        <a:p>
-          <a:endParaRPr lang="pt-BR"/>
-        </a:p>
-      </dgm:t>
-    </dgm:pt>
-    <dgm:pt modelId="{B8867D9A-5291-4E44-8E27-7C2CE1750192}" type="sibTrans" cxnId="{84076030-E45A-4466-9EAA-5CA3C5F3D1A7}">
-      <dgm:prSet/>
-      <dgm:spPr/>
-      <dgm:t>
-        <a:bodyPr/>
-        <a:lstStyle/>
-        <a:p>
-          <a:endParaRPr lang="pt-BR"/>
-        </a:p>
-      </dgm:t>
-    </dgm:pt>
-    <dgm:pt modelId="{17C36E47-B60A-48AF-9203-3A426FDDC061}">
-      <dgm:prSet phldrT="[Texto]" custT="1">
-        <dgm:style>
-          <a:lnRef idx="1">
-            <a:schemeClr val="accent4"/>
-          </a:lnRef>
-          <a:fillRef idx="3">
-            <a:schemeClr val="accent4"/>
-          </a:fillRef>
-          <a:effectRef idx="2">
-            <a:schemeClr val="accent4"/>
-          </a:effectRef>
-          <a:fontRef idx="minor">
-            <a:schemeClr val="lt1"/>
-          </a:fontRef>
-        </dgm:style>
-      </dgm:prSet>
-      <dgm:spPr>
-        <a:solidFill>
-          <a:srgbClr val="C00000"/>
-        </a:solidFill>
-        <a:effectLst>
-          <a:reflection blurRad="6350" stA="52000" endA="300" endPos="35000" dir="5400000" sy="-100000" algn="bl" rotWithShape="0"/>
-        </a:effectLst>
-      </dgm:spPr>
-      <dgm:t>
-        <a:bodyPr/>
-        <a:lstStyle/>
-        <a:p>
-          <a:r>
-            <a:rPr lang="pt-BR" sz="1600" b="1" dirty="0" smtClean="0">
-              <a:solidFill>
-                <a:schemeClr val="accent6">
-                  <a:lumMod val="60000"/>
-                  <a:lumOff val="40000"/>
-                </a:schemeClr>
-              </a:solidFill>
-            </a:rPr>
-            <a:t>Processamento de solicitações de usuários</a:t>
-          </a:r>
-          <a:endParaRPr lang="pt-BR" sz="1600" b="1" dirty="0">
-            <a:solidFill>
-              <a:schemeClr val="accent6">
-                <a:lumMod val="60000"/>
-                <a:lumOff val="40000"/>
-              </a:schemeClr>
-            </a:solidFill>
-          </a:endParaRPr>
-        </a:p>
-      </dgm:t>
-    </dgm:pt>
-    <dgm:pt modelId="{5D184643-6CAF-4BEF-9B8E-9CEF559E3FA0}" type="parTrans" cxnId="{389F34DF-E799-4B31-BA52-DA4BE4D473D3}">
-      <dgm:prSet/>
-      <dgm:spPr/>
-      <dgm:t>
-        <a:bodyPr/>
-        <a:lstStyle/>
-        <a:p>
-          <a:endParaRPr lang="pt-BR"/>
-        </a:p>
-      </dgm:t>
-    </dgm:pt>
-    <dgm:pt modelId="{D9FFAE66-B2AA-420E-97F1-1E782654582A}" type="sibTrans" cxnId="{389F34DF-E799-4B31-BA52-DA4BE4D473D3}">
-      <dgm:prSet/>
-      <dgm:spPr/>
-      <dgm:t>
-        <a:bodyPr/>
-        <a:lstStyle/>
-        <a:p>
-          <a:endParaRPr lang="pt-BR"/>
-        </a:p>
-      </dgm:t>
-    </dgm:pt>
-    <dgm:pt modelId="{2D163772-13E5-4074-928D-7A5A7DBF63A5}">
-      <dgm:prSet phldrT="[Texto]" custT="1">
-        <dgm:style>
-          <a:lnRef idx="1">
-            <a:schemeClr val="accent4"/>
-          </a:lnRef>
-          <a:fillRef idx="3">
-            <a:schemeClr val="accent4"/>
-          </a:fillRef>
-          <a:effectRef idx="2">
-            <a:schemeClr val="accent4"/>
-          </a:effectRef>
-          <a:fontRef idx="minor">
-            <a:schemeClr val="lt1"/>
-          </a:fontRef>
-        </dgm:style>
-      </dgm:prSet>
-      <dgm:spPr>
-        <a:solidFill>
-          <a:srgbClr val="C00000"/>
-        </a:solidFill>
-        <a:effectLst>
-          <a:reflection blurRad="6350" stA="52000" endA="300" endPos="35000" dir="5400000" sy="-100000" algn="bl" rotWithShape="0"/>
-        </a:effectLst>
-      </dgm:spPr>
-      <dgm:t>
-        <a:bodyPr/>
-        <a:lstStyle/>
-        <a:p>
-          <a:endParaRPr lang="pt-BR" sz="1600" b="1" dirty="0">
-            <a:solidFill>
-              <a:srgbClr val="0070C0"/>
-            </a:solidFill>
-          </a:endParaRPr>
-        </a:p>
-      </dgm:t>
-    </dgm:pt>
-    <dgm:pt modelId="{757ACCF4-9AEE-4064-80DF-9850B6B60C93}" type="parTrans" cxnId="{DE132E6E-2775-4267-BE23-76DFED146DF3}">
-      <dgm:prSet/>
-      <dgm:spPr/>
-      <dgm:t>
-        <a:bodyPr/>
-        <a:lstStyle/>
-        <a:p>
-          <a:endParaRPr lang="pt-BR"/>
-        </a:p>
-      </dgm:t>
-    </dgm:pt>
-    <dgm:pt modelId="{EADCE4D3-E256-4844-B0A4-83F42236A03B}" type="sibTrans" cxnId="{DE132E6E-2775-4267-BE23-76DFED146DF3}">
-      <dgm:prSet/>
-      <dgm:spPr/>
-      <dgm:t>
-        <a:bodyPr/>
-        <a:lstStyle/>
-        <a:p>
-          <a:endParaRPr lang="pt-BR"/>
-        </a:p>
-      </dgm:t>
-    </dgm:pt>
-    <dgm:pt modelId="{2F3DF7DE-E5C9-4440-80D1-538313244BE6}">
-      <dgm:prSet phldrT="[Texto]" custT="1">
-        <dgm:style>
-          <a:lnRef idx="1">
-            <a:schemeClr val="accent4"/>
-          </a:lnRef>
-          <a:fillRef idx="3">
-            <a:schemeClr val="accent4"/>
-          </a:fillRef>
-          <a:effectRef idx="2">
-            <a:schemeClr val="accent4"/>
-          </a:effectRef>
-          <a:fontRef idx="minor">
-            <a:schemeClr val="lt1"/>
-          </a:fontRef>
-        </dgm:style>
-      </dgm:prSet>
-      <dgm:spPr>
-        <a:solidFill>
-          <a:srgbClr val="C00000"/>
-        </a:solidFill>
-        <a:effectLst>
-          <a:reflection blurRad="6350" stA="52000" endA="300" endPos="35000" dir="5400000" sy="-100000" algn="bl" rotWithShape="0"/>
-        </a:effectLst>
-      </dgm:spPr>
-      <dgm:t>
-        <a:bodyPr/>
-        <a:lstStyle/>
-        <a:p>
-          <a:endParaRPr lang="pt-BR" sz="1600" b="1" dirty="0">
-            <a:solidFill>
-              <a:schemeClr val="accent6">
-                <a:lumMod val="60000"/>
-                <a:lumOff val="40000"/>
+              <a:schemeClr val="bg1">
+                <a:lumMod val="85000"/>
               </a:schemeClr>
             </a:solidFill>
           </a:endParaRPr>
@@ -2674,16 +2730,16 @@
         </a:p>
       </dgm:t>
     </dgm:pt>
-    <dgm:pt modelId="{15C81867-89A5-4131-BC4C-32819ECB9224}">
+    <dgm:pt modelId="{7F7E1F91-F6F4-48A9-B4FA-337B2EBD2C9A}">
       <dgm:prSet phldrT="[Texto]" custT="1">
         <dgm:style>
-          <a:lnRef idx="1">
+          <a:lnRef idx="0">
             <a:schemeClr val="accent6"/>
           </a:lnRef>
           <a:fillRef idx="3">
             <a:schemeClr val="accent6"/>
           </a:fillRef>
-          <a:effectRef idx="2">
+          <a:effectRef idx="3">
             <a:schemeClr val="accent6"/>
           </a:effectRef>
           <a:fontRef idx="minor">
@@ -2691,41 +2747,22 @@
           </a:fontRef>
         </dgm:style>
       </dgm:prSet>
-      <dgm:spPr>
-        <a:solidFill>
-          <a:srgbClr val="C00000"/>
-        </a:solidFill>
-        <a:effectLst>
-          <a:reflection blurRad="6350" stA="52000" endA="300" endPos="35000" dir="5400000" sy="-100000" algn="bl" rotWithShape="0"/>
-        </a:effectLst>
-      </dgm:spPr>
+      <dgm:spPr/>
       <dgm:t>
         <a:bodyPr/>
         <a:lstStyle/>
         <a:p>
-          <a:r>
-            <a:rPr lang="pt-BR" sz="1600" b="1" dirty="0" smtClean="0">
-              <a:solidFill>
-                <a:schemeClr val="accent6">
-                  <a:lumMod val="60000"/>
-                  <a:lumOff val="40000"/>
-                </a:schemeClr>
-              </a:solidFill>
-            </a:rPr>
-            <a:t>Dispositivo de acesso do usuário</a:t>
-          </a:r>
           <a:endParaRPr lang="pt-BR" sz="1600" b="1" dirty="0">
             <a:solidFill>
-              <a:schemeClr val="accent6">
-                <a:lumMod val="60000"/>
-                <a:lumOff val="40000"/>
+              <a:schemeClr val="bg1">
+                <a:lumMod val="85000"/>
               </a:schemeClr>
             </a:solidFill>
           </a:endParaRPr>
         </a:p>
       </dgm:t>
     </dgm:pt>
-    <dgm:pt modelId="{BEAE1DAF-4E1C-4B73-9668-E693D0170F93}" type="parTrans" cxnId="{C423E00E-A025-461E-AC42-F12191D105F6}">
+    <dgm:pt modelId="{0796D45F-4D57-413D-A4BB-33573B2F1CF3}" type="parTrans" cxnId="{5CB851DE-B309-4D32-BF02-58D05478E534}">
       <dgm:prSet/>
       <dgm:spPr/>
       <dgm:t>
@@ -2736,7 +2773,189 @@
         </a:p>
       </dgm:t>
     </dgm:pt>
-    <dgm:pt modelId="{4032F790-153B-41F0-BA2B-917C36EF37DC}" type="sibTrans" cxnId="{C423E00E-A025-461E-AC42-F12191D105F6}">
+    <dgm:pt modelId="{0FC519C8-F4CD-4D2A-B852-2C233866BAF3}" type="sibTrans" cxnId="{5CB851DE-B309-4D32-BF02-58D05478E534}">
+      <dgm:prSet/>
+      <dgm:spPr/>
+      <dgm:t>
+        <a:bodyPr/>
+        <a:lstStyle/>
+        <a:p>
+          <a:endParaRPr lang="pt-BR"/>
+        </a:p>
+      </dgm:t>
+    </dgm:pt>
+    <dgm:pt modelId="{1198010A-7CD9-47DF-8300-D5AB8FDF717B}">
+      <dgm:prSet phldrT="[Texto]" custT="1">
+        <dgm:style>
+          <a:lnRef idx="0">
+            <a:schemeClr val="accent6"/>
+          </a:lnRef>
+          <a:fillRef idx="3">
+            <a:schemeClr val="accent6"/>
+          </a:fillRef>
+          <a:effectRef idx="3">
+            <a:schemeClr val="accent6"/>
+          </a:effectRef>
+          <a:fontRef idx="minor">
+            <a:schemeClr val="lt1"/>
+          </a:fontRef>
+        </dgm:style>
+      </dgm:prSet>
+      <dgm:spPr/>
+      <dgm:t>
+        <a:bodyPr/>
+        <a:lstStyle/>
+        <a:p>
+          <a:r>
+            <a:rPr lang="pt-BR" sz="1600" b="1" dirty="0" smtClean="0">
+              <a:solidFill>
+                <a:schemeClr val="bg1">
+                  <a:lumMod val="85000"/>
+                </a:schemeClr>
+              </a:solidFill>
+            </a:rPr>
+            <a:t>Ambiente de servidor de dados</a:t>
+          </a:r>
+          <a:endParaRPr lang="pt-BR" sz="1600" b="1" dirty="0">
+            <a:solidFill>
+              <a:schemeClr val="bg1">
+                <a:lumMod val="85000"/>
+              </a:schemeClr>
+            </a:solidFill>
+          </a:endParaRPr>
+        </a:p>
+      </dgm:t>
+    </dgm:pt>
+    <dgm:pt modelId="{67755E1A-2705-4297-9986-0E390CA27394}" type="parTrans" cxnId="{BF29565E-C27D-4C89-8F7E-C084E8C699E7}">
+      <dgm:prSet/>
+      <dgm:spPr/>
+      <dgm:t>
+        <a:bodyPr/>
+        <a:lstStyle/>
+        <a:p>
+          <a:endParaRPr lang="pt-BR"/>
+        </a:p>
+      </dgm:t>
+    </dgm:pt>
+    <dgm:pt modelId="{0231FB8D-A362-4F4A-8E56-6DAC699F1D6F}" type="sibTrans" cxnId="{BF29565E-C27D-4C89-8F7E-C084E8C699E7}">
+      <dgm:prSet/>
+      <dgm:spPr/>
+      <dgm:t>
+        <a:bodyPr/>
+        <a:lstStyle/>
+        <a:p>
+          <a:endParaRPr lang="pt-BR"/>
+        </a:p>
+      </dgm:t>
+    </dgm:pt>
+    <dgm:pt modelId="{FFBB95A5-64CA-4277-8EC9-9A4877C06A11}">
+      <dgm:prSet phldrT="[Texto]" custT="1">
+        <dgm:style>
+          <a:lnRef idx="0">
+            <a:schemeClr val="accent6"/>
+          </a:lnRef>
+          <a:fillRef idx="3">
+            <a:schemeClr val="accent6"/>
+          </a:fillRef>
+          <a:effectRef idx="3">
+            <a:schemeClr val="accent6"/>
+          </a:effectRef>
+          <a:fontRef idx="minor">
+            <a:schemeClr val="lt1"/>
+          </a:fontRef>
+        </dgm:style>
+      </dgm:prSet>
+      <dgm:spPr/>
+      <dgm:t>
+        <a:bodyPr/>
+        <a:lstStyle/>
+        <a:p>
+          <a:r>
+            <a:rPr lang="pt-BR" sz="1600" b="1" dirty="0" smtClean="0">
+              <a:solidFill>
+                <a:schemeClr val="bg1">
+                  <a:lumMod val="85000"/>
+                </a:schemeClr>
+              </a:solidFill>
+            </a:rPr>
+            <a:t>Dispositivo de conexão com sistema</a:t>
+          </a:r>
+          <a:endParaRPr lang="pt-BR" sz="1600" b="1" dirty="0">
+            <a:solidFill>
+              <a:schemeClr val="bg1">
+                <a:lumMod val="85000"/>
+              </a:schemeClr>
+            </a:solidFill>
+          </a:endParaRPr>
+        </a:p>
+      </dgm:t>
+    </dgm:pt>
+    <dgm:pt modelId="{49EC4B80-42F4-4C68-8C02-F267FE81602E}" type="sibTrans" cxnId="{286DB79C-095B-4A03-8241-456F11CF2F5D}">
+      <dgm:prSet/>
+      <dgm:spPr/>
+      <dgm:t>
+        <a:bodyPr/>
+        <a:lstStyle/>
+        <a:p>
+          <a:endParaRPr lang="pt-BR"/>
+        </a:p>
+      </dgm:t>
+    </dgm:pt>
+    <dgm:pt modelId="{E5A1EA11-2B41-4DD3-8BF1-0CF84454CAE5}" type="parTrans" cxnId="{286DB79C-095B-4A03-8241-456F11CF2F5D}">
+      <dgm:prSet/>
+      <dgm:spPr/>
+      <dgm:t>
+        <a:bodyPr/>
+        <a:lstStyle/>
+        <a:p>
+          <a:endParaRPr lang="pt-BR"/>
+        </a:p>
+      </dgm:t>
+    </dgm:pt>
+    <dgm:pt modelId="{80BADE98-2C43-40D5-937A-874A1B627145}">
+      <dgm:prSet phldrT="[Texto]" custT="1">
+        <dgm:style>
+          <a:lnRef idx="0">
+            <a:schemeClr val="accent6"/>
+          </a:lnRef>
+          <a:fillRef idx="3">
+            <a:schemeClr val="accent6"/>
+          </a:fillRef>
+          <a:effectRef idx="3">
+            <a:schemeClr val="accent6"/>
+          </a:effectRef>
+          <a:fontRef idx="minor">
+            <a:schemeClr val="lt1"/>
+          </a:fontRef>
+        </dgm:style>
+      </dgm:prSet>
+      <dgm:spPr/>
+      <dgm:t>
+        <a:bodyPr/>
+        <a:lstStyle/>
+        <a:p>
+          <a:endParaRPr lang="pt-BR" sz="1600" b="1" dirty="0">
+            <a:solidFill>
+              <a:schemeClr val="bg1">
+                <a:lumMod val="85000"/>
+              </a:schemeClr>
+            </a:solidFill>
+          </a:endParaRPr>
+        </a:p>
+      </dgm:t>
+    </dgm:pt>
+    <dgm:pt modelId="{61694F4E-3BB3-4806-8315-F9C9DE55D766}" type="parTrans" cxnId="{81BAC1B0-D183-4179-9A55-029F538E675D}">
+      <dgm:prSet/>
+      <dgm:spPr/>
+      <dgm:t>
+        <a:bodyPr/>
+        <a:lstStyle/>
+        <a:p>
+          <a:endParaRPr lang="pt-BR"/>
+        </a:p>
+      </dgm:t>
+    </dgm:pt>
+    <dgm:pt modelId="{1B940CC1-D5C1-4465-A2E5-B629FA2D9A4E}" type="sibTrans" cxnId="{81BAC1B0-D183-4179-9A55-029F538E675D}">
       <dgm:prSet/>
       <dgm:spPr/>
       <dgm:t>
@@ -2756,6 +2975,13 @@
         </dgm:presLayoutVars>
       </dgm:prSet>
       <dgm:spPr/>
+      <dgm:t>
+        <a:bodyPr/>
+        <a:lstStyle/>
+        <a:p>
+          <a:endParaRPr lang="pt-BR"/>
+        </a:p>
+      </dgm:t>
     </dgm:pt>
     <dgm:pt modelId="{138CD9C0-127E-45DD-BA5D-F929D722FD16}" type="pres">
       <dgm:prSet presAssocID="{4412B91F-CF8D-4A42-83DF-7CDCCDA80F7D}" presName="tSp" presStyleCnt="0"/>
@@ -2778,7 +3004,7 @@
       <dgm:spPr/>
     </dgm:pt>
     <dgm:pt modelId="{77351131-57DF-4AF2-A89D-95AF9C6149DC}" type="pres">
-      <dgm:prSet presAssocID="{7DFE07BF-9A88-4152-9E58-09C9E20DB3CE}" presName="childNode1" presStyleLbl="bgAcc1" presStyleIdx="0" presStyleCnt="3">
+      <dgm:prSet presAssocID="{7DFE07BF-9A88-4152-9E58-09C9E20DB3CE}" presName="childNode1" presStyleLbl="bgAcc1" presStyleIdx="0" presStyleCnt="3" custScaleY="78394">
         <dgm:presLayoutVars>
           <dgm:bulletEnabled val="1"/>
         </dgm:presLayoutVars>
@@ -2822,7 +3048,7 @@
       </dgm:t>
     </dgm:pt>
     <dgm:pt modelId="{168FD8A5-9BA3-47FA-8D32-ED60BCA98D24}" type="pres">
-      <dgm:prSet presAssocID="{7DFE07BF-9A88-4152-9E58-09C9E20DB3CE}" presName="parentNode1" presStyleLbl="node1" presStyleIdx="0" presStyleCnt="3">
+      <dgm:prSet presAssocID="{7DFE07BF-9A88-4152-9E58-09C9E20DB3CE}" presName="parentNode1" presStyleLbl="node1" presStyleIdx="0" presStyleCnt="3" custScaleY="78394" custLinFactY="-100000" custLinFactNeighborX="-3813" custLinFactNeighborY="-135293">
         <dgm:presLayoutVars>
           <dgm:chMax val="1"/>
           <dgm:bulletEnabled val="1"/>
@@ -2842,8 +3068,19 @@
       <dgm:spPr/>
     </dgm:pt>
     <dgm:pt modelId="{BB47B8A7-A69A-47BA-8429-499D75D98923}" type="pres">
-      <dgm:prSet presAssocID="{E68D9850-B3A4-4979-A4D0-E3D401A29AB5}" presName="Name9" presStyleLbl="sibTrans2D1" presStyleIdx="0" presStyleCnt="2"/>
-      <dgm:spPr/>
+      <dgm:prSet presAssocID="{E68D9850-B3A4-4979-A4D0-E3D401A29AB5}" presName="Name9" presStyleLbl="sibTrans2D1" presStyleIdx="0" presStyleCnt="2" custFlipVert="0" custFlipHor="0" custScaleX="1831" custScaleY="3418" custLinFactNeighborX="54407" custLinFactNeighborY="71931"/>
+      <dgm:spPr>
+        <a:prstGeom prst="mathMultiply">
+          <a:avLst/>
+        </a:prstGeom>
+      </dgm:spPr>
+      <dgm:t>
+        <a:bodyPr/>
+        <a:lstStyle/>
+        <a:p>
+          <a:endParaRPr lang="pt-BR"/>
+        </a:p>
+      </dgm:t>
     </dgm:pt>
     <dgm:pt modelId="{F416103B-C45A-486D-81AB-4454CBBAB63C}" type="pres">
       <dgm:prSet presAssocID="{3865D5FF-DA00-4906-B6F5-07C839464584}" presName="composite2" presStyleCnt="0"/>
@@ -2854,7 +3091,7 @@
       <dgm:spPr/>
     </dgm:pt>
     <dgm:pt modelId="{0C27C69B-3C82-4A7E-9AEC-146B678149A2}" type="pres">
-      <dgm:prSet presAssocID="{3865D5FF-DA00-4906-B6F5-07C839464584}" presName="childNode2" presStyleLbl="bgAcc1" presStyleIdx="1" presStyleCnt="3">
+      <dgm:prSet presAssocID="{3865D5FF-DA00-4906-B6F5-07C839464584}" presName="childNode2" presStyleLbl="bgAcc1" presStyleIdx="1" presStyleCnt="3" custScaleY="78394">
         <dgm:presLayoutVars>
           <dgm:bulletEnabled val="1"/>
         </dgm:presLayoutVars>
@@ -2898,21 +3135,35 @@
       </dgm:t>
     </dgm:pt>
     <dgm:pt modelId="{85BA2879-403E-43AC-A59E-A90A5FACC251}" type="pres">
-      <dgm:prSet presAssocID="{3865D5FF-DA00-4906-B6F5-07C839464584}" presName="parentNode2" presStyleLbl="node1" presStyleIdx="1" presStyleCnt="3">
+      <dgm:prSet presAssocID="{3865D5FF-DA00-4906-B6F5-07C839464584}" presName="parentNode2" presStyleLbl="node1" presStyleIdx="1" presStyleCnt="3" custScaleY="78394" custLinFactNeighborX="-3651" custLinFactNeighborY="-1959">
         <dgm:presLayoutVars>
           <dgm:chMax val="0"/>
           <dgm:bulletEnabled val="1"/>
         </dgm:presLayoutVars>
       </dgm:prSet>
       <dgm:spPr/>
+      <dgm:t>
+        <a:bodyPr/>
+        <a:lstStyle/>
+        <a:p>
+          <a:endParaRPr lang="pt-BR"/>
+        </a:p>
+      </dgm:t>
     </dgm:pt>
     <dgm:pt modelId="{38974F4D-A258-43E3-9D7E-91A1D78BB4C2}" type="pres">
       <dgm:prSet presAssocID="{3865D5FF-DA00-4906-B6F5-07C839464584}" presName="connSite2" presStyleCnt="0"/>
       <dgm:spPr/>
     </dgm:pt>
     <dgm:pt modelId="{E5E8036A-476D-4F9C-9D7B-4ED08A33C842}" type="pres">
-      <dgm:prSet presAssocID="{CFF97A55-CF3E-4E1D-AF04-5A3631D6CB6D}" presName="Name18" presStyleLbl="sibTrans2D1" presStyleIdx="1" presStyleCnt="2"/>
+      <dgm:prSet presAssocID="{CFF97A55-CF3E-4E1D-AF04-5A3631D6CB6D}" presName="Name18" presStyleLbl="sibTrans2D1" presStyleIdx="1" presStyleCnt="2" custFlipVert="1" custFlipHor="0" custScaleX="1337" custScaleY="18495" custLinFactNeighborX="-97296" custLinFactNeighborY="41388"/>
       <dgm:spPr/>
+      <dgm:t>
+        <a:bodyPr/>
+        <a:lstStyle/>
+        <a:p>
+          <a:endParaRPr lang="pt-BR"/>
+        </a:p>
+      </dgm:t>
     </dgm:pt>
     <dgm:pt modelId="{AD1ED0EA-8DA3-4054-AB1B-26226A9CAF81}" type="pres">
       <dgm:prSet presAssocID="{F3A2DAB8-2AB9-419A-82D3-D743A16978C8}" presName="composite1" presStyleCnt="0"/>
@@ -2923,7 +3174,7 @@
       <dgm:spPr/>
     </dgm:pt>
     <dgm:pt modelId="{AE566E9F-D101-4F88-9692-208EF2AE8557}" type="pres">
-      <dgm:prSet presAssocID="{F3A2DAB8-2AB9-419A-82D3-D743A16978C8}" presName="childNode1" presStyleLbl="bgAcc1" presStyleIdx="2" presStyleCnt="3">
+      <dgm:prSet presAssocID="{F3A2DAB8-2AB9-419A-82D3-D743A16978C8}" presName="childNode1" presStyleLbl="bgAcc1" presStyleIdx="2" presStyleCnt="3" custScaleY="78394">
         <dgm:presLayoutVars>
           <dgm:bulletEnabled val="1"/>
         </dgm:presLayoutVars>
@@ -2967,7 +3218,7 @@
       </dgm:t>
     </dgm:pt>
     <dgm:pt modelId="{301F9B7A-61FD-4D71-8D0E-DCB457B0DAC9}" type="pres">
-      <dgm:prSet presAssocID="{F3A2DAB8-2AB9-419A-82D3-D743A16978C8}" presName="parentNode1" presStyleLbl="node1" presStyleIdx="2" presStyleCnt="3">
+      <dgm:prSet presAssocID="{F3A2DAB8-2AB9-419A-82D3-D743A16978C8}" presName="parentNode1" presStyleLbl="node1" presStyleIdx="2" presStyleCnt="3" custScaleY="78394" custLinFactY="-100000" custLinFactNeighborX="-3490" custLinFactNeighborY="-135293">
         <dgm:presLayoutVars>
           <dgm:chMax val="1"/>
           <dgm:bulletEnabled val="1"/>
@@ -2988,30 +3239,30 @@
     </dgm:pt>
   </dgm:ptLst>
   <dgm:cxnLst>
-    <dgm:cxn modelId="{1826DE69-BCA5-4CC2-AB59-256DBC7E4BC8}" type="presOf" srcId="{F3A2DAB8-2AB9-419A-82D3-D743A16978C8}" destId="{301F9B7A-61FD-4D71-8D0E-DCB457B0DAC9}" srcOrd="0" destOrd="0" presId="urn:microsoft.com/office/officeart/2005/8/layout/hProcess4"/>
-    <dgm:cxn modelId="{6D0A7A03-30F7-44B7-932A-6B9A0E02B815}" type="presOf" srcId="{3608A19D-5895-4CCB-AE7C-602B7B47F013}" destId="{77351131-57DF-4AF2-A89D-95AF9C6149DC}" srcOrd="0" destOrd="0" presId="urn:microsoft.com/office/officeart/2005/8/layout/hProcess4"/>
-    <dgm:cxn modelId="{C423E00E-A025-461E-AC42-F12191D105F6}" srcId="{F3A2DAB8-2AB9-419A-82D3-D743A16978C8}" destId="{15C81867-89A5-4131-BC4C-32819ECB9224}" srcOrd="0" destOrd="0" parTransId="{BEAE1DAF-4E1C-4B73-9668-E693D0170F93}" sibTransId="{4032F790-153B-41F0-BA2B-917C36EF37DC}"/>
-    <dgm:cxn modelId="{C807233E-7AF8-4376-8C44-360C1AC79F85}" type="presOf" srcId="{2D163772-13E5-4074-928D-7A5A7DBF63A5}" destId="{39B7AE1B-7006-4AD9-AFC0-AD9AB09ED28C}" srcOrd="1" destOrd="0" presId="urn:microsoft.com/office/officeart/2005/8/layout/hProcess4"/>
-    <dgm:cxn modelId="{84076030-E45A-4466-9EAA-5CA3C5F3D1A7}" srcId="{7DFE07BF-9A88-4152-9E58-09C9E20DB3CE}" destId="{3608A19D-5895-4CCB-AE7C-602B7B47F013}" srcOrd="0" destOrd="0" parTransId="{F6ED7F5C-3473-4CB6-A854-8AAB4553A7BF}" sibTransId="{B8867D9A-5291-4E44-8E27-7C2CE1750192}"/>
+    <dgm:cxn modelId="{4696573D-7AAF-40C4-A299-E5634AF135CD}" type="presOf" srcId="{80BADE98-2C43-40D5-937A-874A1B627145}" destId="{388BBD37-9C2B-4172-8678-CDF3BB968BFB}" srcOrd="1" destOrd="0" presId="urn:microsoft.com/office/officeart/2005/8/layout/hProcess4"/>
+    <dgm:cxn modelId="{BF29565E-C27D-4C89-8F7E-C084E8C699E7}" srcId="{7DFE07BF-9A88-4152-9E58-09C9E20DB3CE}" destId="{1198010A-7CD9-47DF-8300-D5AB8FDF717B}" srcOrd="1" destOrd="0" parTransId="{67755E1A-2705-4297-9986-0E390CA27394}" sibTransId="{0231FB8D-A362-4F4A-8E56-6DAC699F1D6F}"/>
+    <dgm:cxn modelId="{D8151DDD-A87C-4D2A-AE89-DC88BEAD8F5E}" type="presOf" srcId="{1198010A-7CD9-47DF-8300-D5AB8FDF717B}" destId="{CEA85225-BA33-4729-B542-7DD51242ADCB}" srcOrd="1" destOrd="1" presId="urn:microsoft.com/office/officeart/2005/8/layout/hProcess4"/>
+    <dgm:cxn modelId="{C9D8935F-6C23-483A-8258-A9CABF3C76B0}" srcId="{4412B91F-CF8D-4A42-83DF-7CDCCDA80F7D}" destId="{3865D5FF-DA00-4906-B6F5-07C839464584}" srcOrd="1" destOrd="0" parTransId="{49FB8D0F-E70F-4A66-9F99-3E0F33864CA6}" sibTransId="{CFF97A55-CF3E-4E1D-AF04-5A3631D6CB6D}"/>
+    <dgm:cxn modelId="{A5D7F522-490D-4613-A205-B81A1D2FF7FB}" type="presOf" srcId="{F3A2DAB8-2AB9-419A-82D3-D743A16978C8}" destId="{301F9B7A-61FD-4D71-8D0E-DCB457B0DAC9}" srcOrd="0" destOrd="0" presId="urn:microsoft.com/office/officeart/2005/8/layout/hProcess4"/>
+    <dgm:cxn modelId="{CABFBE03-3760-43FE-A793-4570B6274A4D}" type="presOf" srcId="{2F3DF7DE-E5C9-4440-80D1-538313244BE6}" destId="{39B7AE1B-7006-4AD9-AFC0-AD9AB09ED28C}" srcOrd="1" destOrd="0" presId="urn:microsoft.com/office/officeart/2005/8/layout/hProcess4"/>
+    <dgm:cxn modelId="{E819844F-6C63-4A97-8468-0C16FFCB7637}" type="presOf" srcId="{2F3DF7DE-E5C9-4440-80D1-538313244BE6}" destId="{0C27C69B-3C82-4A7E-9AEC-146B678149A2}" srcOrd="0" destOrd="0" presId="urn:microsoft.com/office/officeart/2005/8/layout/hProcess4"/>
+    <dgm:cxn modelId="{5CB851DE-B309-4D32-BF02-58D05478E534}" srcId="{7DFE07BF-9A88-4152-9E58-09C9E20DB3CE}" destId="{7F7E1F91-F6F4-48A9-B4FA-337B2EBD2C9A}" srcOrd="0" destOrd="0" parTransId="{0796D45F-4D57-413D-A4BB-33573B2F1CF3}" sibTransId="{0FC519C8-F4CD-4D2A-B852-2C233866BAF3}"/>
+    <dgm:cxn modelId="{B4DEC388-DC62-483F-A05C-5555B345D4B2}" type="presOf" srcId="{7F7E1F91-F6F4-48A9-B4FA-337B2EBD2C9A}" destId="{77351131-57DF-4AF2-A89D-95AF9C6149DC}" srcOrd="0" destOrd="0" presId="urn:microsoft.com/office/officeart/2005/8/layout/hProcess4"/>
+    <dgm:cxn modelId="{9ED5A29A-4F56-4F4A-943D-8B8035CAB709}" type="presOf" srcId="{FFBB95A5-64CA-4277-8EC9-9A4877C06A11}" destId="{AE566E9F-D101-4F88-9692-208EF2AE8557}" srcOrd="0" destOrd="1" presId="urn:microsoft.com/office/officeart/2005/8/layout/hProcess4"/>
+    <dgm:cxn modelId="{286DB79C-095B-4A03-8241-456F11CF2F5D}" srcId="{F3A2DAB8-2AB9-419A-82D3-D743A16978C8}" destId="{FFBB95A5-64CA-4277-8EC9-9A4877C06A11}" srcOrd="1" destOrd="0" parTransId="{E5A1EA11-2B41-4DD3-8BF1-0CF84454CAE5}" sibTransId="{49EC4B80-42F4-4C68-8C02-F267FE81602E}"/>
+    <dgm:cxn modelId="{FCD6A96D-054B-4471-90ED-6EB5ED0EBFF9}" type="presOf" srcId="{CFF97A55-CF3E-4E1D-AF04-5A3631D6CB6D}" destId="{E5E8036A-476D-4F9C-9D7B-4ED08A33C842}" srcOrd="0" destOrd="0" presId="urn:microsoft.com/office/officeart/2005/8/layout/hProcess4"/>
     <dgm:cxn modelId="{C730B313-4D1D-4229-8314-A3150E0294B1}" type="presOf" srcId="{E68D9850-B3A4-4979-A4D0-E3D401A29AB5}" destId="{BB47B8A7-A69A-47BA-8429-499D75D98923}" srcOrd="0" destOrd="0" presId="urn:microsoft.com/office/officeart/2005/8/layout/hProcess4"/>
-    <dgm:cxn modelId="{389F34DF-E799-4B31-BA52-DA4BE4D473D3}" srcId="{3865D5FF-DA00-4906-B6F5-07C839464584}" destId="{17C36E47-B60A-48AF-9203-3A426FDDC061}" srcOrd="2" destOrd="0" parTransId="{5D184643-6CAF-4BEF-9B8E-9CEF559E3FA0}" sibTransId="{D9FFAE66-B2AA-420E-97F1-1E782654582A}"/>
-    <dgm:cxn modelId="{D058A61E-2631-4792-87A9-3570D8D2DB0F}" srcId="{3865D5FF-DA00-4906-B6F5-07C839464584}" destId="{2F3DF7DE-E5C9-4440-80D1-538313244BE6}" srcOrd="1" destOrd="0" parTransId="{3C0BC7DD-F66C-4719-92AE-5E9E7825604D}" sibTransId="{4569B2FB-90CA-4536-9206-69C81C9FC0BD}"/>
-    <dgm:cxn modelId="{454AD78F-2D17-4EB0-B913-79380716CE39}" type="presOf" srcId="{2D163772-13E5-4074-928D-7A5A7DBF63A5}" destId="{0C27C69B-3C82-4A7E-9AEC-146B678149A2}" srcOrd="0" destOrd="0" presId="urn:microsoft.com/office/officeart/2005/8/layout/hProcess4"/>
-    <dgm:cxn modelId="{FCD6A96D-054B-4471-90ED-6EB5ED0EBFF9}" type="presOf" srcId="{CFF97A55-CF3E-4E1D-AF04-5A3631D6CB6D}" destId="{E5E8036A-476D-4F9C-9D7B-4ED08A33C842}" srcOrd="0" destOrd="0" presId="urn:microsoft.com/office/officeart/2005/8/layout/hProcess4"/>
+    <dgm:cxn modelId="{076FA099-FCD5-4C11-8A08-746949589EB9}" type="presOf" srcId="{FFBB95A5-64CA-4277-8EC9-9A4877C06A11}" destId="{388BBD37-9C2B-4172-8678-CDF3BB968BFB}" srcOrd="1" destOrd="1" presId="urn:microsoft.com/office/officeart/2005/8/layout/hProcess4"/>
+    <dgm:cxn modelId="{F52A89F1-D611-4436-8916-14DEFBEAC79D}" srcId="{4412B91F-CF8D-4A42-83DF-7CDCCDA80F7D}" destId="{7DFE07BF-9A88-4152-9E58-09C9E20DB3CE}" srcOrd="0" destOrd="0" parTransId="{F2C6A117-64F1-4ED9-9C2B-9510107D76CB}" sibTransId="{E68D9850-B3A4-4979-A4D0-E3D401A29AB5}"/>
+    <dgm:cxn modelId="{FD321DDD-0FBF-4119-B35F-BF41A6D1FACA}" type="presOf" srcId="{80BADE98-2C43-40D5-937A-874A1B627145}" destId="{AE566E9F-D101-4F88-9692-208EF2AE8557}" srcOrd="0" destOrd="0" presId="urn:microsoft.com/office/officeart/2005/8/layout/hProcess4"/>
+    <dgm:cxn modelId="{C03BE492-3E48-4B5B-B223-BD9B09A0499C}" type="presOf" srcId="{4412B91F-CF8D-4A42-83DF-7CDCCDA80F7D}" destId="{50C663CD-616C-44EE-98F1-BB5FDDDEDCC8}" srcOrd="0" destOrd="0" presId="urn:microsoft.com/office/officeart/2005/8/layout/hProcess4"/>
     <dgm:cxn modelId="{4A7FA099-9464-4ACD-A790-6102C1584AD1}" srcId="{4412B91F-CF8D-4A42-83DF-7CDCCDA80F7D}" destId="{F3A2DAB8-2AB9-419A-82D3-D743A16978C8}" srcOrd="2" destOrd="0" parTransId="{62C15E06-9F1B-4472-A7B4-FEFADBC7E807}" sibTransId="{401344D0-ED0B-4340-9FCD-FF07FE375E6C}"/>
+    <dgm:cxn modelId="{66AF1316-005D-4157-AB49-7D09464E8313}" type="presOf" srcId="{7F7E1F91-F6F4-48A9-B4FA-337B2EBD2C9A}" destId="{CEA85225-BA33-4729-B542-7DD51242ADCB}" srcOrd="1" destOrd="0" presId="urn:microsoft.com/office/officeart/2005/8/layout/hProcess4"/>
+    <dgm:cxn modelId="{D058A61E-2631-4792-87A9-3570D8D2DB0F}" srcId="{3865D5FF-DA00-4906-B6F5-07C839464584}" destId="{2F3DF7DE-E5C9-4440-80D1-538313244BE6}" srcOrd="0" destOrd="0" parTransId="{3C0BC7DD-F66C-4719-92AE-5E9E7825604D}" sibTransId="{4569B2FB-90CA-4536-9206-69C81C9FC0BD}"/>
     <dgm:cxn modelId="{F6F5BFB7-87A2-418B-8A67-5193C4B8B5C2}" type="presOf" srcId="{3865D5FF-DA00-4906-B6F5-07C839464584}" destId="{85BA2879-403E-43AC-A59E-A90A5FACC251}" srcOrd="0" destOrd="0" presId="urn:microsoft.com/office/officeart/2005/8/layout/hProcess4"/>
-    <dgm:cxn modelId="{DE132E6E-2775-4267-BE23-76DFED146DF3}" srcId="{3865D5FF-DA00-4906-B6F5-07C839464584}" destId="{2D163772-13E5-4074-928D-7A5A7DBF63A5}" srcOrd="0" destOrd="0" parTransId="{757ACCF4-9AEE-4064-80DF-9850B6B60C93}" sibTransId="{EADCE4D3-E256-4844-B0A4-83F42236A03B}"/>
-    <dgm:cxn modelId="{901AD719-F247-413A-B1B3-109C2FFB2AE5}" type="presOf" srcId="{17C36E47-B60A-48AF-9203-3A426FDDC061}" destId="{39B7AE1B-7006-4AD9-AFC0-AD9AB09ED28C}" srcOrd="1" destOrd="2" presId="urn:microsoft.com/office/officeart/2005/8/layout/hProcess4"/>
-    <dgm:cxn modelId="{78BD922F-CC17-4C21-97FA-865DD57CC5F7}" type="presOf" srcId="{2F3DF7DE-E5C9-4440-80D1-538313244BE6}" destId="{39B7AE1B-7006-4AD9-AFC0-AD9AB09ED28C}" srcOrd="1" destOrd="1" presId="urn:microsoft.com/office/officeart/2005/8/layout/hProcess4"/>
-    <dgm:cxn modelId="{18A399E8-969F-433E-8129-BAB90BC4BA5D}" type="presOf" srcId="{15C81867-89A5-4131-BC4C-32819ECB9224}" destId="{AE566E9F-D101-4F88-9692-208EF2AE8557}" srcOrd="0" destOrd="0" presId="urn:microsoft.com/office/officeart/2005/8/layout/hProcess4"/>
-    <dgm:cxn modelId="{C03BE492-3E48-4B5B-B223-BD9B09A0499C}" type="presOf" srcId="{4412B91F-CF8D-4A42-83DF-7CDCCDA80F7D}" destId="{50C663CD-616C-44EE-98F1-BB5FDDDEDCC8}" srcOrd="0" destOrd="0" presId="urn:microsoft.com/office/officeart/2005/8/layout/hProcess4"/>
-    <dgm:cxn modelId="{35C165A5-5C5A-4F4B-AE9D-49DC63B3E5AF}" type="presOf" srcId="{15C81867-89A5-4131-BC4C-32819ECB9224}" destId="{388BBD37-9C2B-4172-8678-CDF3BB968BFB}" srcOrd="1" destOrd="0" presId="urn:microsoft.com/office/officeart/2005/8/layout/hProcess4"/>
+    <dgm:cxn modelId="{C9B3EE4E-01DF-4274-A896-B826614E44E8}" type="presOf" srcId="{1198010A-7CD9-47DF-8300-D5AB8FDF717B}" destId="{77351131-57DF-4AF2-A89D-95AF9C6149DC}" srcOrd="0" destOrd="1" presId="urn:microsoft.com/office/officeart/2005/8/layout/hProcess4"/>
     <dgm:cxn modelId="{96F1515C-012C-4FBA-939B-73396FC64F01}" type="presOf" srcId="{7DFE07BF-9A88-4152-9E58-09C9E20DB3CE}" destId="{168FD8A5-9BA3-47FA-8D32-ED60BCA98D24}" srcOrd="0" destOrd="0" presId="urn:microsoft.com/office/officeart/2005/8/layout/hProcess4"/>
-    <dgm:cxn modelId="{F52A89F1-D611-4436-8916-14DEFBEAC79D}" srcId="{4412B91F-CF8D-4A42-83DF-7CDCCDA80F7D}" destId="{7DFE07BF-9A88-4152-9E58-09C9E20DB3CE}" srcOrd="0" destOrd="0" parTransId="{F2C6A117-64F1-4ED9-9C2B-9510107D76CB}" sibTransId="{E68D9850-B3A4-4979-A4D0-E3D401A29AB5}"/>
-    <dgm:cxn modelId="{AD41FD1E-945F-4B08-9162-F2D9E765F538}" type="presOf" srcId="{3608A19D-5895-4CCB-AE7C-602B7B47F013}" destId="{CEA85225-BA33-4729-B542-7DD51242ADCB}" srcOrd="1" destOrd="0" presId="urn:microsoft.com/office/officeart/2005/8/layout/hProcess4"/>
-    <dgm:cxn modelId="{6C7CF280-7813-4669-8A3A-FAF603EE06E7}" type="presOf" srcId="{17C36E47-B60A-48AF-9203-3A426FDDC061}" destId="{0C27C69B-3C82-4A7E-9AEC-146B678149A2}" srcOrd="0" destOrd="2" presId="urn:microsoft.com/office/officeart/2005/8/layout/hProcess4"/>
-    <dgm:cxn modelId="{C9D8935F-6C23-483A-8258-A9CABF3C76B0}" srcId="{4412B91F-CF8D-4A42-83DF-7CDCCDA80F7D}" destId="{3865D5FF-DA00-4906-B6F5-07C839464584}" srcOrd="1" destOrd="0" parTransId="{49FB8D0F-E70F-4A66-9F99-3E0F33864CA6}" sibTransId="{CFF97A55-CF3E-4E1D-AF04-5A3631D6CB6D}"/>
-    <dgm:cxn modelId="{CDA29DBF-6C67-4174-9590-4FD1FFC822A3}" type="presOf" srcId="{2F3DF7DE-E5C9-4440-80D1-538313244BE6}" destId="{0C27C69B-3C82-4A7E-9AEC-146B678149A2}" srcOrd="0" destOrd="1" presId="urn:microsoft.com/office/officeart/2005/8/layout/hProcess4"/>
+    <dgm:cxn modelId="{81BAC1B0-D183-4179-9A55-029F538E675D}" srcId="{F3A2DAB8-2AB9-419A-82D3-D743A16978C8}" destId="{80BADE98-2C43-40D5-937A-874A1B627145}" srcOrd="0" destOrd="0" parTransId="{61694F4E-3BB3-4806-8315-F9C9DE55D766}" sibTransId="{1B940CC1-D5C1-4465-A2E5-B629FA2D9A4E}"/>
     <dgm:cxn modelId="{DC8F0603-A30F-4881-8DB3-C28DAA5234EB}" type="presParOf" srcId="{50C663CD-616C-44EE-98F1-BB5FDDDEDCC8}" destId="{138CD9C0-127E-45DD-BA5D-F929D722FD16}" srcOrd="0" destOrd="0" presId="urn:microsoft.com/office/officeart/2005/8/layout/hProcess4"/>
     <dgm:cxn modelId="{5A02F5F5-BF03-478E-AB04-0CF1957AA6B2}" type="presParOf" srcId="{50C663CD-616C-44EE-98F1-BB5FDDDEDCC8}" destId="{EF0649EA-CFC7-443D-9E0B-71BBF1A268A7}" srcOrd="1" destOrd="0" presId="urn:microsoft.com/office/officeart/2005/8/layout/hProcess4"/>
     <dgm:cxn modelId="{28FB9728-D277-4EA0-9D1D-8BA739CBDE26}" type="presParOf" srcId="{50C663CD-616C-44EE-98F1-BB5FDDDEDCC8}" destId="{2FA38D1F-3777-488A-AF41-E467FA0BCCBE}" srcOrd="2" destOrd="0" presId="urn:microsoft.com/office/officeart/2005/8/layout/hProcess4"/>
@@ -3029,12 +3280,12 @@
     <dgm:cxn modelId="{B705B85E-226F-4966-ACF6-7A7BCFDD84A6}" type="presParOf" srcId="{F416103B-C45A-486D-81AB-4454CBBAB63C}" destId="{85BA2879-403E-43AC-A59E-A90A5FACC251}" srcOrd="3" destOrd="0" presId="urn:microsoft.com/office/officeart/2005/8/layout/hProcess4"/>
     <dgm:cxn modelId="{3D72DD0F-3B54-42F8-8D17-2142FC7E1173}" type="presParOf" srcId="{F416103B-C45A-486D-81AB-4454CBBAB63C}" destId="{38974F4D-A258-43E3-9D7E-91A1D78BB4C2}" srcOrd="4" destOrd="0" presId="urn:microsoft.com/office/officeart/2005/8/layout/hProcess4"/>
     <dgm:cxn modelId="{6AC860F9-0BA5-429A-BB0A-5289735A89D0}" type="presParOf" srcId="{2FA38D1F-3777-488A-AF41-E467FA0BCCBE}" destId="{E5E8036A-476D-4F9C-9D7B-4ED08A33C842}" srcOrd="3" destOrd="0" presId="urn:microsoft.com/office/officeart/2005/8/layout/hProcess4"/>
-    <dgm:cxn modelId="{C8711B08-E5DD-4F81-A28E-B6ABD1A5A8BF}" type="presParOf" srcId="{2FA38D1F-3777-488A-AF41-E467FA0BCCBE}" destId="{AD1ED0EA-8DA3-4054-AB1B-26226A9CAF81}" srcOrd="4" destOrd="0" presId="urn:microsoft.com/office/officeart/2005/8/layout/hProcess4"/>
-    <dgm:cxn modelId="{BF36E7D1-787B-4E5C-A424-C554C9756329}" type="presParOf" srcId="{AD1ED0EA-8DA3-4054-AB1B-26226A9CAF81}" destId="{B1E2031A-7AD3-4EBE-A697-E6D795AD0EF2}" srcOrd="0" destOrd="0" presId="urn:microsoft.com/office/officeart/2005/8/layout/hProcess4"/>
-    <dgm:cxn modelId="{F2D27704-B637-4B51-A4F8-BBE948A05622}" type="presParOf" srcId="{AD1ED0EA-8DA3-4054-AB1B-26226A9CAF81}" destId="{AE566E9F-D101-4F88-9692-208EF2AE8557}" srcOrd="1" destOrd="0" presId="urn:microsoft.com/office/officeart/2005/8/layout/hProcess4"/>
-    <dgm:cxn modelId="{D74EB6C2-20EA-4497-9FF7-2230481C0310}" type="presParOf" srcId="{AD1ED0EA-8DA3-4054-AB1B-26226A9CAF81}" destId="{388BBD37-9C2B-4172-8678-CDF3BB968BFB}" srcOrd="2" destOrd="0" presId="urn:microsoft.com/office/officeart/2005/8/layout/hProcess4"/>
-    <dgm:cxn modelId="{4C99789F-073F-4CC4-92F2-20610A639C5A}" type="presParOf" srcId="{AD1ED0EA-8DA3-4054-AB1B-26226A9CAF81}" destId="{301F9B7A-61FD-4D71-8D0E-DCB457B0DAC9}" srcOrd="3" destOrd="0" presId="urn:microsoft.com/office/officeart/2005/8/layout/hProcess4"/>
-    <dgm:cxn modelId="{83BC5137-E146-4B49-A3DE-A5E0360077A2}" type="presParOf" srcId="{AD1ED0EA-8DA3-4054-AB1B-26226A9CAF81}" destId="{078A6A3C-B76D-4C3E-B6DC-01589DDA040C}" srcOrd="4" destOrd="0" presId="urn:microsoft.com/office/officeart/2005/8/layout/hProcess4"/>
+    <dgm:cxn modelId="{C1BFC66E-6ECF-461B-96C0-A759A0104FA5}" type="presParOf" srcId="{2FA38D1F-3777-488A-AF41-E467FA0BCCBE}" destId="{AD1ED0EA-8DA3-4054-AB1B-26226A9CAF81}" srcOrd="4" destOrd="0" presId="urn:microsoft.com/office/officeart/2005/8/layout/hProcess4"/>
+    <dgm:cxn modelId="{9FF93874-3B3D-4721-83B9-6AD37A0F30AF}" type="presParOf" srcId="{AD1ED0EA-8DA3-4054-AB1B-26226A9CAF81}" destId="{B1E2031A-7AD3-4EBE-A697-E6D795AD0EF2}" srcOrd="0" destOrd="0" presId="urn:microsoft.com/office/officeart/2005/8/layout/hProcess4"/>
+    <dgm:cxn modelId="{FFB91E53-196B-490F-88C8-8474006A981E}" type="presParOf" srcId="{AD1ED0EA-8DA3-4054-AB1B-26226A9CAF81}" destId="{AE566E9F-D101-4F88-9692-208EF2AE8557}" srcOrd="1" destOrd="0" presId="urn:microsoft.com/office/officeart/2005/8/layout/hProcess4"/>
+    <dgm:cxn modelId="{4D5BD235-974B-4C72-BFA4-21E26C5AA4FC}" type="presParOf" srcId="{AD1ED0EA-8DA3-4054-AB1B-26226A9CAF81}" destId="{388BBD37-9C2B-4172-8678-CDF3BB968BFB}" srcOrd="2" destOrd="0" presId="urn:microsoft.com/office/officeart/2005/8/layout/hProcess4"/>
+    <dgm:cxn modelId="{6CEAE914-EE42-441C-B146-2FD8B915137A}" type="presParOf" srcId="{AD1ED0EA-8DA3-4054-AB1B-26226A9CAF81}" destId="{301F9B7A-61FD-4D71-8D0E-DCB457B0DAC9}" srcOrd="3" destOrd="0" presId="urn:microsoft.com/office/officeart/2005/8/layout/hProcess4"/>
+    <dgm:cxn modelId="{08CC8A90-2B16-4068-9C57-EE0A8E9AAAF0}" type="presParOf" srcId="{AD1ED0EA-8DA3-4054-AB1B-26226A9CAF81}" destId="{078A6A3C-B76D-4C3E-B6DC-01589DDA040C}" srcOrd="4" destOrd="0" presId="urn:microsoft.com/office/officeart/2005/8/layout/hProcess4"/>
   </dgm:cxnLst>
   <dgm:bg/>
   <dgm:whole/>
@@ -3076,7 +3327,7 @@
             <a:alphaOff val="0"/>
           </a:schemeClr>
         </a:solidFill>
-        <a:ln w="25400" cap="flat" cmpd="sng" algn="ctr">
+        <a:ln w="10000" cap="flat" cmpd="sng" algn="ctr">
           <a:solidFill>
             <a:schemeClr val="accent1">
               <a:hueOff val="0"/>
@@ -3087,16 +3338,29 @@
           </a:solidFill>
           <a:prstDash val="solid"/>
         </a:ln>
-        <a:effectLst/>
+        <a:effectLst>
+          <a:outerShdw blurRad="76200" dist="50800" dir="5400000" rotWithShape="0">
+            <a:srgbClr val="4E3B30">
+              <a:alpha val="60000"/>
+            </a:srgbClr>
+          </a:outerShdw>
+        </a:effectLst>
+        <a:scene3d>
+          <a:camera prst="orthographicFront"/>
+          <a:lightRig rig="flat" dir="t"/>
+        </a:scene3d>
+        <a:sp3d z="190500" extrusionH="12700" prstMaterial="plastic">
+          <a:bevelT w="50800" h="50800"/>
+        </a:sp3d>
       </dsp:spPr>
       <dsp:style>
-        <a:lnRef idx="2">
+        <a:lnRef idx="1">
           <a:scrgbClr r="0" g="0" b="0"/>
         </a:lnRef>
         <a:fillRef idx="1">
           <a:scrgbClr r="0" g="0" b="0"/>
         </a:fillRef>
-        <a:effectRef idx="0">
+        <a:effectRef idx="2">
           <a:scrgbClr r="0" g="0" b="0"/>
         </a:effectRef>
         <a:fontRef idx="minor"/>
@@ -3115,35 +3379,104 @@
         <a:prstGeom prst="roundRect">
           <a:avLst/>
         </a:prstGeom>
-        <a:solidFill>
-          <a:schemeClr val="accent1">
-            <a:hueOff val="0"/>
-            <a:satOff val="0"/>
-            <a:lumOff val="0"/>
-            <a:alphaOff val="0"/>
-          </a:schemeClr>
-        </a:solidFill>
-        <a:ln w="25400" cap="flat" cmpd="sng" algn="ctr">
-          <a:solidFill>
-            <a:schemeClr val="lt1">
-              <a:hueOff val="0"/>
-              <a:satOff val="0"/>
-              <a:lumOff val="0"/>
-              <a:alphaOff val="0"/>
-            </a:schemeClr>
-          </a:solidFill>
-          <a:prstDash val="solid"/>
+        <a:gradFill rotWithShape="0">
+          <a:gsLst>
+            <a:gs pos="0">
+              <a:schemeClr val="accent1">
+                <a:hueOff val="0"/>
+                <a:satOff val="0"/>
+                <a:lumOff val="0"/>
+                <a:alphaOff val="0"/>
+                <a:tint val="75000"/>
+                <a:shade val="85000"/>
+                <a:satMod val="230000"/>
+              </a:schemeClr>
+            </a:gs>
+            <a:gs pos="25000">
+              <a:schemeClr val="accent1">
+                <a:hueOff val="0"/>
+                <a:satOff val="0"/>
+                <a:lumOff val="0"/>
+                <a:alphaOff val="0"/>
+                <a:tint val="90000"/>
+                <a:shade val="70000"/>
+                <a:satMod val="220000"/>
+              </a:schemeClr>
+            </a:gs>
+            <a:gs pos="50000">
+              <a:schemeClr val="accent1">
+                <a:hueOff val="0"/>
+                <a:satOff val="0"/>
+                <a:lumOff val="0"/>
+                <a:alphaOff val="0"/>
+                <a:tint val="90000"/>
+                <a:shade val="58000"/>
+                <a:satMod val="225000"/>
+              </a:schemeClr>
+            </a:gs>
+            <a:gs pos="65000">
+              <a:schemeClr val="accent1">
+                <a:hueOff val="0"/>
+                <a:satOff val="0"/>
+                <a:lumOff val="0"/>
+                <a:alphaOff val="0"/>
+                <a:tint val="90000"/>
+                <a:shade val="58000"/>
+                <a:satMod val="225000"/>
+              </a:schemeClr>
+            </a:gs>
+            <a:gs pos="80000">
+              <a:schemeClr val="accent1">
+                <a:hueOff val="0"/>
+                <a:satOff val="0"/>
+                <a:lumOff val="0"/>
+                <a:alphaOff val="0"/>
+                <a:tint val="90000"/>
+                <a:shade val="69000"/>
+                <a:satMod val="220000"/>
+              </a:schemeClr>
+            </a:gs>
+            <a:gs pos="100000">
+              <a:schemeClr val="accent1">
+                <a:hueOff val="0"/>
+                <a:satOff val="0"/>
+                <a:lumOff val="0"/>
+                <a:alphaOff val="0"/>
+                <a:tint val="77000"/>
+                <a:shade val="80000"/>
+                <a:satMod val="230000"/>
+              </a:schemeClr>
+            </a:gs>
+          </a:gsLst>
+          <a:lin ang="5400000" scaled="1"/>
+        </a:gradFill>
+        <a:ln>
+          <a:noFill/>
         </a:ln>
-        <a:effectLst/>
+        <a:effectLst>
+          <a:outerShdw blurRad="76200" dist="50800" dir="5400000" rotWithShape="0">
+            <a:srgbClr val="4E3B30">
+              <a:alpha val="60000"/>
+            </a:srgbClr>
+          </a:outerShdw>
+        </a:effectLst>
+        <a:scene3d>
+          <a:camera prst="orthographicFront"/>
+          <a:lightRig rig="flat" dir="t"/>
+        </a:scene3d>
+        <a:sp3d prstMaterial="plastic">
+          <a:bevelT w="120900" h="88900"/>
+          <a:bevelB w="88900" h="31750" prst="angle"/>
+        </a:sp3d>
       </dsp:spPr>
       <dsp:style>
-        <a:lnRef idx="2">
+        <a:lnRef idx="0">
           <a:scrgbClr r="0" g="0" b="0"/>
         </a:lnRef>
-        <a:fillRef idx="1">
+        <a:fillRef idx="3">
           <a:scrgbClr r="0" g="0" b="0"/>
         </a:fillRef>
-        <a:effectRef idx="0">
+        <a:effectRef idx="2">
           <a:scrgbClr r="0" g="0" b="0"/>
         </a:effectRef>
         <a:fontRef idx="minor">
@@ -3168,10 +3501,18 @@
             </a:spcAft>
           </a:pPr>
           <a:r>
-            <a:rPr lang="pt-BR" sz="2000" kern="1200" dirty="0" smtClean="0"/>
+            <a:rPr lang="pt-BR" sz="2000" b="1" kern="1200" dirty="0" smtClean="0">
+              <a:solidFill>
+                <a:srgbClr val="7030A0"/>
+              </a:solidFill>
+            </a:rPr>
             <a:t>Dinamização de registro de atividades</a:t>
           </a:r>
-          <a:endParaRPr lang="pt-BR" sz="2000" kern="1200" dirty="0"/>
+          <a:endParaRPr lang="pt-BR" sz="2000" b="1" kern="1200" dirty="0">
+            <a:solidFill>
+              <a:srgbClr val="7030A0"/>
+            </a:solidFill>
+          </a:endParaRPr>
         </a:p>
       </dsp:txBody>
       <dsp:txXfrm>
@@ -3201,7 +3542,7 @@
             <a:alphaOff val="0"/>
           </a:schemeClr>
         </a:solidFill>
-        <a:ln w="25400" cap="flat" cmpd="sng" algn="ctr">
+        <a:ln w="10000" cap="flat" cmpd="sng" algn="ctr">
           <a:solidFill>
             <a:schemeClr val="accent1">
               <a:hueOff val="0"/>
@@ -3212,16 +3553,29 @@
           </a:solidFill>
           <a:prstDash val="solid"/>
         </a:ln>
-        <a:effectLst/>
+        <a:effectLst>
+          <a:outerShdw blurRad="76200" dist="50800" dir="5400000" rotWithShape="0">
+            <a:srgbClr val="4E3B30">
+              <a:alpha val="60000"/>
+            </a:srgbClr>
+          </a:outerShdw>
+        </a:effectLst>
+        <a:scene3d>
+          <a:camera prst="orthographicFront"/>
+          <a:lightRig rig="flat" dir="t"/>
+        </a:scene3d>
+        <a:sp3d z="190500" extrusionH="12700" prstMaterial="plastic">
+          <a:bevelT w="50800" h="50800"/>
+        </a:sp3d>
       </dsp:spPr>
       <dsp:style>
-        <a:lnRef idx="2">
+        <a:lnRef idx="1">
           <a:scrgbClr r="0" g="0" b="0"/>
         </a:lnRef>
         <a:fillRef idx="1">
           <a:scrgbClr r="0" g="0" b="0"/>
         </a:fillRef>
-        <a:effectRef idx="0">
+        <a:effectRef idx="2">
           <a:scrgbClr r="0" g="0" b="0"/>
         </a:effectRef>
         <a:fontRef idx="minor"/>
@@ -3240,35 +3594,104 @@
         <a:prstGeom prst="roundRect">
           <a:avLst/>
         </a:prstGeom>
-        <a:solidFill>
-          <a:schemeClr val="accent1">
-            <a:hueOff val="0"/>
-            <a:satOff val="0"/>
-            <a:lumOff val="0"/>
-            <a:alphaOff val="0"/>
-          </a:schemeClr>
-        </a:solidFill>
-        <a:ln w="25400" cap="flat" cmpd="sng" algn="ctr">
-          <a:solidFill>
-            <a:schemeClr val="lt1">
-              <a:hueOff val="0"/>
-              <a:satOff val="0"/>
-              <a:lumOff val="0"/>
-              <a:alphaOff val="0"/>
-            </a:schemeClr>
-          </a:solidFill>
-          <a:prstDash val="solid"/>
+        <a:gradFill rotWithShape="0">
+          <a:gsLst>
+            <a:gs pos="0">
+              <a:schemeClr val="accent1">
+                <a:hueOff val="0"/>
+                <a:satOff val="0"/>
+                <a:lumOff val="0"/>
+                <a:alphaOff val="0"/>
+                <a:tint val="75000"/>
+                <a:shade val="85000"/>
+                <a:satMod val="230000"/>
+              </a:schemeClr>
+            </a:gs>
+            <a:gs pos="25000">
+              <a:schemeClr val="accent1">
+                <a:hueOff val="0"/>
+                <a:satOff val="0"/>
+                <a:lumOff val="0"/>
+                <a:alphaOff val="0"/>
+                <a:tint val="90000"/>
+                <a:shade val="70000"/>
+                <a:satMod val="220000"/>
+              </a:schemeClr>
+            </a:gs>
+            <a:gs pos="50000">
+              <a:schemeClr val="accent1">
+                <a:hueOff val="0"/>
+                <a:satOff val="0"/>
+                <a:lumOff val="0"/>
+                <a:alphaOff val="0"/>
+                <a:tint val="90000"/>
+                <a:shade val="58000"/>
+                <a:satMod val="225000"/>
+              </a:schemeClr>
+            </a:gs>
+            <a:gs pos="65000">
+              <a:schemeClr val="accent1">
+                <a:hueOff val="0"/>
+                <a:satOff val="0"/>
+                <a:lumOff val="0"/>
+                <a:alphaOff val="0"/>
+                <a:tint val="90000"/>
+                <a:shade val="58000"/>
+                <a:satMod val="225000"/>
+              </a:schemeClr>
+            </a:gs>
+            <a:gs pos="80000">
+              <a:schemeClr val="accent1">
+                <a:hueOff val="0"/>
+                <a:satOff val="0"/>
+                <a:lumOff val="0"/>
+                <a:alphaOff val="0"/>
+                <a:tint val="90000"/>
+                <a:shade val="69000"/>
+                <a:satMod val="220000"/>
+              </a:schemeClr>
+            </a:gs>
+            <a:gs pos="100000">
+              <a:schemeClr val="accent1">
+                <a:hueOff val="0"/>
+                <a:satOff val="0"/>
+                <a:lumOff val="0"/>
+                <a:alphaOff val="0"/>
+                <a:tint val="77000"/>
+                <a:shade val="80000"/>
+                <a:satMod val="230000"/>
+              </a:schemeClr>
+            </a:gs>
+          </a:gsLst>
+          <a:lin ang="5400000" scaled="1"/>
+        </a:gradFill>
+        <a:ln>
+          <a:noFill/>
         </a:ln>
-        <a:effectLst/>
+        <a:effectLst>
+          <a:outerShdw blurRad="76200" dist="50800" dir="5400000" rotWithShape="0">
+            <a:srgbClr val="4E3B30">
+              <a:alpha val="60000"/>
+            </a:srgbClr>
+          </a:outerShdw>
+        </a:effectLst>
+        <a:scene3d>
+          <a:camera prst="orthographicFront"/>
+          <a:lightRig rig="flat" dir="t"/>
+        </a:scene3d>
+        <a:sp3d prstMaterial="plastic">
+          <a:bevelT w="120900" h="88900"/>
+          <a:bevelB w="88900" h="31750" prst="angle"/>
+        </a:sp3d>
       </dsp:spPr>
       <dsp:style>
-        <a:lnRef idx="2">
+        <a:lnRef idx="0">
           <a:scrgbClr r="0" g="0" b="0"/>
         </a:lnRef>
-        <a:fillRef idx="1">
+        <a:fillRef idx="3">
           <a:scrgbClr r="0" g="0" b="0"/>
         </a:fillRef>
-        <a:effectRef idx="0">
+        <a:effectRef idx="2">
           <a:scrgbClr r="0" g="0" b="0"/>
         </a:effectRef>
         <a:fontRef idx="minor">
@@ -3293,10 +3716,18 @@
             </a:spcAft>
           </a:pPr>
           <a:r>
-            <a:rPr lang="pt-BR" sz="2000" kern="1200" dirty="0" smtClean="0"/>
+            <a:rPr lang="pt-BR" sz="2000" b="1" kern="1200" dirty="0" smtClean="0">
+              <a:solidFill>
+                <a:srgbClr val="7030A0"/>
+              </a:solidFill>
+            </a:rPr>
             <a:t> Acesso web em dispositivos moveis</a:t>
           </a:r>
-          <a:endParaRPr lang="pt-BR" sz="2000" kern="1200" dirty="0"/>
+          <a:endParaRPr lang="pt-BR" sz="2000" b="1" kern="1200" dirty="0">
+            <a:solidFill>
+              <a:srgbClr val="7030A0"/>
+            </a:solidFill>
+          </a:endParaRPr>
         </a:p>
       </dsp:txBody>
       <dsp:txXfrm>
@@ -3326,7 +3757,7 @@
             <a:alphaOff val="0"/>
           </a:schemeClr>
         </a:solidFill>
-        <a:ln w="25400" cap="flat" cmpd="sng" algn="ctr">
+        <a:ln w="10000" cap="flat" cmpd="sng" algn="ctr">
           <a:solidFill>
             <a:schemeClr val="accent1">
               <a:hueOff val="0"/>
@@ -3337,16 +3768,29 @@
           </a:solidFill>
           <a:prstDash val="solid"/>
         </a:ln>
-        <a:effectLst/>
+        <a:effectLst>
+          <a:outerShdw blurRad="76200" dist="50800" dir="5400000" rotWithShape="0">
+            <a:srgbClr val="4E3B30">
+              <a:alpha val="60000"/>
+            </a:srgbClr>
+          </a:outerShdw>
+        </a:effectLst>
+        <a:scene3d>
+          <a:camera prst="orthographicFront"/>
+          <a:lightRig rig="flat" dir="t"/>
+        </a:scene3d>
+        <a:sp3d z="190500" extrusionH="12700" prstMaterial="plastic">
+          <a:bevelT w="50800" h="50800"/>
+        </a:sp3d>
       </dsp:spPr>
       <dsp:style>
-        <a:lnRef idx="2">
+        <a:lnRef idx="1">
           <a:scrgbClr r="0" g="0" b="0"/>
         </a:lnRef>
         <a:fillRef idx="1">
           <a:scrgbClr r="0" g="0" b="0"/>
         </a:fillRef>
-        <a:effectRef idx="0">
+        <a:effectRef idx="2">
           <a:scrgbClr r="0" g="0" b="0"/>
         </a:effectRef>
         <a:fontRef idx="minor"/>
@@ -3365,35 +3809,104 @@
         <a:prstGeom prst="roundRect">
           <a:avLst/>
         </a:prstGeom>
-        <a:solidFill>
-          <a:schemeClr val="accent1">
-            <a:hueOff val="0"/>
-            <a:satOff val="0"/>
-            <a:lumOff val="0"/>
-            <a:alphaOff val="0"/>
-          </a:schemeClr>
-        </a:solidFill>
-        <a:ln w="25400" cap="flat" cmpd="sng" algn="ctr">
-          <a:solidFill>
-            <a:schemeClr val="lt1">
-              <a:hueOff val="0"/>
-              <a:satOff val="0"/>
-              <a:lumOff val="0"/>
-              <a:alphaOff val="0"/>
-            </a:schemeClr>
-          </a:solidFill>
-          <a:prstDash val="solid"/>
+        <a:gradFill rotWithShape="0">
+          <a:gsLst>
+            <a:gs pos="0">
+              <a:schemeClr val="accent1">
+                <a:hueOff val="0"/>
+                <a:satOff val="0"/>
+                <a:lumOff val="0"/>
+                <a:alphaOff val="0"/>
+                <a:tint val="75000"/>
+                <a:shade val="85000"/>
+                <a:satMod val="230000"/>
+              </a:schemeClr>
+            </a:gs>
+            <a:gs pos="25000">
+              <a:schemeClr val="accent1">
+                <a:hueOff val="0"/>
+                <a:satOff val="0"/>
+                <a:lumOff val="0"/>
+                <a:alphaOff val="0"/>
+                <a:tint val="90000"/>
+                <a:shade val="70000"/>
+                <a:satMod val="220000"/>
+              </a:schemeClr>
+            </a:gs>
+            <a:gs pos="50000">
+              <a:schemeClr val="accent1">
+                <a:hueOff val="0"/>
+                <a:satOff val="0"/>
+                <a:lumOff val="0"/>
+                <a:alphaOff val="0"/>
+                <a:tint val="90000"/>
+                <a:shade val="58000"/>
+                <a:satMod val="225000"/>
+              </a:schemeClr>
+            </a:gs>
+            <a:gs pos="65000">
+              <a:schemeClr val="accent1">
+                <a:hueOff val="0"/>
+                <a:satOff val="0"/>
+                <a:lumOff val="0"/>
+                <a:alphaOff val="0"/>
+                <a:tint val="90000"/>
+                <a:shade val="58000"/>
+                <a:satMod val="225000"/>
+              </a:schemeClr>
+            </a:gs>
+            <a:gs pos="80000">
+              <a:schemeClr val="accent1">
+                <a:hueOff val="0"/>
+                <a:satOff val="0"/>
+                <a:lumOff val="0"/>
+                <a:alphaOff val="0"/>
+                <a:tint val="90000"/>
+                <a:shade val="69000"/>
+                <a:satMod val="220000"/>
+              </a:schemeClr>
+            </a:gs>
+            <a:gs pos="100000">
+              <a:schemeClr val="accent1">
+                <a:hueOff val="0"/>
+                <a:satOff val="0"/>
+                <a:lumOff val="0"/>
+                <a:alphaOff val="0"/>
+                <a:tint val="77000"/>
+                <a:shade val="80000"/>
+                <a:satMod val="230000"/>
+              </a:schemeClr>
+            </a:gs>
+          </a:gsLst>
+          <a:lin ang="5400000" scaled="1"/>
+        </a:gradFill>
+        <a:ln>
+          <a:noFill/>
         </a:ln>
-        <a:effectLst/>
+        <a:effectLst>
+          <a:outerShdw blurRad="76200" dist="50800" dir="5400000" rotWithShape="0">
+            <a:srgbClr val="4E3B30">
+              <a:alpha val="60000"/>
+            </a:srgbClr>
+          </a:outerShdw>
+        </a:effectLst>
+        <a:scene3d>
+          <a:camera prst="orthographicFront"/>
+          <a:lightRig rig="flat" dir="t"/>
+        </a:scene3d>
+        <a:sp3d prstMaterial="plastic">
+          <a:bevelT w="120900" h="88900"/>
+          <a:bevelB w="88900" h="31750" prst="angle"/>
+        </a:sp3d>
       </dsp:spPr>
       <dsp:style>
-        <a:lnRef idx="2">
+        <a:lnRef idx="0">
           <a:scrgbClr r="0" g="0" b="0"/>
         </a:lnRef>
-        <a:fillRef idx="1">
+        <a:fillRef idx="3">
           <a:scrgbClr r="0" g="0" b="0"/>
         </a:fillRef>
-        <a:effectRef idx="0">
+        <a:effectRef idx="2">
           <a:scrgbClr r="0" g="0" b="0"/>
         </a:effectRef>
         <a:fontRef idx="minor">
@@ -3418,10 +3931,18 @@
             </a:spcAft>
           </a:pPr>
           <a:r>
-            <a:rPr lang="pt-BR" sz="2000" kern="1200" dirty="0" smtClean="0"/>
+            <a:rPr lang="pt-BR" sz="2000" b="1" kern="1200" dirty="0" smtClean="0">
+              <a:solidFill>
+                <a:srgbClr val="7030A0"/>
+              </a:solidFill>
+            </a:rPr>
             <a:t>Trabalho em grupo em ambiente multiusuário</a:t>
           </a:r>
-          <a:endParaRPr lang="pt-BR" sz="2000" kern="1200" dirty="0"/>
+          <a:endParaRPr lang="pt-BR" sz="2000" b="1" kern="1200" dirty="0">
+            <a:solidFill>
+              <a:srgbClr val="7030A0"/>
+            </a:solidFill>
+          </a:endParaRPr>
         </a:p>
       </dsp:txBody>
       <dsp:txXfrm>
@@ -3451,7 +3972,7 @@
             <a:alphaOff val="0"/>
           </a:schemeClr>
         </a:solidFill>
-        <a:ln w="25400" cap="flat" cmpd="sng" algn="ctr">
+        <a:ln w="10000" cap="flat" cmpd="sng" algn="ctr">
           <a:solidFill>
             <a:schemeClr val="accent1">
               <a:hueOff val="0"/>
@@ -3462,16 +3983,29 @@
           </a:solidFill>
           <a:prstDash val="solid"/>
         </a:ln>
-        <a:effectLst/>
+        <a:effectLst>
+          <a:outerShdw blurRad="76200" dist="50800" dir="5400000" rotWithShape="0">
+            <a:srgbClr val="4E3B30">
+              <a:alpha val="60000"/>
+            </a:srgbClr>
+          </a:outerShdw>
+        </a:effectLst>
+        <a:scene3d>
+          <a:camera prst="orthographicFront"/>
+          <a:lightRig rig="flat" dir="t"/>
+        </a:scene3d>
+        <a:sp3d z="190500" extrusionH="12700" prstMaterial="plastic">
+          <a:bevelT w="50800" h="50800"/>
+        </a:sp3d>
       </dsp:spPr>
       <dsp:style>
-        <a:lnRef idx="2">
+        <a:lnRef idx="1">
           <a:scrgbClr r="0" g="0" b="0"/>
         </a:lnRef>
         <a:fillRef idx="1">
           <a:scrgbClr r="0" g="0" b="0"/>
         </a:fillRef>
-        <a:effectRef idx="0">
+        <a:effectRef idx="2">
           <a:scrgbClr r="0" g="0" b="0"/>
         </a:effectRef>
         <a:fontRef idx="minor"/>
@@ -3490,35 +4024,104 @@
         <a:prstGeom prst="roundRect">
           <a:avLst/>
         </a:prstGeom>
-        <a:solidFill>
-          <a:schemeClr val="accent1">
-            <a:hueOff val="0"/>
-            <a:satOff val="0"/>
-            <a:lumOff val="0"/>
-            <a:alphaOff val="0"/>
-          </a:schemeClr>
-        </a:solidFill>
-        <a:ln w="25400" cap="flat" cmpd="sng" algn="ctr">
-          <a:solidFill>
-            <a:schemeClr val="lt1">
-              <a:hueOff val="0"/>
-              <a:satOff val="0"/>
-              <a:lumOff val="0"/>
-              <a:alphaOff val="0"/>
-            </a:schemeClr>
-          </a:solidFill>
-          <a:prstDash val="solid"/>
+        <a:gradFill rotWithShape="0">
+          <a:gsLst>
+            <a:gs pos="0">
+              <a:schemeClr val="accent1">
+                <a:hueOff val="0"/>
+                <a:satOff val="0"/>
+                <a:lumOff val="0"/>
+                <a:alphaOff val="0"/>
+                <a:tint val="75000"/>
+                <a:shade val="85000"/>
+                <a:satMod val="230000"/>
+              </a:schemeClr>
+            </a:gs>
+            <a:gs pos="25000">
+              <a:schemeClr val="accent1">
+                <a:hueOff val="0"/>
+                <a:satOff val="0"/>
+                <a:lumOff val="0"/>
+                <a:alphaOff val="0"/>
+                <a:tint val="90000"/>
+                <a:shade val="70000"/>
+                <a:satMod val="220000"/>
+              </a:schemeClr>
+            </a:gs>
+            <a:gs pos="50000">
+              <a:schemeClr val="accent1">
+                <a:hueOff val="0"/>
+                <a:satOff val="0"/>
+                <a:lumOff val="0"/>
+                <a:alphaOff val="0"/>
+                <a:tint val="90000"/>
+                <a:shade val="58000"/>
+                <a:satMod val="225000"/>
+              </a:schemeClr>
+            </a:gs>
+            <a:gs pos="65000">
+              <a:schemeClr val="accent1">
+                <a:hueOff val="0"/>
+                <a:satOff val="0"/>
+                <a:lumOff val="0"/>
+                <a:alphaOff val="0"/>
+                <a:tint val="90000"/>
+                <a:shade val="58000"/>
+                <a:satMod val="225000"/>
+              </a:schemeClr>
+            </a:gs>
+            <a:gs pos="80000">
+              <a:schemeClr val="accent1">
+                <a:hueOff val="0"/>
+                <a:satOff val="0"/>
+                <a:lumOff val="0"/>
+                <a:alphaOff val="0"/>
+                <a:tint val="90000"/>
+                <a:shade val="69000"/>
+                <a:satMod val="220000"/>
+              </a:schemeClr>
+            </a:gs>
+            <a:gs pos="100000">
+              <a:schemeClr val="accent1">
+                <a:hueOff val="0"/>
+                <a:satOff val="0"/>
+                <a:lumOff val="0"/>
+                <a:alphaOff val="0"/>
+                <a:tint val="77000"/>
+                <a:shade val="80000"/>
+                <a:satMod val="230000"/>
+              </a:schemeClr>
+            </a:gs>
+          </a:gsLst>
+          <a:lin ang="5400000" scaled="1"/>
+        </a:gradFill>
+        <a:ln>
+          <a:noFill/>
         </a:ln>
-        <a:effectLst/>
+        <a:effectLst>
+          <a:outerShdw blurRad="76200" dist="50800" dir="5400000" rotWithShape="0">
+            <a:srgbClr val="4E3B30">
+              <a:alpha val="60000"/>
+            </a:srgbClr>
+          </a:outerShdw>
+        </a:effectLst>
+        <a:scene3d>
+          <a:camera prst="orthographicFront"/>
+          <a:lightRig rig="flat" dir="t"/>
+        </a:scene3d>
+        <a:sp3d prstMaterial="plastic">
+          <a:bevelT w="120900" h="88900"/>
+          <a:bevelB w="88900" h="31750" prst="angle"/>
+        </a:sp3d>
       </dsp:spPr>
       <dsp:style>
-        <a:lnRef idx="2">
+        <a:lnRef idx="0">
           <a:scrgbClr r="0" g="0" b="0"/>
         </a:lnRef>
-        <a:fillRef idx="1">
+        <a:fillRef idx="3">
           <a:scrgbClr r="0" g="0" b="0"/>
         </a:fillRef>
-        <a:effectRef idx="0">
+        <a:effectRef idx="2">
           <a:scrgbClr r="0" g="0" b="0"/>
         </a:effectRef>
         <a:fontRef idx="minor">
@@ -3543,10 +4146,18 @@
             </a:spcAft>
           </a:pPr>
           <a:r>
-            <a:rPr lang="pt-BR" sz="2000" kern="1200" dirty="0" smtClean="0"/>
+            <a:rPr lang="pt-BR" sz="2000" b="1" kern="1200" dirty="0" smtClean="0">
+              <a:solidFill>
+                <a:srgbClr val="7030A0"/>
+              </a:solidFill>
+            </a:rPr>
             <a:t>Controles de acadêmicos </a:t>
           </a:r>
-          <a:endParaRPr lang="pt-BR" sz="2000" kern="1200" dirty="0"/>
+          <a:endParaRPr lang="pt-BR" sz="2000" b="1" kern="1200" dirty="0">
+            <a:solidFill>
+              <a:srgbClr val="7030A0"/>
+            </a:solidFill>
+          </a:endParaRPr>
         </a:p>
       </dsp:txBody>
       <dsp:txXfrm>
@@ -3576,7 +4187,7 @@
             <a:alphaOff val="0"/>
           </a:schemeClr>
         </a:solidFill>
-        <a:ln w="25400" cap="flat" cmpd="sng" algn="ctr">
+        <a:ln w="10000" cap="flat" cmpd="sng" algn="ctr">
           <a:solidFill>
             <a:schemeClr val="accent1">
               <a:hueOff val="0"/>
@@ -3587,16 +4198,29 @@
           </a:solidFill>
           <a:prstDash val="solid"/>
         </a:ln>
-        <a:effectLst/>
+        <a:effectLst>
+          <a:outerShdw blurRad="76200" dist="50800" dir="5400000" rotWithShape="0">
+            <a:srgbClr val="4E3B30">
+              <a:alpha val="60000"/>
+            </a:srgbClr>
+          </a:outerShdw>
+        </a:effectLst>
+        <a:scene3d>
+          <a:camera prst="orthographicFront"/>
+          <a:lightRig rig="flat" dir="t"/>
+        </a:scene3d>
+        <a:sp3d z="190500" extrusionH="12700" prstMaterial="plastic">
+          <a:bevelT w="50800" h="50800"/>
+        </a:sp3d>
       </dsp:spPr>
       <dsp:style>
-        <a:lnRef idx="2">
+        <a:lnRef idx="1">
           <a:scrgbClr r="0" g="0" b="0"/>
         </a:lnRef>
         <a:fillRef idx="1">
           <a:scrgbClr r="0" g="0" b="0"/>
         </a:fillRef>
-        <a:effectRef idx="0">
+        <a:effectRef idx="2">
           <a:scrgbClr r="0" g="0" b="0"/>
         </a:effectRef>
         <a:fontRef idx="minor"/>
@@ -3615,35 +4239,104 @@
         <a:prstGeom prst="roundRect">
           <a:avLst/>
         </a:prstGeom>
-        <a:solidFill>
-          <a:schemeClr val="accent1">
-            <a:hueOff val="0"/>
-            <a:satOff val="0"/>
-            <a:lumOff val="0"/>
-            <a:alphaOff val="0"/>
-          </a:schemeClr>
-        </a:solidFill>
-        <a:ln w="25400" cap="flat" cmpd="sng" algn="ctr">
-          <a:solidFill>
-            <a:schemeClr val="lt1">
-              <a:hueOff val="0"/>
-              <a:satOff val="0"/>
-              <a:lumOff val="0"/>
-              <a:alphaOff val="0"/>
-            </a:schemeClr>
-          </a:solidFill>
-          <a:prstDash val="solid"/>
+        <a:gradFill rotWithShape="0">
+          <a:gsLst>
+            <a:gs pos="0">
+              <a:schemeClr val="accent1">
+                <a:hueOff val="0"/>
+                <a:satOff val="0"/>
+                <a:lumOff val="0"/>
+                <a:alphaOff val="0"/>
+                <a:tint val="75000"/>
+                <a:shade val="85000"/>
+                <a:satMod val="230000"/>
+              </a:schemeClr>
+            </a:gs>
+            <a:gs pos="25000">
+              <a:schemeClr val="accent1">
+                <a:hueOff val="0"/>
+                <a:satOff val="0"/>
+                <a:lumOff val="0"/>
+                <a:alphaOff val="0"/>
+                <a:tint val="90000"/>
+                <a:shade val="70000"/>
+                <a:satMod val="220000"/>
+              </a:schemeClr>
+            </a:gs>
+            <a:gs pos="50000">
+              <a:schemeClr val="accent1">
+                <a:hueOff val="0"/>
+                <a:satOff val="0"/>
+                <a:lumOff val="0"/>
+                <a:alphaOff val="0"/>
+                <a:tint val="90000"/>
+                <a:shade val="58000"/>
+                <a:satMod val="225000"/>
+              </a:schemeClr>
+            </a:gs>
+            <a:gs pos="65000">
+              <a:schemeClr val="accent1">
+                <a:hueOff val="0"/>
+                <a:satOff val="0"/>
+                <a:lumOff val="0"/>
+                <a:alphaOff val="0"/>
+                <a:tint val="90000"/>
+                <a:shade val="58000"/>
+                <a:satMod val="225000"/>
+              </a:schemeClr>
+            </a:gs>
+            <a:gs pos="80000">
+              <a:schemeClr val="accent1">
+                <a:hueOff val="0"/>
+                <a:satOff val="0"/>
+                <a:lumOff val="0"/>
+                <a:alphaOff val="0"/>
+                <a:tint val="90000"/>
+                <a:shade val="69000"/>
+                <a:satMod val="220000"/>
+              </a:schemeClr>
+            </a:gs>
+            <a:gs pos="100000">
+              <a:schemeClr val="accent1">
+                <a:hueOff val="0"/>
+                <a:satOff val="0"/>
+                <a:lumOff val="0"/>
+                <a:alphaOff val="0"/>
+                <a:tint val="77000"/>
+                <a:shade val="80000"/>
+                <a:satMod val="230000"/>
+              </a:schemeClr>
+            </a:gs>
+          </a:gsLst>
+          <a:lin ang="5400000" scaled="1"/>
+        </a:gradFill>
+        <a:ln>
+          <a:noFill/>
         </a:ln>
-        <a:effectLst/>
+        <a:effectLst>
+          <a:outerShdw blurRad="76200" dist="50800" dir="5400000" rotWithShape="0">
+            <a:srgbClr val="4E3B30">
+              <a:alpha val="60000"/>
+            </a:srgbClr>
+          </a:outerShdw>
+        </a:effectLst>
+        <a:scene3d>
+          <a:camera prst="orthographicFront"/>
+          <a:lightRig rig="flat" dir="t"/>
+        </a:scene3d>
+        <a:sp3d prstMaterial="plastic">
+          <a:bevelT w="120900" h="88900"/>
+          <a:bevelB w="88900" h="31750" prst="angle"/>
+        </a:sp3d>
       </dsp:spPr>
       <dsp:style>
-        <a:lnRef idx="2">
+        <a:lnRef idx="0">
           <a:scrgbClr r="0" g="0" b="0"/>
         </a:lnRef>
-        <a:fillRef idx="1">
+        <a:fillRef idx="3">
           <a:scrgbClr r="0" g="0" b="0"/>
         </a:fillRef>
-        <a:effectRef idx="0">
+        <a:effectRef idx="2">
           <a:scrgbClr r="0" g="0" b="0"/>
         </a:effectRef>
         <a:fontRef idx="minor">
@@ -3668,10 +4361,18 @@
             </a:spcAft>
           </a:pPr>
           <a:r>
-            <a:rPr lang="pt-BR" sz="2000" kern="1200" dirty="0" smtClean="0"/>
+            <a:rPr lang="pt-BR" sz="2000" b="1" kern="1200" dirty="0" smtClean="0">
+              <a:solidFill>
+                <a:srgbClr val="7030A0"/>
+              </a:solidFill>
+            </a:rPr>
             <a:t>Controles financeiros</a:t>
           </a:r>
-          <a:endParaRPr lang="pt-BR" sz="2000" kern="1200" dirty="0"/>
+          <a:endParaRPr lang="pt-BR" sz="2000" b="1" kern="1200" dirty="0">
+            <a:solidFill>
+              <a:srgbClr val="7030A0"/>
+            </a:solidFill>
+          </a:endParaRPr>
         </a:p>
       </dsp:txBody>
       <dsp:txXfrm>
@@ -3701,7 +4402,7 @@
             <a:alphaOff val="0"/>
           </a:schemeClr>
         </a:solidFill>
-        <a:ln w="25400" cap="flat" cmpd="sng" algn="ctr">
+        <a:ln w="10000" cap="flat" cmpd="sng" algn="ctr">
           <a:solidFill>
             <a:schemeClr val="accent1">
               <a:hueOff val="0"/>
@@ -3712,16 +4413,29 @@
           </a:solidFill>
           <a:prstDash val="solid"/>
         </a:ln>
-        <a:effectLst/>
+        <a:effectLst>
+          <a:outerShdw blurRad="76200" dist="50800" dir="5400000" rotWithShape="0">
+            <a:srgbClr val="4E3B30">
+              <a:alpha val="60000"/>
+            </a:srgbClr>
+          </a:outerShdw>
+        </a:effectLst>
+        <a:scene3d>
+          <a:camera prst="orthographicFront"/>
+          <a:lightRig rig="flat" dir="t"/>
+        </a:scene3d>
+        <a:sp3d z="190500" extrusionH="12700" prstMaterial="plastic">
+          <a:bevelT w="50800" h="50800"/>
+        </a:sp3d>
       </dsp:spPr>
       <dsp:style>
-        <a:lnRef idx="2">
+        <a:lnRef idx="1">
           <a:scrgbClr r="0" g="0" b="0"/>
         </a:lnRef>
         <a:fillRef idx="1">
           <a:scrgbClr r="0" g="0" b="0"/>
         </a:fillRef>
-        <a:effectRef idx="0">
+        <a:effectRef idx="2">
           <a:scrgbClr r="0" g="0" b="0"/>
         </a:effectRef>
         <a:fontRef idx="minor"/>
@@ -3740,35 +4454,104 @@
         <a:prstGeom prst="roundRect">
           <a:avLst/>
         </a:prstGeom>
-        <a:solidFill>
-          <a:schemeClr val="accent1">
-            <a:hueOff val="0"/>
-            <a:satOff val="0"/>
-            <a:lumOff val="0"/>
-            <a:alphaOff val="0"/>
-          </a:schemeClr>
-        </a:solidFill>
-        <a:ln w="25400" cap="flat" cmpd="sng" algn="ctr">
-          <a:solidFill>
-            <a:schemeClr val="lt1">
-              <a:hueOff val="0"/>
-              <a:satOff val="0"/>
-              <a:lumOff val="0"/>
-              <a:alphaOff val="0"/>
-            </a:schemeClr>
-          </a:solidFill>
-          <a:prstDash val="solid"/>
+        <a:gradFill rotWithShape="0">
+          <a:gsLst>
+            <a:gs pos="0">
+              <a:schemeClr val="accent1">
+                <a:hueOff val="0"/>
+                <a:satOff val="0"/>
+                <a:lumOff val="0"/>
+                <a:alphaOff val="0"/>
+                <a:tint val="75000"/>
+                <a:shade val="85000"/>
+                <a:satMod val="230000"/>
+              </a:schemeClr>
+            </a:gs>
+            <a:gs pos="25000">
+              <a:schemeClr val="accent1">
+                <a:hueOff val="0"/>
+                <a:satOff val="0"/>
+                <a:lumOff val="0"/>
+                <a:alphaOff val="0"/>
+                <a:tint val="90000"/>
+                <a:shade val="70000"/>
+                <a:satMod val="220000"/>
+              </a:schemeClr>
+            </a:gs>
+            <a:gs pos="50000">
+              <a:schemeClr val="accent1">
+                <a:hueOff val="0"/>
+                <a:satOff val="0"/>
+                <a:lumOff val="0"/>
+                <a:alphaOff val="0"/>
+                <a:tint val="90000"/>
+                <a:shade val="58000"/>
+                <a:satMod val="225000"/>
+              </a:schemeClr>
+            </a:gs>
+            <a:gs pos="65000">
+              <a:schemeClr val="accent1">
+                <a:hueOff val="0"/>
+                <a:satOff val="0"/>
+                <a:lumOff val="0"/>
+                <a:alphaOff val="0"/>
+                <a:tint val="90000"/>
+                <a:shade val="58000"/>
+                <a:satMod val="225000"/>
+              </a:schemeClr>
+            </a:gs>
+            <a:gs pos="80000">
+              <a:schemeClr val="accent1">
+                <a:hueOff val="0"/>
+                <a:satOff val="0"/>
+                <a:lumOff val="0"/>
+                <a:alphaOff val="0"/>
+                <a:tint val="90000"/>
+                <a:shade val="69000"/>
+                <a:satMod val="220000"/>
+              </a:schemeClr>
+            </a:gs>
+            <a:gs pos="100000">
+              <a:schemeClr val="accent1">
+                <a:hueOff val="0"/>
+                <a:satOff val="0"/>
+                <a:lumOff val="0"/>
+                <a:alphaOff val="0"/>
+                <a:tint val="77000"/>
+                <a:shade val="80000"/>
+                <a:satMod val="230000"/>
+              </a:schemeClr>
+            </a:gs>
+          </a:gsLst>
+          <a:lin ang="5400000" scaled="1"/>
+        </a:gradFill>
+        <a:ln>
+          <a:noFill/>
         </a:ln>
-        <a:effectLst/>
+        <a:effectLst>
+          <a:outerShdw blurRad="76200" dist="50800" dir="5400000" rotWithShape="0">
+            <a:srgbClr val="4E3B30">
+              <a:alpha val="60000"/>
+            </a:srgbClr>
+          </a:outerShdw>
+        </a:effectLst>
+        <a:scene3d>
+          <a:camera prst="orthographicFront"/>
+          <a:lightRig rig="flat" dir="t"/>
+        </a:scene3d>
+        <a:sp3d prstMaterial="plastic">
+          <a:bevelT w="120900" h="88900"/>
+          <a:bevelB w="88900" h="31750" prst="angle"/>
+        </a:sp3d>
       </dsp:spPr>
       <dsp:style>
-        <a:lnRef idx="2">
+        <a:lnRef idx="0">
           <a:scrgbClr r="0" g="0" b="0"/>
         </a:lnRef>
-        <a:fillRef idx="1">
+        <a:fillRef idx="3">
           <a:scrgbClr r="0" g="0" b="0"/>
         </a:fillRef>
-        <a:effectRef idx="0">
+        <a:effectRef idx="2">
           <a:scrgbClr r="0" g="0" b="0"/>
         </a:effectRef>
         <a:fontRef idx="minor">
@@ -3793,10 +4576,18 @@
             </a:spcAft>
           </a:pPr>
           <a:r>
-            <a:rPr lang="pt-BR" sz="2000" kern="1200" dirty="0" smtClean="0"/>
+            <a:rPr lang="pt-BR" sz="2000" b="1" kern="1200" dirty="0" smtClean="0">
+              <a:solidFill>
+                <a:srgbClr val="7030A0"/>
+              </a:solidFill>
+            </a:rPr>
             <a:t>Controle de contas a pagar</a:t>
           </a:r>
-          <a:endParaRPr lang="pt-BR" sz="2000" kern="1200" dirty="0"/>
+          <a:endParaRPr lang="pt-BR" sz="2000" b="1" kern="1200" dirty="0">
+            <a:solidFill>
+              <a:srgbClr val="7030A0"/>
+            </a:solidFill>
+          </a:endParaRPr>
         </a:p>
       </dsp:txBody>
       <dsp:txXfrm>
@@ -3823,17 +4614,61 @@
       </dsp:nvSpPr>
       <dsp:spPr>
         <a:xfrm>
-          <a:off x="3739" y="1284064"/>
-          <a:ext cx="2373731" cy="1957832"/>
+          <a:off x="3739" y="1495569"/>
+          <a:ext cx="2373731" cy="1534822"/>
         </a:xfrm>
         <a:prstGeom prst="roundRect">
           <a:avLst>
             <a:gd name="adj" fmla="val 10000"/>
           </a:avLst>
         </a:prstGeom>
-        <a:solidFill>
-          <a:srgbClr val="C00000"/>
-        </a:solidFill>
+        <a:gradFill rotWithShape="1">
+          <a:gsLst>
+            <a:gs pos="0">
+              <a:schemeClr val="accent3">
+                <a:tint val="75000"/>
+                <a:shade val="85000"/>
+                <a:satMod val="230000"/>
+              </a:schemeClr>
+            </a:gs>
+            <a:gs pos="25000">
+              <a:schemeClr val="accent3">
+                <a:tint val="90000"/>
+                <a:shade val="70000"/>
+                <a:satMod val="220000"/>
+              </a:schemeClr>
+            </a:gs>
+            <a:gs pos="50000">
+              <a:schemeClr val="accent3">
+                <a:tint val="90000"/>
+                <a:shade val="58000"/>
+                <a:satMod val="225000"/>
+              </a:schemeClr>
+            </a:gs>
+            <a:gs pos="65000">
+              <a:schemeClr val="accent3">
+                <a:tint val="90000"/>
+                <a:shade val="58000"/>
+                <a:satMod val="225000"/>
+              </a:schemeClr>
+            </a:gs>
+            <a:gs pos="80000">
+              <a:schemeClr val="accent3">
+                <a:tint val="90000"/>
+                <a:shade val="69000"/>
+                <a:satMod val="220000"/>
+              </a:schemeClr>
+            </a:gs>
+            <a:gs pos="100000">
+              <a:schemeClr val="accent3">
+                <a:tint val="77000"/>
+                <a:shade val="80000"/>
+                <a:satMod val="230000"/>
+              </a:schemeClr>
+            </a:gs>
+          </a:gsLst>
+          <a:lin ang="5400000" scaled="1"/>
+        </a:gradFill>
         <a:ln w="10000" cap="flat" cmpd="sng" algn="ctr">
           <a:solidFill>
             <a:schemeClr val="accent3"/>
@@ -3841,7 +4676,11 @@
           <a:prstDash val="solid"/>
         </a:ln>
         <a:effectLst>
-          <a:reflection blurRad="6350" stA="52000" endA="300" endPos="35000" dir="5400000" sy="-100000" algn="bl" rotWithShape="0"/>
+          <a:outerShdw blurRad="76200" dist="50800" dir="5400000" rotWithShape="0">
+            <a:srgbClr val="4E3B30">
+              <a:alpha val="60000"/>
+            </a:srgbClr>
+          </a:outerShdw>
         </a:effectLst>
         <a:scene3d>
           <a:camera prst="orthographicFront"/>
@@ -3883,30 +4722,49 @@
             </a:spcAft>
             <a:buChar char="••"/>
           </a:pPr>
+          <a:endParaRPr lang="pt-BR" sz="1600" b="1" kern="1200" dirty="0">
+            <a:solidFill>
+              <a:schemeClr val="bg1">
+                <a:lumMod val="85000"/>
+              </a:schemeClr>
+            </a:solidFill>
+          </a:endParaRPr>
+        </a:p>
+        <a:p>
+          <a:pPr marL="171450" lvl="1" indent="-171450" algn="l" defTabSz="711200">
+            <a:lnSpc>
+              <a:spcPct val="90000"/>
+            </a:lnSpc>
+            <a:spcBef>
+              <a:spcPct val="0"/>
+            </a:spcBef>
+            <a:spcAft>
+              <a:spcPct val="15000"/>
+            </a:spcAft>
+            <a:buChar char="••"/>
+          </a:pPr>
           <a:r>
             <a:rPr lang="pt-BR" sz="1600" b="1" kern="1200" dirty="0" smtClean="0">
               <a:solidFill>
-                <a:schemeClr val="accent6">
-                  <a:lumMod val="60000"/>
-                  <a:lumOff val="40000"/>
+                <a:schemeClr val="bg1">
+                  <a:lumMod val="85000"/>
                 </a:schemeClr>
               </a:solidFill>
             </a:rPr>
-            <a:t>Ambiente de servidor</a:t>
+            <a:t>Ambiente de servidor de dados</a:t>
           </a:r>
           <a:endParaRPr lang="pt-BR" sz="1600" b="1" kern="1200" dirty="0">
             <a:solidFill>
-              <a:schemeClr val="accent6">
-                <a:lumMod val="60000"/>
-                <a:lumOff val="40000"/>
+              <a:schemeClr val="bg1">
+                <a:lumMod val="85000"/>
               </a:schemeClr>
             </a:solidFill>
           </a:endParaRPr>
         </a:p>
       </dsp:txBody>
       <dsp:txXfrm>
-        <a:off x="3739" y="1284064"/>
-        <a:ext cx="2373731" cy="1538296"/>
+        <a:off x="3739" y="1495569"/>
+        <a:ext cx="2373731" cy="1205932"/>
       </dsp:txXfrm>
     </dsp:sp>
     <dsp:sp modelId="{BB47B8A7-A69A-47BA-8429-499D75D98923}">
@@ -3916,17 +4774,11 @@
       </dsp:nvSpPr>
       <dsp:spPr>
         <a:xfrm>
-          <a:off x="1340670" y="1760974"/>
-          <a:ext cx="2602103" cy="2602103"/>
+          <a:off x="5131256" y="4463843"/>
+          <a:ext cx="66552" cy="124236"/>
         </a:xfrm>
-        <a:prstGeom prst="leftCircularArrow">
-          <a:avLst>
-            <a:gd name="adj1" fmla="val 3095"/>
-            <a:gd name="adj2" fmla="val 380284"/>
-            <a:gd name="adj3" fmla="val 2155794"/>
-            <a:gd name="adj4" fmla="val 9024489"/>
-            <a:gd name="adj5" fmla="val 3610"/>
-          </a:avLst>
+        <a:prstGeom prst="mathMultiply">
+          <a:avLst/>
         </a:prstGeom>
         <a:gradFill rotWithShape="0">
           <a:gsLst>
@@ -4046,8 +4898,8 @@
       </dsp:nvSpPr>
       <dsp:spPr>
         <a:xfrm>
-          <a:off x="531235" y="2822361"/>
-          <a:ext cx="2109983" cy="839070"/>
+          <a:off x="450782" y="938731"/>
+          <a:ext cx="2109983" cy="657781"/>
         </a:xfrm>
         <a:prstGeom prst="roundRect">
           <a:avLst>
@@ -4140,12 +4992,12 @@
         </a:fontRef>
       </dsp:style>
       <dsp:txBody>
-        <a:bodyPr spcFirstLastPara="0" vert="horz" wrap="square" lIns="38100" tIns="25400" rIns="38100" bIns="25400" numCol="1" spcCol="1270" anchor="ctr" anchorCtr="0">
+        <a:bodyPr spcFirstLastPara="0" vert="horz" wrap="square" lIns="30480" tIns="20320" rIns="30480" bIns="20320" numCol="1" spcCol="1270" anchor="ctr" anchorCtr="0">
           <a:noAutofit/>
         </a:bodyPr>
         <a:lstStyle/>
         <a:p>
-          <a:pPr lvl="0" algn="ctr" defTabSz="889000">
+          <a:pPr lvl="0" algn="ctr" defTabSz="711200">
             <a:lnSpc>
               <a:spcPct val="90000"/>
             </a:lnSpc>
@@ -4157,14 +5009,14 @@
             </a:spcAft>
           </a:pPr>
           <a:r>
-            <a:rPr lang="pt-BR" sz="2000" b="1" kern="1200" dirty="0" smtClean="0">
+            <a:rPr lang="pt-BR" sz="1600" b="1" kern="1200" dirty="0" smtClean="0">
               <a:solidFill>
                 <a:srgbClr val="0070C0"/>
               </a:solidFill>
             </a:rPr>
             <a:t>Base de dados </a:t>
           </a:r>
-          <a:endParaRPr lang="pt-BR" sz="2000" b="1" kern="1200" dirty="0">
+          <a:endParaRPr lang="pt-BR" sz="1600" b="1" kern="1200" dirty="0">
             <a:solidFill>
               <a:srgbClr val="0070C0"/>
             </a:solidFill>
@@ -4172,8 +5024,8 @@
         </a:p>
       </dsp:txBody>
       <dsp:txXfrm>
-        <a:off x="531235" y="2822361"/>
-        <a:ext cx="2109983" cy="839070"/>
+        <a:off x="450782" y="938731"/>
+        <a:ext cx="2109983" cy="657781"/>
       </dsp:txXfrm>
     </dsp:sp>
     <dsp:sp modelId="{0C27C69B-3C82-4A7E-9AEC-146B678149A2}">
@@ -4183,17 +5035,61 @@
       </dsp:nvSpPr>
       <dsp:spPr>
         <a:xfrm>
-          <a:off x="3024660" y="1284064"/>
-          <a:ext cx="2373731" cy="1957832"/>
+          <a:off x="3024660" y="1495569"/>
+          <a:ext cx="2373731" cy="1534822"/>
         </a:xfrm>
         <a:prstGeom prst="roundRect">
           <a:avLst>
             <a:gd name="adj" fmla="val 10000"/>
           </a:avLst>
         </a:prstGeom>
-        <a:solidFill>
-          <a:srgbClr val="C00000"/>
-        </a:solidFill>
+        <a:gradFill rotWithShape="1">
+          <a:gsLst>
+            <a:gs pos="0">
+              <a:schemeClr val="accent3">
+                <a:tint val="75000"/>
+                <a:shade val="85000"/>
+                <a:satMod val="230000"/>
+              </a:schemeClr>
+            </a:gs>
+            <a:gs pos="25000">
+              <a:schemeClr val="accent3">
+                <a:tint val="90000"/>
+                <a:shade val="70000"/>
+                <a:satMod val="220000"/>
+              </a:schemeClr>
+            </a:gs>
+            <a:gs pos="50000">
+              <a:schemeClr val="accent3">
+                <a:tint val="90000"/>
+                <a:shade val="58000"/>
+                <a:satMod val="225000"/>
+              </a:schemeClr>
+            </a:gs>
+            <a:gs pos="65000">
+              <a:schemeClr val="accent3">
+                <a:tint val="90000"/>
+                <a:shade val="58000"/>
+                <a:satMod val="225000"/>
+              </a:schemeClr>
+            </a:gs>
+            <a:gs pos="80000">
+              <a:schemeClr val="accent3">
+                <a:tint val="90000"/>
+                <a:shade val="69000"/>
+                <a:satMod val="220000"/>
+              </a:schemeClr>
+            </a:gs>
+            <a:gs pos="100000">
+              <a:schemeClr val="accent3">
+                <a:tint val="77000"/>
+                <a:shade val="80000"/>
+                <a:satMod val="230000"/>
+              </a:schemeClr>
+            </a:gs>
+          </a:gsLst>
+          <a:lin ang="5400000" scaled="1"/>
+        </a:gradFill>
         <a:ln w="10000" cap="flat" cmpd="sng" algn="ctr">
           <a:solidFill>
             <a:schemeClr val="accent3"/>
@@ -4201,7 +5097,11 @@
           <a:prstDash val="solid"/>
         </a:ln>
         <a:effectLst>
-          <a:reflection blurRad="6350" stA="52000" endA="300" endPos="35000" dir="5400000" sy="-100000" algn="bl" rotWithShape="0"/>
+          <a:outerShdw blurRad="76200" dist="50800" dir="5400000" rotWithShape="0">
+            <a:srgbClr val="4E3B30">
+              <a:alpha val="60000"/>
+            </a:srgbClr>
+          </a:outerShdw>
         </a:effectLst>
         <a:scene3d>
           <a:camera prst="orthographicFront"/>
@@ -4243,71 +5143,28 @@
             </a:spcAft>
             <a:buChar char="••"/>
           </a:pPr>
-          <a:endParaRPr lang="pt-BR" sz="1600" b="1" kern="1200" dirty="0">
-            <a:solidFill>
-              <a:srgbClr val="0070C0"/>
-            </a:solidFill>
-          </a:endParaRPr>
-        </a:p>
-        <a:p>
-          <a:pPr marL="171450" lvl="1" indent="-171450" algn="l" defTabSz="711200">
-            <a:lnSpc>
-              <a:spcPct val="90000"/>
-            </a:lnSpc>
-            <a:spcBef>
-              <a:spcPct val="0"/>
-            </a:spcBef>
-            <a:spcAft>
-              <a:spcPct val="15000"/>
-            </a:spcAft>
-            <a:buChar char="••"/>
-          </a:pPr>
-          <a:endParaRPr lang="pt-BR" sz="1600" b="1" kern="1200" dirty="0">
-            <a:solidFill>
-              <a:schemeClr val="accent6">
-                <a:lumMod val="60000"/>
-                <a:lumOff val="40000"/>
-              </a:schemeClr>
-            </a:solidFill>
-          </a:endParaRPr>
-        </a:p>
-        <a:p>
-          <a:pPr marL="171450" lvl="1" indent="-171450" algn="l" defTabSz="711200">
-            <a:lnSpc>
-              <a:spcPct val="90000"/>
-            </a:lnSpc>
-            <a:spcBef>
-              <a:spcPct val="0"/>
-            </a:spcBef>
-            <a:spcAft>
-              <a:spcPct val="15000"/>
-            </a:spcAft>
-            <a:buChar char="••"/>
-          </a:pPr>
           <a:r>
             <a:rPr lang="pt-BR" sz="1600" b="1" kern="1200" dirty="0" smtClean="0">
               <a:solidFill>
-                <a:schemeClr val="accent6">
-                  <a:lumMod val="60000"/>
-                  <a:lumOff val="40000"/>
+                <a:schemeClr val="bg1">
+                  <a:lumMod val="85000"/>
                 </a:schemeClr>
               </a:solidFill>
             </a:rPr>
-            <a:t>Processamento de solicitações de usuários</a:t>
+            <a:t>Processa de solicitações de usuário</a:t>
           </a:r>
           <a:endParaRPr lang="pt-BR" sz="1600" b="1" kern="1200" dirty="0">
             <a:solidFill>
-              <a:schemeClr val="accent6">
-                <a:lumMod val="60000"/>
-                <a:lumOff val="40000"/>
+              <a:schemeClr val="bg1">
+                <a:lumMod val="85000"/>
               </a:schemeClr>
             </a:solidFill>
           </a:endParaRPr>
         </a:p>
       </dsp:txBody>
       <dsp:txXfrm>
-        <a:off x="3024660" y="1703600"/>
-        <a:ext cx="2373731" cy="1538296"/>
+        <a:off x="3024660" y="1824460"/>
+        <a:ext cx="2373731" cy="1205932"/>
       </dsp:txXfrm>
     </dsp:sp>
     <dsp:sp modelId="{E5E8036A-476D-4F9C-9D7B-4ED08A33C842}">
@@ -4316,17 +5173,17 @@
         <dsp:cNvSpPr/>
       </dsp:nvSpPr>
       <dsp:spPr>
-        <a:xfrm>
-          <a:off x="4341809" y="86118"/>
-          <a:ext cx="2905414" cy="2905414"/>
+        <a:xfrm flipV="1">
+          <a:off x="2841986" y="2561983"/>
+          <a:ext cx="40045" cy="553960"/>
         </a:xfrm>
-        <a:prstGeom prst="circularArrow">
+        <a:prstGeom prst="leftCircularArrow">
           <a:avLst>
-            <a:gd name="adj1" fmla="val 2771"/>
-            <a:gd name="adj2" fmla="val 338012"/>
-            <a:gd name="adj3" fmla="val 19486478"/>
-            <a:gd name="adj4" fmla="val 12575511"/>
-            <a:gd name="adj5" fmla="val 3233"/>
+            <a:gd name="adj1" fmla="val 2688"/>
+            <a:gd name="adj2" fmla="val 327245"/>
+            <a:gd name="adj3" fmla="val 19397459"/>
+            <a:gd name="adj4" fmla="val 12475726"/>
+            <a:gd name="adj5" fmla="val 3136"/>
           </a:avLst>
         </a:prstGeom>
         <a:gradFill rotWithShape="0">
@@ -4447,8 +5304,8 @@
       </dsp:nvSpPr>
       <dsp:spPr>
         <a:xfrm>
-          <a:off x="3552156" y="864529"/>
-          <a:ext cx="2109983" cy="839070"/>
+          <a:off x="3475120" y="938736"/>
+          <a:ext cx="2109983" cy="657781"/>
         </a:xfrm>
         <a:prstGeom prst="roundRect">
           <a:avLst>
@@ -4541,12 +5398,12 @@
         </a:fontRef>
       </dsp:style>
       <dsp:txBody>
-        <a:bodyPr spcFirstLastPara="0" vert="horz" wrap="square" lIns="38100" tIns="25400" rIns="38100" bIns="25400" numCol="1" spcCol="1270" anchor="ctr" anchorCtr="0">
+        <a:bodyPr spcFirstLastPara="0" vert="horz" wrap="square" lIns="30480" tIns="20320" rIns="30480" bIns="20320" numCol="1" spcCol="1270" anchor="ctr" anchorCtr="0">
           <a:noAutofit/>
         </a:bodyPr>
         <a:lstStyle/>
         <a:p>
-          <a:pPr lvl="0" algn="ctr" defTabSz="889000">
+          <a:pPr lvl="0" algn="ctr" defTabSz="711200">
             <a:lnSpc>
               <a:spcPct val="90000"/>
             </a:lnSpc>
@@ -4558,14 +5415,14 @@
             </a:spcAft>
           </a:pPr>
           <a:r>
-            <a:rPr lang="pt-BR" sz="2000" b="1" kern="1200" dirty="0" smtClean="0">
+            <a:rPr lang="pt-BR" sz="1600" b="1" kern="1200" dirty="0" smtClean="0">
               <a:solidFill>
                 <a:srgbClr val="0070C0"/>
               </a:solidFill>
             </a:rPr>
             <a:t>Aplicação</a:t>
           </a:r>
-          <a:endParaRPr lang="pt-BR" sz="2000" b="1" kern="1200" dirty="0">
+          <a:endParaRPr lang="pt-BR" sz="1600" b="1" kern="1200" dirty="0">
             <a:solidFill>
               <a:srgbClr val="0070C0"/>
             </a:solidFill>
@@ -4573,8 +5430,8 @@
         </a:p>
       </dsp:txBody>
       <dsp:txXfrm>
-        <a:off x="3552156" y="864529"/>
-        <a:ext cx="2109983" cy="839070"/>
+        <a:off x="3475120" y="938736"/>
+        <a:ext cx="2109983" cy="657781"/>
       </dsp:txXfrm>
     </dsp:sp>
     <dsp:sp modelId="{AE566E9F-D101-4F88-9692-208EF2AE8557}">
@@ -4584,17 +5441,61 @@
       </dsp:nvSpPr>
       <dsp:spPr>
         <a:xfrm>
-          <a:off x="6045580" y="1284064"/>
-          <a:ext cx="2373731" cy="1957832"/>
+          <a:off x="6045580" y="1495569"/>
+          <a:ext cx="2373731" cy="1534822"/>
         </a:xfrm>
         <a:prstGeom prst="roundRect">
           <a:avLst>
             <a:gd name="adj" fmla="val 10000"/>
           </a:avLst>
         </a:prstGeom>
-        <a:solidFill>
-          <a:srgbClr val="C00000"/>
-        </a:solidFill>
+        <a:gradFill rotWithShape="1">
+          <a:gsLst>
+            <a:gs pos="0">
+              <a:schemeClr val="accent3">
+                <a:tint val="75000"/>
+                <a:shade val="85000"/>
+                <a:satMod val="230000"/>
+              </a:schemeClr>
+            </a:gs>
+            <a:gs pos="25000">
+              <a:schemeClr val="accent3">
+                <a:tint val="90000"/>
+                <a:shade val="70000"/>
+                <a:satMod val="220000"/>
+              </a:schemeClr>
+            </a:gs>
+            <a:gs pos="50000">
+              <a:schemeClr val="accent3">
+                <a:tint val="90000"/>
+                <a:shade val="58000"/>
+                <a:satMod val="225000"/>
+              </a:schemeClr>
+            </a:gs>
+            <a:gs pos="65000">
+              <a:schemeClr val="accent3">
+                <a:tint val="90000"/>
+                <a:shade val="58000"/>
+                <a:satMod val="225000"/>
+              </a:schemeClr>
+            </a:gs>
+            <a:gs pos="80000">
+              <a:schemeClr val="accent3">
+                <a:tint val="90000"/>
+                <a:shade val="69000"/>
+                <a:satMod val="220000"/>
+              </a:schemeClr>
+            </a:gs>
+            <a:gs pos="100000">
+              <a:schemeClr val="accent3">
+                <a:tint val="77000"/>
+                <a:shade val="80000"/>
+                <a:satMod val="230000"/>
+              </a:schemeClr>
+            </a:gs>
+          </a:gsLst>
+          <a:lin ang="5400000" scaled="1"/>
+        </a:gradFill>
         <a:ln w="10000" cap="flat" cmpd="sng" algn="ctr">
           <a:solidFill>
             <a:schemeClr val="accent3"/>
@@ -4602,7 +5503,11 @@
           <a:prstDash val="solid"/>
         </a:ln>
         <a:effectLst>
-          <a:reflection blurRad="6350" stA="52000" endA="300" endPos="35000" dir="5400000" sy="-100000" algn="bl" rotWithShape="0"/>
+          <a:outerShdw blurRad="76200" dist="50800" dir="5400000" rotWithShape="0">
+            <a:srgbClr val="4E3B30">
+              <a:alpha val="60000"/>
+            </a:srgbClr>
+          </a:outerShdw>
         </a:effectLst>
         <a:scene3d>
           <a:camera prst="orthographicFront"/>
@@ -4644,30 +5549,49 @@
             </a:spcAft>
             <a:buChar char="••"/>
           </a:pPr>
+          <a:endParaRPr lang="pt-BR" sz="1600" b="1" kern="1200" dirty="0">
+            <a:solidFill>
+              <a:schemeClr val="bg1">
+                <a:lumMod val="85000"/>
+              </a:schemeClr>
+            </a:solidFill>
+          </a:endParaRPr>
+        </a:p>
+        <a:p>
+          <a:pPr marL="171450" lvl="1" indent="-171450" algn="l" defTabSz="711200">
+            <a:lnSpc>
+              <a:spcPct val="90000"/>
+            </a:lnSpc>
+            <a:spcBef>
+              <a:spcPct val="0"/>
+            </a:spcBef>
+            <a:spcAft>
+              <a:spcPct val="15000"/>
+            </a:spcAft>
+            <a:buChar char="••"/>
+          </a:pPr>
           <a:r>
             <a:rPr lang="pt-BR" sz="1600" b="1" kern="1200" dirty="0" smtClean="0">
               <a:solidFill>
-                <a:schemeClr val="accent6">
-                  <a:lumMod val="60000"/>
-                  <a:lumOff val="40000"/>
+                <a:schemeClr val="bg1">
+                  <a:lumMod val="85000"/>
                 </a:schemeClr>
               </a:solidFill>
             </a:rPr>
-            <a:t>Dispositivo de acesso do usuário</a:t>
+            <a:t>Dispositivo de conexão com sistema</a:t>
           </a:r>
           <a:endParaRPr lang="pt-BR" sz="1600" b="1" kern="1200" dirty="0">
             <a:solidFill>
-              <a:schemeClr val="accent6">
-                <a:lumMod val="60000"/>
-                <a:lumOff val="40000"/>
+              <a:schemeClr val="bg1">
+                <a:lumMod val="85000"/>
               </a:schemeClr>
             </a:solidFill>
           </a:endParaRPr>
         </a:p>
       </dsp:txBody>
       <dsp:txXfrm>
-        <a:off x="6045580" y="1284064"/>
-        <a:ext cx="2373731" cy="1538296"/>
+        <a:off x="6045580" y="1495569"/>
+        <a:ext cx="2373731" cy="1205932"/>
       </dsp:txXfrm>
     </dsp:sp>
     <dsp:sp modelId="{301F9B7A-61FD-4D71-8D0E-DCB457B0DAC9}">
@@ -4677,8 +5601,8 @@
       </dsp:nvSpPr>
       <dsp:spPr>
         <a:xfrm>
-          <a:off x="6573076" y="2822361"/>
-          <a:ext cx="2109983" cy="839070"/>
+          <a:off x="6499438" y="938731"/>
+          <a:ext cx="2109983" cy="657781"/>
         </a:xfrm>
         <a:prstGeom prst="roundRect">
           <a:avLst>
@@ -4771,12 +5695,12 @@
         </a:fontRef>
       </dsp:style>
       <dsp:txBody>
-        <a:bodyPr spcFirstLastPara="0" vert="horz" wrap="square" lIns="38100" tIns="25400" rIns="38100" bIns="25400" numCol="1" spcCol="1270" anchor="ctr" anchorCtr="0">
+        <a:bodyPr spcFirstLastPara="0" vert="horz" wrap="square" lIns="30480" tIns="20320" rIns="30480" bIns="20320" numCol="1" spcCol="1270" anchor="ctr" anchorCtr="0">
           <a:noAutofit/>
         </a:bodyPr>
         <a:lstStyle/>
         <a:p>
-          <a:pPr lvl="0" algn="ctr" defTabSz="889000">
+          <a:pPr lvl="0" algn="ctr" defTabSz="711200">
             <a:lnSpc>
               <a:spcPct val="90000"/>
             </a:lnSpc>
@@ -4788,14 +5712,14 @@
             </a:spcAft>
           </a:pPr>
           <a:r>
-            <a:rPr lang="pt-BR" sz="2000" b="1" kern="1200" dirty="0" smtClean="0">
+            <a:rPr lang="pt-BR" sz="1600" b="1" kern="1200" dirty="0" smtClean="0">
               <a:solidFill>
                 <a:srgbClr val="0070C0"/>
               </a:solidFill>
             </a:rPr>
             <a:t>Usuário</a:t>
           </a:r>
-          <a:endParaRPr lang="pt-BR" sz="2000" b="1" kern="1200" dirty="0">
+          <a:endParaRPr lang="pt-BR" sz="1600" b="1" kern="1200" dirty="0">
             <a:solidFill>
               <a:srgbClr val="0070C0"/>
             </a:solidFill>
@@ -4803,8 +5727,8 @@
         </a:p>
       </dsp:txBody>
       <dsp:txXfrm>
-        <a:off x="6573076" y="2822361"/>
-        <a:ext cx="2109983" cy="839070"/>
+        <a:off x="6499438" y="938731"/>
+        <a:ext cx="2109983" cy="657781"/>
       </dsp:txXfrm>
     </dsp:sp>
   </dsp:spTree>
@@ -5581,11 +6505,11 @@
 </file>
 
 <file path=ppt/diagrams/quickStyle1.xml><?xml version="1.0" encoding="utf-8"?>
-<dgm:styleDef xmlns:dgm="http://schemas.openxmlformats.org/drawingml/2006/diagram" xmlns:a="http://schemas.openxmlformats.org/drawingml/2006/main" uniqueId="urn:microsoft.com/office/officeart/2005/8/quickstyle/simple1">
+<dgm:styleDef xmlns:dgm="http://schemas.openxmlformats.org/drawingml/2006/diagram" xmlns:a="http://schemas.openxmlformats.org/drawingml/2006/main" uniqueId="urn:microsoft.com/office/officeart/2005/8/quickstyle/3d1">
   <dgm:title val=""/>
   <dgm:desc val=""/>
   <dgm:catLst>
-    <dgm:cat type="simple" pri="10100"/>
+    <dgm:cat type="3D" pri="11100"/>
   </dgm:catLst>
   <dgm:scene3d>
     <a:camera prst="orthographicFront"/>
@@ -5594,18 +6518,21 @@
   <dgm:styleLbl name="node0">
     <dgm:scene3d>
       <a:camera prst="orthographicFront"/>
-      <a:lightRig rig="threePt" dir="t"/>
+      <a:lightRig rig="flat" dir="t"/>
     </dgm:scene3d>
-    <dgm:sp3d/>
+    <dgm:sp3d prstMaterial="plastic">
+      <a:bevelT w="120900" h="88900"/>
+      <a:bevelB w="88900" h="31750" prst="angle"/>
+    </dgm:sp3d>
     <dgm:txPr/>
     <dgm:style>
-      <a:lnRef idx="2">
+      <a:lnRef idx="0">
         <a:scrgbClr r="0" g="0" b="0"/>
       </a:lnRef>
-      <a:fillRef idx="1">
+      <a:fillRef idx="3">
         <a:scrgbClr r="0" g="0" b="0"/>
       </a:fillRef>
-      <a:effectRef idx="0">
+      <a:effectRef idx="2">
         <a:scrgbClr r="0" g="0" b="0"/>
       </a:effectRef>
       <a:fontRef idx="minor">
@@ -5616,18 +6543,21 @@
   <dgm:styleLbl name="lnNode1">
     <dgm:scene3d>
       <a:camera prst="orthographicFront"/>
-      <a:lightRig rig="threePt" dir="t"/>
+      <a:lightRig rig="flat" dir="t"/>
     </dgm:scene3d>
-    <dgm:sp3d/>
+    <dgm:sp3d prstMaterial="plastic">
+      <a:bevelT w="120900" h="88900"/>
+      <a:bevelB w="88900" h="31750" prst="angle"/>
+    </dgm:sp3d>
     <dgm:txPr/>
     <dgm:style>
-      <a:lnRef idx="2">
+      <a:lnRef idx="0">
         <a:scrgbClr r="0" g="0" b="0"/>
       </a:lnRef>
-      <a:fillRef idx="1">
+      <a:fillRef idx="3">
         <a:scrgbClr r="0" g="0" b="0"/>
       </a:fillRef>
-      <a:effectRef idx="0">
+      <a:effectRef idx="1">
         <a:scrgbClr r="0" g="0" b="0"/>
       </a:effectRef>
       <a:fontRef idx="minor">
@@ -5638,18 +6568,21 @@
   <dgm:styleLbl name="vennNode1">
     <dgm:scene3d>
       <a:camera prst="orthographicFront"/>
-      <a:lightRig rig="threePt" dir="t"/>
+      <a:lightRig rig="flat" dir="t"/>
     </dgm:scene3d>
-    <dgm:sp3d/>
+    <dgm:sp3d prstMaterial="plastic">
+      <a:bevelT w="120900" h="88900"/>
+      <a:bevelB w="88900" h="31750" prst="angle"/>
+    </dgm:sp3d>
     <dgm:txPr/>
     <dgm:style>
-      <a:lnRef idx="2">
+      <a:lnRef idx="0">
         <a:scrgbClr r="0" g="0" b="0"/>
       </a:lnRef>
       <a:fillRef idx="1">
         <a:scrgbClr r="0" g="0" b="0"/>
       </a:fillRef>
-      <a:effectRef idx="0">
+      <a:effectRef idx="1">
         <a:scrgbClr r="0" g="0" b="0"/>
       </a:effectRef>
       <a:fontRef idx="minor">
@@ -5660,18 +6593,21 @@
   <dgm:styleLbl name="alignNode1">
     <dgm:scene3d>
       <a:camera prst="orthographicFront"/>
-      <a:lightRig rig="threePt" dir="t"/>
+      <a:lightRig rig="flat" dir="t"/>
     </dgm:scene3d>
-    <dgm:sp3d/>
+    <dgm:sp3d prstMaterial="plastic">
+      <a:bevelT w="120900" h="88900"/>
+      <a:bevelB w="88900" h="31750" prst="angle"/>
+    </dgm:sp3d>
     <dgm:txPr/>
     <dgm:style>
-      <a:lnRef idx="2">
+      <a:lnRef idx="1">
         <a:scrgbClr r="0" g="0" b="0"/>
       </a:lnRef>
-      <a:fillRef idx="1">
+      <a:fillRef idx="3">
         <a:scrgbClr r="0" g="0" b="0"/>
       </a:fillRef>
-      <a:effectRef idx="0">
+      <a:effectRef idx="2">
         <a:scrgbClr r="0" g="0" b="0"/>
       </a:effectRef>
       <a:fontRef idx="minor">
@@ -5682,18 +6618,21 @@
   <dgm:styleLbl name="node1">
     <dgm:scene3d>
       <a:camera prst="orthographicFront"/>
-      <a:lightRig rig="threePt" dir="t"/>
+      <a:lightRig rig="flat" dir="t"/>
     </dgm:scene3d>
-    <dgm:sp3d/>
+    <dgm:sp3d prstMaterial="plastic">
+      <a:bevelT w="120900" h="88900"/>
+      <a:bevelB w="88900" h="31750" prst="angle"/>
+    </dgm:sp3d>
     <dgm:txPr/>
     <dgm:style>
-      <a:lnRef idx="2">
+      <a:lnRef idx="0">
         <a:scrgbClr r="0" g="0" b="0"/>
       </a:lnRef>
-      <a:fillRef idx="1">
+      <a:fillRef idx="3">
         <a:scrgbClr r="0" g="0" b="0"/>
       </a:fillRef>
-      <a:effectRef idx="0">
+      <a:effectRef idx="2">
         <a:scrgbClr r="0" g="0" b="0"/>
       </a:effectRef>
       <a:fontRef idx="minor">
@@ -5704,18 +6643,21 @@
   <dgm:styleLbl name="node2">
     <dgm:scene3d>
       <a:camera prst="orthographicFront"/>
-      <a:lightRig rig="threePt" dir="t"/>
+      <a:lightRig rig="flat" dir="t"/>
     </dgm:scene3d>
-    <dgm:sp3d/>
+    <dgm:sp3d prstMaterial="plastic">
+      <a:bevelT w="120900" h="88900"/>
+      <a:bevelB w="88900" h="31750" prst="angle"/>
+    </dgm:sp3d>
     <dgm:txPr/>
     <dgm:style>
-      <a:lnRef idx="2">
+      <a:lnRef idx="0">
         <a:scrgbClr r="0" g="0" b="0"/>
       </a:lnRef>
-      <a:fillRef idx="1">
+      <a:fillRef idx="3">
         <a:scrgbClr r="0" g="0" b="0"/>
       </a:fillRef>
-      <a:effectRef idx="0">
+      <a:effectRef idx="1">
         <a:scrgbClr r="0" g="0" b="0"/>
       </a:effectRef>
       <a:fontRef idx="minor">
@@ -5726,18 +6668,21 @@
   <dgm:styleLbl name="node3">
     <dgm:scene3d>
       <a:camera prst="orthographicFront"/>
-      <a:lightRig rig="threePt" dir="t"/>
+      <a:lightRig rig="flat" dir="t"/>
     </dgm:scene3d>
-    <dgm:sp3d/>
+    <dgm:sp3d prstMaterial="plastic">
+      <a:bevelT w="120900" h="88900"/>
+      <a:bevelB w="88900" h="31750" prst="angle"/>
+    </dgm:sp3d>
     <dgm:txPr/>
     <dgm:style>
-      <a:lnRef idx="2">
+      <a:lnRef idx="0">
         <a:scrgbClr r="0" g="0" b="0"/>
       </a:lnRef>
-      <a:fillRef idx="1">
+      <a:fillRef idx="3">
         <a:scrgbClr r="0" g="0" b="0"/>
       </a:fillRef>
-      <a:effectRef idx="0">
+      <a:effectRef idx="1">
         <a:scrgbClr r="0" g="0" b="0"/>
       </a:effectRef>
       <a:fontRef idx="minor">
@@ -5748,18 +6693,21 @@
   <dgm:styleLbl name="node4">
     <dgm:scene3d>
       <a:camera prst="orthographicFront"/>
-      <a:lightRig rig="threePt" dir="t"/>
+      <a:lightRig rig="flat" dir="t"/>
     </dgm:scene3d>
-    <dgm:sp3d/>
+    <dgm:sp3d prstMaterial="plastic">
+      <a:bevelT w="120900" h="88900"/>
+      <a:bevelB w="88900" h="31750" prst="angle"/>
+    </dgm:sp3d>
     <dgm:txPr/>
     <dgm:style>
-      <a:lnRef idx="2">
+      <a:lnRef idx="0">
         <a:scrgbClr r="0" g="0" b="0"/>
       </a:lnRef>
-      <a:fillRef idx="1">
+      <a:fillRef idx="3">
         <a:scrgbClr r="0" g="0" b="0"/>
       </a:fillRef>
-      <a:effectRef idx="0">
+      <a:effectRef idx="1">
         <a:scrgbClr r="0" g="0" b="0"/>
       </a:effectRef>
       <a:fontRef idx="minor">
@@ -5770,18 +6718,21 @@
   <dgm:styleLbl name="fgImgPlace1">
     <dgm:scene3d>
       <a:camera prst="orthographicFront"/>
-      <a:lightRig rig="threePt" dir="t"/>
+      <a:lightRig rig="flat" dir="t"/>
     </dgm:scene3d>
-    <dgm:sp3d/>
+    <dgm:sp3d z="127000" prstMaterial="plastic">
+      <a:bevelT w="88900" h="88900"/>
+      <a:bevelB w="88900" h="31750" prst="angle"/>
+    </dgm:sp3d>
     <dgm:txPr/>
     <dgm:style>
-      <a:lnRef idx="2">
+      <a:lnRef idx="0">
         <a:scrgbClr r="0" g="0" b="0"/>
       </a:lnRef>
-      <a:fillRef idx="1">
+      <a:fillRef idx="3">
         <a:scrgbClr r="0" g="0" b="0"/>
       </a:fillRef>
-      <a:effectRef idx="0">
+      <a:effectRef idx="2">
         <a:scrgbClr r="0" g="0" b="0"/>
       </a:effectRef>
       <a:fontRef idx="minor"/>
@@ -5790,18 +6741,21 @@
   <dgm:styleLbl name="alignImgPlace1">
     <dgm:scene3d>
       <a:camera prst="orthographicFront"/>
-      <a:lightRig rig="threePt" dir="t"/>
+      <a:lightRig rig="flat" dir="t"/>
     </dgm:scene3d>
-    <dgm:sp3d/>
+    <dgm:sp3d prstMaterial="plastic">
+      <a:bevelT w="88900" h="88900"/>
+      <a:bevelB w="88900" h="31750" prst="angle"/>
+    </dgm:sp3d>
     <dgm:txPr/>
     <dgm:style>
-      <a:lnRef idx="2">
+      <a:lnRef idx="0">
         <a:scrgbClr r="0" g="0" b="0"/>
       </a:lnRef>
-      <a:fillRef idx="1">
+      <a:fillRef idx="3">
         <a:scrgbClr r="0" g="0" b="0"/>
       </a:fillRef>
-      <a:effectRef idx="0">
+      <a:effectRef idx="2">
         <a:scrgbClr r="0" g="0" b="0"/>
       </a:effectRef>
       <a:fontRef idx="minor"/>
@@ -5810,18 +6764,21 @@
   <dgm:styleLbl name="bgImgPlace1">
     <dgm:scene3d>
       <a:camera prst="orthographicFront"/>
-      <a:lightRig rig="threePt" dir="t"/>
+      <a:lightRig rig="flat" dir="t"/>
     </dgm:scene3d>
-    <dgm:sp3d/>
+    <dgm:sp3d z="-190500" prstMaterial="plastic">
+      <a:bevelT w="88900" h="88900"/>
+      <a:bevelB w="88900" h="31750" prst="angle"/>
+    </dgm:sp3d>
     <dgm:txPr/>
     <dgm:style>
-      <a:lnRef idx="2">
+      <a:lnRef idx="0">
         <a:scrgbClr r="0" g="0" b="0"/>
       </a:lnRef>
-      <a:fillRef idx="1">
+      <a:fillRef idx="3">
         <a:scrgbClr r="0" g="0" b="0"/>
       </a:fillRef>
-      <a:effectRef idx="0">
+      <a:effectRef idx="2">
         <a:scrgbClr r="0" g="0" b="0"/>
       </a:effectRef>
       <a:fontRef idx="minor"/>
@@ -5830,18 +6787,21 @@
   <dgm:styleLbl name="sibTrans2D1">
     <dgm:scene3d>
       <a:camera prst="orthographicFront"/>
-      <a:lightRig rig="threePt" dir="t"/>
+      <a:lightRig rig="flat" dir="t"/>
     </dgm:scene3d>
-    <dgm:sp3d/>
+    <dgm:sp3d z="-80000" prstMaterial="plastic">
+      <a:bevelT w="50800" h="50800"/>
+      <a:bevelB w="25400" h="25400" prst="angle"/>
+    </dgm:sp3d>
     <dgm:txPr/>
     <dgm:style>
       <a:lnRef idx="0">
         <a:scrgbClr r="0" g="0" b="0"/>
       </a:lnRef>
-      <a:fillRef idx="1">
+      <a:fillRef idx="3">
         <a:scrgbClr r="0" g="0" b="0"/>
       </a:fillRef>
-      <a:effectRef idx="0">
+      <a:effectRef idx="2">
         <a:scrgbClr r="0" g="0" b="0"/>
       </a:effectRef>
       <a:fontRef idx="minor">
@@ -5852,18 +6812,21 @@
   <dgm:styleLbl name="fgSibTrans2D1">
     <dgm:scene3d>
       <a:camera prst="orthographicFront"/>
-      <a:lightRig rig="threePt" dir="t"/>
+      <a:lightRig rig="flat" dir="t"/>
     </dgm:scene3d>
-    <dgm:sp3d/>
+    <dgm:sp3d z="127000" prstMaterial="plastic">
+      <a:bevelT w="50800" h="50800"/>
+      <a:bevelB w="25400" h="25400" prst="angle"/>
+    </dgm:sp3d>
     <dgm:txPr/>
     <dgm:style>
       <a:lnRef idx="0">
         <a:scrgbClr r="0" g="0" b="0"/>
       </a:lnRef>
-      <a:fillRef idx="1">
+      <a:fillRef idx="3">
         <a:scrgbClr r="0" g="0" b="0"/>
       </a:fillRef>
-      <a:effectRef idx="0">
+      <a:effectRef idx="2">
         <a:scrgbClr r="0" g="0" b="0"/>
       </a:effectRef>
       <a:fontRef idx="minor">
@@ -5874,18 +6837,21 @@
   <dgm:styleLbl name="bgSibTrans2D1">
     <dgm:scene3d>
       <a:camera prst="orthographicFront"/>
-      <a:lightRig rig="threePt" dir="t"/>
+      <a:lightRig rig="flat" dir="t"/>
     </dgm:scene3d>
-    <dgm:sp3d/>
+    <dgm:sp3d z="-190500" prstMaterial="plastic">
+      <a:bevelT w="50800" h="50800"/>
+      <a:bevelB w="25400" h="25400" prst="angle"/>
+    </dgm:sp3d>
     <dgm:txPr/>
     <dgm:style>
       <a:lnRef idx="0">
         <a:scrgbClr r="0" g="0" b="0"/>
       </a:lnRef>
-      <a:fillRef idx="1">
+      <a:fillRef idx="3">
         <a:scrgbClr r="0" g="0" b="0"/>
       </a:fillRef>
-      <a:effectRef idx="0">
+      <a:effectRef idx="2">
         <a:scrgbClr r="0" g="0" b="0"/>
       </a:effectRef>
       <a:fontRef idx="minor">
@@ -5896,9 +6862,9 @@
   <dgm:styleLbl name="sibTrans1D1">
     <dgm:scene3d>
       <a:camera prst="orthographicFront"/>
-      <a:lightRig rig="threePt" dir="t"/>
+      <a:lightRig rig="flat" dir="t"/>
     </dgm:scene3d>
-    <dgm:sp3d/>
+    <dgm:sp3d z="-40000" prstMaterial="matte"/>
     <dgm:txPr/>
     <dgm:style>
       <a:lnRef idx="1">
@@ -5918,7 +6884,7 @@
       <a:camera prst="orthographicFront"/>
       <a:lightRig rig="threePt" dir="t"/>
     </dgm:scene3d>
-    <dgm:sp3d/>
+    <dgm:sp3d z="127000" prstMaterial="matte"/>
     <dgm:txPr/>
     <dgm:style>
       <a:lnRef idx="2">
@@ -5936,18 +6902,21 @@
   <dgm:styleLbl name="asst0">
     <dgm:scene3d>
       <a:camera prst="orthographicFront"/>
-      <a:lightRig rig="threePt" dir="t"/>
+      <a:lightRig rig="flat" dir="t"/>
     </dgm:scene3d>
-    <dgm:sp3d/>
+    <dgm:sp3d prstMaterial="plastic">
+      <a:bevelT w="120900" h="88900"/>
+      <a:bevelB w="88900" h="31750" prst="angle"/>
+    </dgm:sp3d>
     <dgm:txPr/>
     <dgm:style>
-      <a:lnRef idx="2">
+      <a:lnRef idx="0">
         <a:scrgbClr r="0" g="0" b="0"/>
       </a:lnRef>
-      <a:fillRef idx="1">
+      <a:fillRef idx="3">
         <a:scrgbClr r="0" g="0" b="0"/>
       </a:fillRef>
-      <a:effectRef idx="0">
+      <a:effectRef idx="1">
         <a:scrgbClr r="0" g="0" b="0"/>
       </a:effectRef>
       <a:fontRef idx="minor">
@@ -5958,18 +6927,21 @@
   <dgm:styleLbl name="asst1">
     <dgm:scene3d>
       <a:camera prst="orthographicFront"/>
-      <a:lightRig rig="threePt" dir="t"/>
+      <a:lightRig rig="flat" dir="t"/>
     </dgm:scene3d>
-    <dgm:sp3d/>
+    <dgm:sp3d prstMaterial="plastic">
+      <a:bevelT w="120900" h="88900"/>
+      <a:bevelB w="88900" h="31750" prst="angle"/>
+    </dgm:sp3d>
     <dgm:txPr/>
     <dgm:style>
-      <a:lnRef idx="2">
+      <a:lnRef idx="0">
         <a:scrgbClr r="0" g="0" b="0"/>
       </a:lnRef>
-      <a:fillRef idx="1">
+      <a:fillRef idx="3">
         <a:scrgbClr r="0" g="0" b="0"/>
       </a:fillRef>
-      <a:effectRef idx="0">
+      <a:effectRef idx="1">
         <a:scrgbClr r="0" g="0" b="0"/>
       </a:effectRef>
       <a:fontRef idx="minor">
@@ -5980,18 +6952,21 @@
   <dgm:styleLbl name="asst2">
     <dgm:scene3d>
       <a:camera prst="orthographicFront"/>
-      <a:lightRig rig="threePt" dir="t"/>
+      <a:lightRig rig="flat" dir="t"/>
     </dgm:scene3d>
-    <dgm:sp3d/>
+    <dgm:sp3d prstMaterial="plastic">
+      <a:bevelT w="120900" h="88900"/>
+      <a:bevelB w="88900" h="31750" prst="angle"/>
+    </dgm:sp3d>
     <dgm:txPr/>
     <dgm:style>
-      <a:lnRef idx="2">
+      <a:lnRef idx="0">
         <a:scrgbClr r="0" g="0" b="0"/>
       </a:lnRef>
-      <a:fillRef idx="1">
+      <a:fillRef idx="3">
         <a:scrgbClr r="0" g="0" b="0"/>
       </a:fillRef>
-      <a:effectRef idx="0">
+      <a:effectRef idx="1">
         <a:scrgbClr r="0" g="0" b="0"/>
       </a:effectRef>
       <a:fontRef idx="minor">
@@ -6002,18 +6977,21 @@
   <dgm:styleLbl name="asst3">
     <dgm:scene3d>
       <a:camera prst="orthographicFront"/>
-      <a:lightRig rig="threePt" dir="t"/>
+      <a:lightRig rig="flat" dir="t"/>
     </dgm:scene3d>
-    <dgm:sp3d/>
+    <dgm:sp3d prstMaterial="plastic">
+      <a:bevelT w="120900" h="88900"/>
+      <a:bevelB w="88900" h="31750" prst="angle"/>
+    </dgm:sp3d>
     <dgm:txPr/>
     <dgm:style>
-      <a:lnRef idx="2">
+      <a:lnRef idx="0">
         <a:scrgbClr r="0" g="0" b="0"/>
       </a:lnRef>
-      <a:fillRef idx="1">
+      <a:fillRef idx="3">
         <a:scrgbClr r="0" g="0" b="0"/>
       </a:fillRef>
-      <a:effectRef idx="0">
+      <a:effectRef idx="1">
         <a:scrgbClr r="0" g="0" b="0"/>
       </a:effectRef>
       <a:fontRef idx="minor">
@@ -6021,21 +6999,24 @@
       </a:fontRef>
     </dgm:style>
   </dgm:styleLbl>
-  <dgm:styleLbl name="asst4">
+  <dgm:styleLbl name="parChTrans2D1">
     <dgm:scene3d>
       <a:camera prst="orthographicFront"/>
-      <a:lightRig rig="threePt" dir="t"/>
+      <a:lightRig rig="flat" dir="t"/>
     </dgm:scene3d>
-    <dgm:sp3d/>
+    <dgm:sp3d z="-100000" prstMaterial="plastic">
+      <a:bevelT w="120900" h="88900"/>
+      <a:bevelB w="88900" h="31750" prst="angle"/>
+    </dgm:sp3d>
     <dgm:txPr/>
     <dgm:style>
-      <a:lnRef idx="2">
+      <a:lnRef idx="0">
         <a:scrgbClr r="0" g="0" b="0"/>
       </a:lnRef>
-      <a:fillRef idx="1">
+      <a:fillRef idx="3">
         <a:scrgbClr r="0" g="0" b="0"/>
       </a:fillRef>
-      <a:effectRef idx="0">
+      <a:effectRef idx="1">
         <a:scrgbClr r="0" g="0" b="0"/>
       </a:effectRef>
       <a:fontRef idx="minor">
@@ -6043,21 +7024,24 @@
       </a:fontRef>
     </dgm:style>
   </dgm:styleLbl>
-  <dgm:styleLbl name="parChTrans2D1">
+  <dgm:styleLbl name="parChTrans2D2">
     <dgm:scene3d>
       <a:camera prst="orthographicFront"/>
-      <a:lightRig rig="threePt" dir="t"/>
+      <a:lightRig rig="flat" dir="t"/>
     </dgm:scene3d>
-    <dgm:sp3d/>
+    <dgm:sp3d z="-60000" prstMaterial="plastic">
+      <a:bevelT w="120900" h="88900"/>
+      <a:bevelB w="88900" h="31750" prst="angle"/>
+    </dgm:sp3d>
     <dgm:txPr/>
     <dgm:style>
-      <a:lnRef idx="2">
+      <a:lnRef idx="0">
         <a:scrgbClr r="0" g="0" b="0"/>
       </a:lnRef>
-      <a:fillRef idx="1">
+      <a:fillRef idx="3">
         <a:scrgbClr r="0" g="0" b="0"/>
       </a:fillRef>
-      <a:effectRef idx="0">
+      <a:effectRef idx="1">
         <a:scrgbClr r="0" g="0" b="0"/>
       </a:effectRef>
       <a:fontRef idx="minor">
@@ -6065,21 +7049,24 @@
       </a:fontRef>
     </dgm:style>
   </dgm:styleLbl>
-  <dgm:styleLbl name="parChTrans2D2">
+  <dgm:styleLbl name="parChTrans2D3">
     <dgm:scene3d>
       <a:camera prst="orthographicFront"/>
-      <a:lightRig rig="threePt" dir="t"/>
+      <a:lightRig rig="flat" dir="t"/>
     </dgm:scene3d>
-    <dgm:sp3d/>
+    <dgm:sp3d z="-60000" prstMaterial="plastic">
+      <a:bevelT w="120900" h="88900"/>
+      <a:bevelB w="88900" h="31750" prst="angle"/>
+    </dgm:sp3d>
     <dgm:txPr/>
     <dgm:style>
-      <a:lnRef idx="2">
+      <a:lnRef idx="0">
         <a:scrgbClr r="0" g="0" b="0"/>
       </a:lnRef>
-      <a:fillRef idx="1">
+      <a:fillRef idx="3">
         <a:scrgbClr r="0" g="0" b="0"/>
       </a:fillRef>
-      <a:effectRef idx="0">
+      <a:effectRef idx="1">
         <a:scrgbClr r="0" g="0" b="0"/>
       </a:effectRef>
       <a:fontRef idx="minor">
@@ -6087,21 +7074,24 @@
       </a:fontRef>
     </dgm:style>
   </dgm:styleLbl>
-  <dgm:styleLbl name="parChTrans2D3">
+  <dgm:styleLbl name="parChTrans2D4">
     <dgm:scene3d>
       <a:camera prst="orthographicFront"/>
-      <a:lightRig rig="threePt" dir="t"/>
+      <a:lightRig rig="flat" dir="t"/>
     </dgm:scene3d>
-    <dgm:sp3d/>
+    <dgm:sp3d z="-60000" prstMaterial="plastic">
+      <a:bevelT w="120900" h="88900"/>
+      <a:bevelB w="88900" h="31750" prst="angle"/>
+    </dgm:sp3d>
     <dgm:txPr/>
     <dgm:style>
-      <a:lnRef idx="2">
+      <a:lnRef idx="0">
         <a:scrgbClr r="0" g="0" b="0"/>
       </a:lnRef>
-      <a:fillRef idx="1">
+      <a:fillRef idx="3">
         <a:scrgbClr r="0" g="0" b="0"/>
       </a:fillRef>
-      <a:effectRef idx="0">
+      <a:effectRef idx="1">
         <a:scrgbClr r="0" g="0" b="0"/>
       </a:effectRef>
       <a:fontRef idx="minor">
@@ -6109,486 +7099,503 @@
       </a:fontRef>
     </dgm:style>
   </dgm:styleLbl>
-  <dgm:styleLbl name="parChTrans2D4">
+  <dgm:styleLbl name="parChTrans1D1">
     <dgm:scene3d>
       <a:camera prst="orthographicFront"/>
-      <a:lightRig rig="threePt" dir="t"/>
+      <a:lightRig rig="flat" dir="t"/>
     </dgm:scene3d>
-    <dgm:sp3d/>
+    <dgm:sp3d prstMaterial="matte"/>
     <dgm:txPr/>
     <dgm:style>
       <a:lnRef idx="2">
         <a:scrgbClr r="0" g="0" b="0"/>
       </a:lnRef>
-      <a:fillRef idx="1">
+      <a:fillRef idx="0">
         <a:scrgbClr r="0" g="0" b="0"/>
       </a:fillRef>
       <a:effectRef idx="0">
+        <a:scrgbClr r="0" g="0" b="0"/>
+      </a:effectRef>
+      <a:fontRef idx="minor"/>
+    </dgm:style>
+  </dgm:styleLbl>
+  <dgm:styleLbl name="parChTrans1D2">
+    <dgm:scene3d>
+      <a:camera prst="orthographicFront"/>
+      <a:lightRig rig="flat" dir="t"/>
+    </dgm:scene3d>
+    <dgm:sp3d prstMaterial="matte"/>
+    <dgm:txPr/>
+    <dgm:style>
+      <a:lnRef idx="2">
+        <a:scrgbClr r="0" g="0" b="0"/>
+      </a:lnRef>
+      <a:fillRef idx="0">
+        <a:scrgbClr r="0" g="0" b="0"/>
+      </a:fillRef>
+      <a:effectRef idx="0">
+        <a:scrgbClr r="0" g="0" b="0"/>
+      </a:effectRef>
+      <a:fontRef idx="minor"/>
+    </dgm:style>
+  </dgm:styleLbl>
+  <dgm:styleLbl name="parChTrans1D3">
+    <dgm:scene3d>
+      <a:camera prst="orthographicFront"/>
+      <a:lightRig rig="flat" dir="t"/>
+    </dgm:scene3d>
+    <dgm:sp3d prstMaterial="matte"/>
+    <dgm:txPr/>
+    <dgm:style>
+      <a:lnRef idx="2">
+        <a:scrgbClr r="0" g="0" b="0"/>
+      </a:lnRef>
+      <a:fillRef idx="0">
+        <a:scrgbClr r="0" g="0" b="0"/>
+      </a:fillRef>
+      <a:effectRef idx="0">
+        <a:scrgbClr r="0" g="0" b="0"/>
+      </a:effectRef>
+      <a:fontRef idx="minor"/>
+    </dgm:style>
+  </dgm:styleLbl>
+  <dgm:styleLbl name="parChTrans1D4">
+    <dgm:scene3d>
+      <a:camera prst="orthographicFront"/>
+      <a:lightRig rig="flat" dir="t"/>
+    </dgm:scene3d>
+    <dgm:sp3d prstMaterial="matte"/>
+    <dgm:txPr/>
+    <dgm:style>
+      <a:lnRef idx="2">
+        <a:scrgbClr r="0" g="0" b="0"/>
+      </a:lnRef>
+      <a:fillRef idx="0">
+        <a:scrgbClr r="0" g="0" b="0"/>
+      </a:fillRef>
+      <a:effectRef idx="0">
+        <a:scrgbClr r="0" g="0" b="0"/>
+      </a:effectRef>
+      <a:fontRef idx="minor"/>
+    </dgm:style>
+  </dgm:styleLbl>
+  <dgm:styleLbl name="fgAcc1">
+    <dgm:scene3d>
+      <a:camera prst="orthographicFront"/>
+      <a:lightRig rig="flat" dir="t"/>
+    </dgm:scene3d>
+    <dgm:sp3d z="190500" extrusionH="12700" prstMaterial="plastic">
+      <a:bevelT w="50800" h="50800"/>
+    </dgm:sp3d>
+    <dgm:txPr/>
+    <dgm:style>
+      <a:lnRef idx="1">
+        <a:scrgbClr r="0" g="0" b="0"/>
+      </a:lnRef>
+      <a:fillRef idx="1">
+        <a:scrgbClr r="0" g="0" b="0"/>
+      </a:fillRef>
+      <a:effectRef idx="2">
+        <a:scrgbClr r="0" g="0" b="0"/>
+      </a:effectRef>
+      <a:fontRef idx="minor"/>
+    </dgm:style>
+  </dgm:styleLbl>
+  <dgm:styleLbl name="conFgAcc1">
+    <dgm:scene3d>
+      <a:camera prst="orthographicFront"/>
+      <a:lightRig rig="flat" dir="t"/>
+    </dgm:scene3d>
+    <dgm:sp3d z="190500" extrusionH="12700" prstMaterial="plastic">
+      <a:bevelT w="50800" h="50800"/>
+    </dgm:sp3d>
+    <dgm:txPr/>
+    <dgm:style>
+      <a:lnRef idx="1">
+        <a:scrgbClr r="0" g="0" b="0"/>
+      </a:lnRef>
+      <a:fillRef idx="1">
+        <a:scrgbClr r="0" g="0" b="0"/>
+      </a:fillRef>
+      <a:effectRef idx="2">
+        <a:scrgbClr r="0" g="0" b="0"/>
+      </a:effectRef>
+      <a:fontRef idx="minor"/>
+    </dgm:style>
+  </dgm:styleLbl>
+  <dgm:styleLbl name="alignAcc1">
+    <dgm:scene3d>
+      <a:camera prst="orthographicFront"/>
+      <a:lightRig rig="flat" dir="t"/>
+    </dgm:scene3d>
+    <dgm:sp3d extrusionH="12700" prstMaterial="plastic">
+      <a:bevelT w="50800" h="50800"/>
+    </dgm:sp3d>
+    <dgm:txPr/>
+    <dgm:style>
+      <a:lnRef idx="1">
+        <a:scrgbClr r="0" g="0" b="0"/>
+      </a:lnRef>
+      <a:fillRef idx="1">
+        <a:scrgbClr r="0" g="0" b="0"/>
+      </a:fillRef>
+      <a:effectRef idx="2">
+        <a:scrgbClr r="0" g="0" b="0"/>
+      </a:effectRef>
+      <a:fontRef idx="minor"/>
+    </dgm:style>
+  </dgm:styleLbl>
+  <dgm:styleLbl name="trAlignAcc1">
+    <dgm:scene3d>
+      <a:camera prst="orthographicFront"/>
+      <a:lightRig rig="flat" dir="t"/>
+    </dgm:scene3d>
+    <dgm:sp3d extrusionH="12700" prstMaterial="plastic">
+      <a:bevelT w="50800" h="50800"/>
+    </dgm:sp3d>
+    <dgm:txPr/>
+    <dgm:style>
+      <a:lnRef idx="1">
+        <a:scrgbClr r="0" g="0" b="0"/>
+      </a:lnRef>
+      <a:fillRef idx="1">
+        <a:scrgbClr r="0" g="0" b="0"/>
+      </a:fillRef>
+      <a:effectRef idx="2">
+        <a:scrgbClr r="0" g="0" b="0"/>
+      </a:effectRef>
+      <a:fontRef idx="minor"/>
+    </dgm:style>
+  </dgm:styleLbl>
+  <dgm:styleLbl name="bgAcc1">
+    <dgm:scene3d>
+      <a:camera prst="orthographicFront"/>
+      <a:lightRig rig="flat" dir="t"/>
+    </dgm:scene3d>
+    <dgm:sp3d z="-190500" extrusionH="12700" prstMaterial="plastic">
+      <a:bevelT w="50800" h="50800"/>
+    </dgm:sp3d>
+    <dgm:txPr/>
+    <dgm:style>
+      <a:lnRef idx="1">
+        <a:scrgbClr r="0" g="0" b="0"/>
+      </a:lnRef>
+      <a:fillRef idx="1">
+        <a:scrgbClr r="0" g="0" b="0"/>
+      </a:fillRef>
+      <a:effectRef idx="2">
+        <a:scrgbClr r="0" g="0" b="0"/>
+      </a:effectRef>
+      <a:fontRef idx="minor"/>
+    </dgm:style>
+  </dgm:styleLbl>
+  <dgm:styleLbl name="solidFgAcc1">
+    <dgm:scene3d>
+      <a:camera prst="orthographicFront"/>
+      <a:lightRig rig="flat" dir="t"/>
+    </dgm:scene3d>
+    <dgm:sp3d z="190500" extrusionH="12700" prstMaterial="plastic">
+      <a:bevelT w="50800" h="50800"/>
+    </dgm:sp3d>
+    <dgm:txPr/>
+    <dgm:style>
+      <a:lnRef idx="1">
+        <a:scrgbClr r="0" g="0" b="0"/>
+      </a:lnRef>
+      <a:fillRef idx="1">
+        <a:scrgbClr r="0" g="0" b="0"/>
+      </a:fillRef>
+      <a:effectRef idx="2">
+        <a:scrgbClr r="0" g="0" b="0"/>
+      </a:effectRef>
+      <a:fontRef idx="minor"/>
+    </dgm:style>
+  </dgm:styleLbl>
+  <dgm:styleLbl name="solidAlignAcc1">
+    <dgm:scene3d>
+      <a:camera prst="orthographicFront"/>
+      <a:lightRig rig="flat" dir="t"/>
+    </dgm:scene3d>
+    <dgm:sp3d extrusionH="12700" prstMaterial="plastic">
+      <a:bevelT w="50800" h="50800"/>
+    </dgm:sp3d>
+    <dgm:txPr/>
+    <dgm:style>
+      <a:lnRef idx="1">
+        <a:scrgbClr r="0" g="0" b="0"/>
+      </a:lnRef>
+      <a:fillRef idx="1">
+        <a:scrgbClr r="0" g="0" b="0"/>
+      </a:fillRef>
+      <a:effectRef idx="2">
+        <a:scrgbClr r="0" g="0" b="0"/>
+      </a:effectRef>
+      <a:fontRef idx="minor"/>
+    </dgm:style>
+  </dgm:styleLbl>
+  <dgm:styleLbl name="solidBgAcc1">
+    <dgm:scene3d>
+      <a:camera prst="orthographicFront"/>
+      <a:lightRig rig="flat" dir="t"/>
+    </dgm:scene3d>
+    <dgm:sp3d z="-190500" extrusionH="12700" prstMaterial="plastic">
+      <a:bevelT w="50800" h="50800"/>
+    </dgm:sp3d>
+    <dgm:txPr/>
+    <dgm:style>
+      <a:lnRef idx="1">
+        <a:scrgbClr r="0" g="0" b="0"/>
+      </a:lnRef>
+      <a:fillRef idx="1">
+        <a:scrgbClr r="0" g="0" b="0"/>
+      </a:fillRef>
+      <a:effectRef idx="2">
+        <a:scrgbClr r="0" g="0" b="0"/>
+      </a:effectRef>
+      <a:fontRef idx="minor"/>
+    </dgm:style>
+  </dgm:styleLbl>
+  <dgm:styleLbl name="fgAccFollowNode1">
+    <dgm:scene3d>
+      <a:camera prst="orthographicFront"/>
+      <a:lightRig rig="flat" dir="t"/>
+    </dgm:scene3d>
+    <dgm:sp3d z="190500" extrusionH="12700" prstMaterial="plastic">
+      <a:bevelT w="50800" h="50800"/>
+    </dgm:sp3d>
+    <dgm:txPr/>
+    <dgm:style>
+      <a:lnRef idx="1">
+        <a:scrgbClr r="0" g="0" b="0"/>
+      </a:lnRef>
+      <a:fillRef idx="1">
+        <a:scrgbClr r="0" g="0" b="0"/>
+      </a:fillRef>
+      <a:effectRef idx="2">
+        <a:scrgbClr r="0" g="0" b="0"/>
+      </a:effectRef>
+      <a:fontRef idx="minor"/>
+    </dgm:style>
+  </dgm:styleLbl>
+  <dgm:styleLbl name="alignAccFollowNode1">
+    <dgm:scene3d>
+      <a:camera prst="orthographicFront"/>
+      <a:lightRig rig="flat" dir="t"/>
+    </dgm:scene3d>
+    <dgm:sp3d extrusionH="12700" prstMaterial="plastic">
+      <a:bevelT w="50800" h="50800"/>
+    </dgm:sp3d>
+    <dgm:txPr/>
+    <dgm:style>
+      <a:lnRef idx="1">
+        <a:scrgbClr r="0" g="0" b="0"/>
+      </a:lnRef>
+      <a:fillRef idx="1">
+        <a:scrgbClr r="0" g="0" b="0"/>
+      </a:fillRef>
+      <a:effectRef idx="2">
+        <a:scrgbClr r="0" g="0" b="0"/>
+      </a:effectRef>
+      <a:fontRef idx="minor"/>
+    </dgm:style>
+  </dgm:styleLbl>
+  <dgm:styleLbl name="bgAccFollowNode1">
+    <dgm:scene3d>
+      <a:camera prst="orthographicFront"/>
+      <a:lightRig rig="flat" dir="t"/>
+    </dgm:scene3d>
+    <dgm:sp3d z="-190500" extrusionH="12700" prstMaterial="plastic">
+      <a:bevelT w="50800" h="50800"/>
+    </dgm:sp3d>
+    <dgm:txPr/>
+    <dgm:style>
+      <a:lnRef idx="1">
+        <a:scrgbClr r="0" g="0" b="0"/>
+      </a:lnRef>
+      <a:fillRef idx="1">
+        <a:scrgbClr r="0" g="0" b="0"/>
+      </a:fillRef>
+      <a:effectRef idx="2">
+        <a:scrgbClr r="0" g="0" b="0"/>
+      </a:effectRef>
+      <a:fontRef idx="minor"/>
+    </dgm:style>
+  </dgm:styleLbl>
+  <dgm:styleLbl name="fgAcc0">
+    <dgm:scene3d>
+      <a:camera prst="orthographicFront"/>
+      <a:lightRig rig="flat" dir="t"/>
+    </dgm:scene3d>
+    <dgm:sp3d z="190500" extrusionH="12700" prstMaterial="plastic">
+      <a:bevelT w="50800" h="50800"/>
+    </dgm:sp3d>
+    <dgm:txPr/>
+    <dgm:style>
+      <a:lnRef idx="1">
+        <a:scrgbClr r="0" g="0" b="0"/>
+      </a:lnRef>
+      <a:fillRef idx="1">
+        <a:scrgbClr r="0" g="0" b="0"/>
+      </a:fillRef>
+      <a:effectRef idx="2">
+        <a:scrgbClr r="0" g="0" b="0"/>
+      </a:effectRef>
+      <a:fontRef idx="minor"/>
+    </dgm:style>
+  </dgm:styleLbl>
+  <dgm:styleLbl name="fgAcc2">
+    <dgm:scene3d>
+      <a:camera prst="orthographicFront"/>
+      <a:lightRig rig="flat" dir="t"/>
+    </dgm:scene3d>
+    <dgm:sp3d z="190500" extrusionH="12700" prstMaterial="plastic">
+      <a:bevelT w="50800" h="50800"/>
+    </dgm:sp3d>
+    <dgm:txPr/>
+    <dgm:style>
+      <a:lnRef idx="1">
+        <a:scrgbClr r="0" g="0" b="0"/>
+      </a:lnRef>
+      <a:fillRef idx="1">
+        <a:scrgbClr r="0" g="0" b="0"/>
+      </a:fillRef>
+      <a:effectRef idx="2">
+        <a:scrgbClr r="0" g="0" b="0"/>
+      </a:effectRef>
+      <a:fontRef idx="minor"/>
+    </dgm:style>
+  </dgm:styleLbl>
+  <dgm:styleLbl name="fgAcc3">
+    <dgm:scene3d>
+      <a:camera prst="orthographicFront"/>
+      <a:lightRig rig="flat" dir="t"/>
+    </dgm:scene3d>
+    <dgm:sp3d z="190500" extrusionH="12700" prstMaterial="plastic">
+      <a:bevelT w="50800" h="50800"/>
+    </dgm:sp3d>
+    <dgm:txPr/>
+    <dgm:style>
+      <a:lnRef idx="1">
+        <a:scrgbClr r="0" g="0" b="0"/>
+      </a:lnRef>
+      <a:fillRef idx="1">
+        <a:scrgbClr r="0" g="0" b="0"/>
+      </a:fillRef>
+      <a:effectRef idx="2">
+        <a:scrgbClr r="0" g="0" b="0"/>
+      </a:effectRef>
+      <a:fontRef idx="minor"/>
+    </dgm:style>
+  </dgm:styleLbl>
+  <dgm:styleLbl name="fgAcc4">
+    <dgm:scene3d>
+      <a:camera prst="orthographicFront"/>
+      <a:lightRig rig="flat" dir="t"/>
+    </dgm:scene3d>
+    <dgm:sp3d z="190500" extrusionH="12700" prstMaterial="plastic">
+      <a:bevelT w="50800" h="50800"/>
+    </dgm:sp3d>
+    <dgm:txPr/>
+    <dgm:style>
+      <a:lnRef idx="1">
+        <a:scrgbClr r="0" g="0" b="0"/>
+      </a:lnRef>
+      <a:fillRef idx="1">
+        <a:scrgbClr r="0" g="0" b="0"/>
+      </a:fillRef>
+      <a:effectRef idx="2">
+        <a:scrgbClr r="0" g="0" b="0"/>
+      </a:effectRef>
+      <a:fontRef idx="minor"/>
+    </dgm:style>
+  </dgm:styleLbl>
+  <dgm:styleLbl name="bgShp">
+    <dgm:scene3d>
+      <a:camera prst="orthographicFront"/>
+      <a:lightRig rig="flat" dir="t"/>
+    </dgm:scene3d>
+    <dgm:sp3d z="-190500" extrusionH="12700" prstMaterial="plastic">
+      <a:bevelT w="50800" h="50800"/>
+    </dgm:sp3d>
+    <dgm:txPr/>
+    <dgm:style>
+      <a:lnRef idx="0">
+        <a:scrgbClr r="0" g="0" b="0"/>
+      </a:lnRef>
+      <a:fillRef idx="3">
+        <a:scrgbClr r="0" g="0" b="0"/>
+      </a:fillRef>
+      <a:effectRef idx="0">
+        <a:scrgbClr r="0" g="0" b="0"/>
+      </a:effectRef>
+      <a:fontRef idx="minor"/>
+    </dgm:style>
+  </dgm:styleLbl>
+  <dgm:styleLbl name="dkBgShp">
+    <dgm:scene3d>
+      <a:camera prst="orthographicFront"/>
+      <a:lightRig rig="flat" dir="t"/>
+    </dgm:scene3d>
+    <dgm:sp3d z="-190500" extrusionH="12700" prstMaterial="plastic">
+      <a:bevelT w="50800" h="50800"/>
+    </dgm:sp3d>
+    <dgm:txPr/>
+    <dgm:style>
+      <a:lnRef idx="0">
+        <a:scrgbClr r="0" g="0" b="0"/>
+      </a:lnRef>
+      <a:fillRef idx="2">
+        <a:scrgbClr r="0" g="0" b="0"/>
+      </a:fillRef>
+      <a:effectRef idx="0">
+        <a:scrgbClr r="0" g="0" b="0"/>
+      </a:effectRef>
+      <a:fontRef idx="minor"/>
+    </dgm:style>
+  </dgm:styleLbl>
+  <dgm:styleLbl name="trBgShp">
+    <dgm:scene3d>
+      <a:camera prst="orthographicFront"/>
+      <a:lightRig rig="flat" dir="t"/>
+    </dgm:scene3d>
+    <dgm:sp3d z="-190500" extrusionH="12700" prstMaterial="matte"/>
+    <dgm:txPr/>
+    <dgm:style>
+      <a:lnRef idx="0">
+        <a:scrgbClr r="0" g="0" b="0"/>
+      </a:lnRef>
+      <a:fillRef idx="1">
+        <a:scrgbClr r="0" g="0" b="0"/>
+      </a:fillRef>
+      <a:effectRef idx="0">
+        <a:scrgbClr r="0" g="0" b="0"/>
+      </a:effectRef>
+      <a:fontRef idx="minor"/>
+    </dgm:style>
+  </dgm:styleLbl>
+  <dgm:styleLbl name="fgShp">
+    <dgm:scene3d>
+      <a:camera prst="orthographicFront"/>
+      <a:lightRig rig="flat" dir="t"/>
+    </dgm:scene3d>
+    <dgm:sp3d z="190500" prstMaterial="plastic">
+      <a:bevelT w="120900" h="88900"/>
+      <a:bevelB w="88900" h="31750" prst="angle"/>
+    </dgm:sp3d>
+    <dgm:txPr/>
+    <dgm:style>
+      <a:lnRef idx="0">
+        <a:scrgbClr r="0" g="0" b="0"/>
+      </a:lnRef>
+      <a:fillRef idx="1">
+        <a:scrgbClr r="0" g="0" b="0"/>
+      </a:fillRef>
+      <a:effectRef idx="3">
         <a:scrgbClr r="0" g="0" b="0"/>
       </a:effectRef>
       <a:fontRef idx="minor">
         <a:schemeClr val="lt1"/>
       </a:fontRef>
-    </dgm:style>
-  </dgm:styleLbl>
-  <dgm:styleLbl name="parChTrans1D1">
-    <dgm:scene3d>
-      <a:camera prst="orthographicFront"/>
-      <a:lightRig rig="threePt" dir="t"/>
-    </dgm:scene3d>
-    <dgm:sp3d/>
-    <dgm:txPr/>
-    <dgm:style>
-      <a:lnRef idx="2">
-        <a:scrgbClr r="0" g="0" b="0"/>
-      </a:lnRef>
-      <a:fillRef idx="0">
-        <a:scrgbClr r="0" g="0" b="0"/>
-      </a:fillRef>
-      <a:effectRef idx="0">
-        <a:scrgbClr r="0" g="0" b="0"/>
-      </a:effectRef>
-      <a:fontRef idx="minor"/>
-    </dgm:style>
-  </dgm:styleLbl>
-  <dgm:styleLbl name="parChTrans1D2">
-    <dgm:scene3d>
-      <a:camera prst="orthographicFront"/>
-      <a:lightRig rig="threePt" dir="t"/>
-    </dgm:scene3d>
-    <dgm:sp3d/>
-    <dgm:txPr/>
-    <dgm:style>
-      <a:lnRef idx="2">
-        <a:scrgbClr r="0" g="0" b="0"/>
-      </a:lnRef>
-      <a:fillRef idx="0">
-        <a:scrgbClr r="0" g="0" b="0"/>
-      </a:fillRef>
-      <a:effectRef idx="0">
-        <a:scrgbClr r="0" g="0" b="0"/>
-      </a:effectRef>
-      <a:fontRef idx="minor"/>
-    </dgm:style>
-  </dgm:styleLbl>
-  <dgm:styleLbl name="parChTrans1D3">
-    <dgm:scene3d>
-      <a:camera prst="orthographicFront"/>
-      <a:lightRig rig="threePt" dir="t"/>
-    </dgm:scene3d>
-    <dgm:sp3d/>
-    <dgm:txPr/>
-    <dgm:style>
-      <a:lnRef idx="2">
-        <a:scrgbClr r="0" g="0" b="0"/>
-      </a:lnRef>
-      <a:fillRef idx="0">
-        <a:scrgbClr r="0" g="0" b="0"/>
-      </a:fillRef>
-      <a:effectRef idx="0">
-        <a:scrgbClr r="0" g="0" b="0"/>
-      </a:effectRef>
-      <a:fontRef idx="minor"/>
-    </dgm:style>
-  </dgm:styleLbl>
-  <dgm:styleLbl name="parChTrans1D4">
-    <dgm:scene3d>
-      <a:camera prst="orthographicFront"/>
-      <a:lightRig rig="threePt" dir="t"/>
-    </dgm:scene3d>
-    <dgm:sp3d/>
-    <dgm:txPr/>
-    <dgm:style>
-      <a:lnRef idx="2">
-        <a:scrgbClr r="0" g="0" b="0"/>
-      </a:lnRef>
-      <a:fillRef idx="0">
-        <a:scrgbClr r="0" g="0" b="0"/>
-      </a:fillRef>
-      <a:effectRef idx="0">
-        <a:scrgbClr r="0" g="0" b="0"/>
-      </a:effectRef>
-      <a:fontRef idx="minor"/>
-    </dgm:style>
-  </dgm:styleLbl>
-  <dgm:styleLbl name="fgAcc1">
-    <dgm:scene3d>
-      <a:camera prst="orthographicFront"/>
-      <a:lightRig rig="threePt" dir="t"/>
-    </dgm:scene3d>
-    <dgm:sp3d/>
-    <dgm:txPr/>
-    <dgm:style>
-      <a:lnRef idx="2">
-        <a:scrgbClr r="0" g="0" b="0"/>
-      </a:lnRef>
-      <a:fillRef idx="1">
-        <a:scrgbClr r="0" g="0" b="0"/>
-      </a:fillRef>
-      <a:effectRef idx="0">
-        <a:scrgbClr r="0" g="0" b="0"/>
-      </a:effectRef>
-      <a:fontRef idx="minor"/>
-    </dgm:style>
-  </dgm:styleLbl>
-  <dgm:styleLbl name="conFgAcc1">
-    <dgm:scene3d>
-      <a:camera prst="orthographicFront"/>
-      <a:lightRig rig="threePt" dir="t"/>
-    </dgm:scene3d>
-    <dgm:sp3d/>
-    <dgm:txPr/>
-    <dgm:style>
-      <a:lnRef idx="2">
-        <a:scrgbClr r="0" g="0" b="0"/>
-      </a:lnRef>
-      <a:fillRef idx="1">
-        <a:scrgbClr r="0" g="0" b="0"/>
-      </a:fillRef>
-      <a:effectRef idx="0">
-        <a:scrgbClr r="0" g="0" b="0"/>
-      </a:effectRef>
-      <a:fontRef idx="minor"/>
-    </dgm:style>
-  </dgm:styleLbl>
-  <dgm:styleLbl name="alignAcc1">
-    <dgm:scene3d>
-      <a:camera prst="orthographicFront"/>
-      <a:lightRig rig="threePt" dir="t"/>
-    </dgm:scene3d>
-    <dgm:sp3d/>
-    <dgm:txPr/>
-    <dgm:style>
-      <a:lnRef idx="2">
-        <a:scrgbClr r="0" g="0" b="0"/>
-      </a:lnRef>
-      <a:fillRef idx="1">
-        <a:scrgbClr r="0" g="0" b="0"/>
-      </a:fillRef>
-      <a:effectRef idx="0">
-        <a:scrgbClr r="0" g="0" b="0"/>
-      </a:effectRef>
-      <a:fontRef idx="minor"/>
-    </dgm:style>
-  </dgm:styleLbl>
-  <dgm:styleLbl name="trAlignAcc1">
-    <dgm:scene3d>
-      <a:camera prst="orthographicFront"/>
-      <a:lightRig rig="threePt" dir="t"/>
-    </dgm:scene3d>
-    <dgm:sp3d/>
-    <dgm:txPr/>
-    <dgm:style>
-      <a:lnRef idx="1">
-        <a:scrgbClr r="0" g="0" b="0"/>
-      </a:lnRef>
-      <a:fillRef idx="1">
-        <a:scrgbClr r="0" g="0" b="0"/>
-      </a:fillRef>
-      <a:effectRef idx="0">
-        <a:scrgbClr r="0" g="0" b="0"/>
-      </a:effectRef>
-      <a:fontRef idx="minor"/>
-    </dgm:style>
-  </dgm:styleLbl>
-  <dgm:styleLbl name="bgAcc1">
-    <dgm:scene3d>
-      <a:camera prst="orthographicFront"/>
-      <a:lightRig rig="threePt" dir="t"/>
-    </dgm:scene3d>
-    <dgm:sp3d/>
-    <dgm:txPr/>
-    <dgm:style>
-      <a:lnRef idx="2">
-        <a:scrgbClr r="0" g="0" b="0"/>
-      </a:lnRef>
-      <a:fillRef idx="1">
-        <a:scrgbClr r="0" g="0" b="0"/>
-      </a:fillRef>
-      <a:effectRef idx="0">
-        <a:scrgbClr r="0" g="0" b="0"/>
-      </a:effectRef>
-      <a:fontRef idx="minor"/>
-    </dgm:style>
-  </dgm:styleLbl>
-  <dgm:styleLbl name="solidFgAcc1">
-    <dgm:scene3d>
-      <a:camera prst="orthographicFront"/>
-      <a:lightRig rig="threePt" dir="t"/>
-    </dgm:scene3d>
-    <dgm:sp3d/>
-    <dgm:txPr/>
-    <dgm:style>
-      <a:lnRef idx="2">
-        <a:scrgbClr r="0" g="0" b="0"/>
-      </a:lnRef>
-      <a:fillRef idx="1">
-        <a:scrgbClr r="0" g="0" b="0"/>
-      </a:fillRef>
-      <a:effectRef idx="0">
-        <a:scrgbClr r="0" g="0" b="0"/>
-      </a:effectRef>
-      <a:fontRef idx="minor"/>
-    </dgm:style>
-  </dgm:styleLbl>
-  <dgm:styleLbl name="solidAlignAcc1">
-    <dgm:scene3d>
-      <a:camera prst="orthographicFront"/>
-      <a:lightRig rig="threePt" dir="t"/>
-    </dgm:scene3d>
-    <dgm:sp3d/>
-    <dgm:txPr/>
-    <dgm:style>
-      <a:lnRef idx="2">
-        <a:scrgbClr r="0" g="0" b="0"/>
-      </a:lnRef>
-      <a:fillRef idx="1">
-        <a:scrgbClr r="0" g="0" b="0"/>
-      </a:fillRef>
-      <a:effectRef idx="0">
-        <a:scrgbClr r="0" g="0" b="0"/>
-      </a:effectRef>
-      <a:fontRef idx="minor"/>
-    </dgm:style>
-  </dgm:styleLbl>
-  <dgm:styleLbl name="solidBgAcc1">
-    <dgm:scene3d>
-      <a:camera prst="orthographicFront"/>
-      <a:lightRig rig="threePt" dir="t"/>
-    </dgm:scene3d>
-    <dgm:sp3d/>
-    <dgm:txPr/>
-    <dgm:style>
-      <a:lnRef idx="2">
-        <a:scrgbClr r="0" g="0" b="0"/>
-      </a:lnRef>
-      <a:fillRef idx="1">
-        <a:scrgbClr r="0" g="0" b="0"/>
-      </a:fillRef>
-      <a:effectRef idx="0">
-        <a:scrgbClr r="0" g="0" b="0"/>
-      </a:effectRef>
-      <a:fontRef idx="minor"/>
-    </dgm:style>
-  </dgm:styleLbl>
-  <dgm:styleLbl name="fgAccFollowNode1">
-    <dgm:scene3d>
-      <a:camera prst="orthographicFront"/>
-      <a:lightRig rig="threePt" dir="t"/>
-    </dgm:scene3d>
-    <dgm:sp3d/>
-    <dgm:txPr/>
-    <dgm:style>
-      <a:lnRef idx="2">
-        <a:scrgbClr r="0" g="0" b="0"/>
-      </a:lnRef>
-      <a:fillRef idx="1">
-        <a:scrgbClr r="0" g="0" b="0"/>
-      </a:fillRef>
-      <a:effectRef idx="0">
-        <a:scrgbClr r="0" g="0" b="0"/>
-      </a:effectRef>
-      <a:fontRef idx="minor"/>
-    </dgm:style>
-  </dgm:styleLbl>
-  <dgm:styleLbl name="alignAccFollowNode1">
-    <dgm:scene3d>
-      <a:camera prst="orthographicFront"/>
-      <a:lightRig rig="threePt" dir="t"/>
-    </dgm:scene3d>
-    <dgm:sp3d/>
-    <dgm:txPr/>
-    <dgm:style>
-      <a:lnRef idx="2">
-        <a:scrgbClr r="0" g="0" b="0"/>
-      </a:lnRef>
-      <a:fillRef idx="1">
-        <a:scrgbClr r="0" g="0" b="0"/>
-      </a:fillRef>
-      <a:effectRef idx="0">
-        <a:scrgbClr r="0" g="0" b="0"/>
-      </a:effectRef>
-      <a:fontRef idx="minor"/>
-    </dgm:style>
-  </dgm:styleLbl>
-  <dgm:styleLbl name="bgAccFollowNode1">
-    <dgm:scene3d>
-      <a:camera prst="orthographicFront"/>
-      <a:lightRig rig="threePt" dir="t"/>
-    </dgm:scene3d>
-    <dgm:sp3d/>
-    <dgm:txPr/>
-    <dgm:style>
-      <a:lnRef idx="2">
-        <a:scrgbClr r="0" g="0" b="0"/>
-      </a:lnRef>
-      <a:fillRef idx="1">
-        <a:scrgbClr r="0" g="0" b="0"/>
-      </a:fillRef>
-      <a:effectRef idx="0">
-        <a:scrgbClr r="0" g="0" b="0"/>
-      </a:effectRef>
-      <a:fontRef idx="minor"/>
-    </dgm:style>
-  </dgm:styleLbl>
-  <dgm:styleLbl name="fgAcc0">
-    <dgm:scene3d>
-      <a:camera prst="orthographicFront"/>
-      <a:lightRig rig="threePt" dir="t"/>
-    </dgm:scene3d>
-    <dgm:sp3d/>
-    <dgm:txPr/>
-    <dgm:style>
-      <a:lnRef idx="2">
-        <a:scrgbClr r="0" g="0" b="0"/>
-      </a:lnRef>
-      <a:fillRef idx="1">
-        <a:scrgbClr r="0" g="0" b="0"/>
-      </a:fillRef>
-      <a:effectRef idx="0">
-        <a:scrgbClr r="0" g="0" b="0"/>
-      </a:effectRef>
-      <a:fontRef idx="minor"/>
-    </dgm:style>
-  </dgm:styleLbl>
-  <dgm:styleLbl name="fgAcc2">
-    <dgm:scene3d>
-      <a:camera prst="orthographicFront"/>
-      <a:lightRig rig="threePt" dir="t"/>
-    </dgm:scene3d>
-    <dgm:sp3d/>
-    <dgm:txPr/>
-    <dgm:style>
-      <a:lnRef idx="2">
-        <a:scrgbClr r="0" g="0" b="0"/>
-      </a:lnRef>
-      <a:fillRef idx="1">
-        <a:scrgbClr r="0" g="0" b="0"/>
-      </a:fillRef>
-      <a:effectRef idx="0">
-        <a:scrgbClr r="0" g="0" b="0"/>
-      </a:effectRef>
-      <a:fontRef idx="minor"/>
-    </dgm:style>
-  </dgm:styleLbl>
-  <dgm:styleLbl name="fgAcc3">
-    <dgm:scene3d>
-      <a:camera prst="orthographicFront"/>
-      <a:lightRig rig="threePt" dir="t"/>
-    </dgm:scene3d>
-    <dgm:sp3d/>
-    <dgm:txPr/>
-    <dgm:style>
-      <a:lnRef idx="2">
-        <a:scrgbClr r="0" g="0" b="0"/>
-      </a:lnRef>
-      <a:fillRef idx="1">
-        <a:scrgbClr r="0" g="0" b="0"/>
-      </a:fillRef>
-      <a:effectRef idx="0">
-        <a:scrgbClr r="0" g="0" b="0"/>
-      </a:effectRef>
-      <a:fontRef idx="minor"/>
-    </dgm:style>
-  </dgm:styleLbl>
-  <dgm:styleLbl name="fgAcc4">
-    <dgm:scene3d>
-      <a:camera prst="orthographicFront"/>
-      <a:lightRig rig="threePt" dir="t"/>
-    </dgm:scene3d>
-    <dgm:sp3d/>
-    <dgm:txPr/>
-    <dgm:style>
-      <a:lnRef idx="2">
-        <a:scrgbClr r="0" g="0" b="0"/>
-      </a:lnRef>
-      <a:fillRef idx="1">
-        <a:scrgbClr r="0" g="0" b="0"/>
-      </a:fillRef>
-      <a:effectRef idx="0">
-        <a:scrgbClr r="0" g="0" b="0"/>
-      </a:effectRef>
-      <a:fontRef idx="minor"/>
-    </dgm:style>
-  </dgm:styleLbl>
-  <dgm:styleLbl name="bgShp">
-    <dgm:scene3d>
-      <a:camera prst="orthographicFront"/>
-      <a:lightRig rig="threePt" dir="t"/>
-    </dgm:scene3d>
-    <dgm:sp3d/>
-    <dgm:txPr/>
-    <dgm:style>
-      <a:lnRef idx="0">
-        <a:scrgbClr r="0" g="0" b="0"/>
-      </a:lnRef>
-      <a:fillRef idx="1">
-        <a:scrgbClr r="0" g="0" b="0"/>
-      </a:fillRef>
-      <a:effectRef idx="0">
-        <a:scrgbClr r="0" g="0" b="0"/>
-      </a:effectRef>
-      <a:fontRef idx="minor"/>
-    </dgm:style>
-  </dgm:styleLbl>
-  <dgm:styleLbl name="dkBgShp">
-    <dgm:scene3d>
-      <a:camera prst="orthographicFront"/>
-      <a:lightRig rig="threePt" dir="t"/>
-    </dgm:scene3d>
-    <dgm:sp3d/>
-    <dgm:txPr/>
-    <dgm:style>
-      <a:lnRef idx="0">
-        <a:scrgbClr r="0" g="0" b="0"/>
-      </a:lnRef>
-      <a:fillRef idx="1">
-        <a:scrgbClr r="0" g="0" b="0"/>
-      </a:fillRef>
-      <a:effectRef idx="0">
-        <a:scrgbClr r="0" g="0" b="0"/>
-      </a:effectRef>
-      <a:fontRef idx="minor"/>
-    </dgm:style>
-  </dgm:styleLbl>
-  <dgm:styleLbl name="trBgShp">
-    <dgm:scene3d>
-      <a:camera prst="orthographicFront"/>
-      <a:lightRig rig="threePt" dir="t"/>
-    </dgm:scene3d>
-    <dgm:sp3d/>
-    <dgm:txPr/>
-    <dgm:style>
-      <a:lnRef idx="0">
-        <a:scrgbClr r="0" g="0" b="0"/>
-      </a:lnRef>
-      <a:fillRef idx="1">
-        <a:scrgbClr r="0" g="0" b="0"/>
-      </a:fillRef>
-      <a:effectRef idx="0">
-        <a:scrgbClr r="0" g="0" b="0"/>
-      </a:effectRef>
-      <a:fontRef idx="minor"/>
-    </dgm:style>
-  </dgm:styleLbl>
-  <dgm:styleLbl name="fgShp">
-    <dgm:scene3d>
-      <a:camera prst="orthographicFront"/>
-      <a:lightRig rig="threePt" dir="t"/>
-    </dgm:scene3d>
-    <dgm:sp3d/>
-    <dgm:txPr/>
-    <dgm:style>
-      <a:lnRef idx="2">
-        <a:scrgbClr r="0" g="0" b="0"/>
-      </a:lnRef>
-      <a:fillRef idx="1">
-        <a:scrgbClr r="0" g="0" b="0"/>
-      </a:fillRef>
-      <a:effectRef idx="0">
-        <a:scrgbClr r="0" g="0" b="0"/>
-      </a:effectRef>
-      <a:fontRef idx="minor"/>
     </dgm:style>
   </dgm:styleLbl>
   <dgm:styleLbl name="revTx">
@@ -7907,7 +8914,7 @@
             <a:fld id="{229FDC3E-7424-49CF-AF38-AA35F4C77C8D}" type="datetimeFigureOut">
               <a:rPr lang="pt-BR" smtClean="0"/>
               <a:pPr/>
-              <a:t>25/03/2014</a:t>
+              <a:t>26/03/2014</a:t>
             </a:fld>
             <a:endParaRPr lang="pt-BR"/>
           </a:p>
@@ -8079,7 +9086,7 @@
             <a:fld id="{229FDC3E-7424-49CF-AF38-AA35F4C77C8D}" type="datetimeFigureOut">
               <a:rPr lang="pt-BR" smtClean="0"/>
               <a:pPr/>
-              <a:t>25/03/2014</a:t>
+              <a:t>26/03/2014</a:t>
             </a:fld>
             <a:endParaRPr lang="pt-BR"/>
           </a:p>
@@ -8256,7 +9263,7 @@
             <a:fld id="{229FDC3E-7424-49CF-AF38-AA35F4C77C8D}" type="datetimeFigureOut">
               <a:rPr lang="pt-BR" smtClean="0"/>
               <a:pPr/>
-              <a:t>25/03/2014</a:t>
+              <a:t>26/03/2014</a:t>
             </a:fld>
             <a:endParaRPr lang="pt-BR"/>
           </a:p>
@@ -8423,7 +9430,7 @@
             <a:fld id="{229FDC3E-7424-49CF-AF38-AA35F4C77C8D}" type="datetimeFigureOut">
               <a:rPr lang="pt-BR" smtClean="0"/>
               <a:pPr/>
-              <a:t>25/03/2014</a:t>
+              <a:t>26/03/2014</a:t>
             </a:fld>
             <a:endParaRPr lang="pt-BR"/>
           </a:p>
@@ -8659,7 +9666,7 @@
             <a:fld id="{229FDC3E-7424-49CF-AF38-AA35F4C77C8D}" type="datetimeFigureOut">
               <a:rPr lang="pt-BR" smtClean="0"/>
               <a:pPr/>
-              <a:t>25/03/2014</a:t>
+              <a:t>26/03/2014</a:t>
             </a:fld>
             <a:endParaRPr lang="pt-BR"/>
           </a:p>
@@ -8957,7 +9964,7 @@
             <a:fld id="{229FDC3E-7424-49CF-AF38-AA35F4C77C8D}" type="datetimeFigureOut">
               <a:rPr lang="pt-BR" smtClean="0"/>
               <a:pPr/>
-              <a:t>25/03/2014</a:t>
+              <a:t>26/03/2014</a:t>
             </a:fld>
             <a:endParaRPr lang="pt-BR"/>
           </a:p>
@@ -9343,7 +10350,7 @@
             <a:fld id="{229FDC3E-7424-49CF-AF38-AA35F4C77C8D}" type="datetimeFigureOut">
               <a:rPr lang="pt-BR" smtClean="0"/>
               <a:pPr/>
-              <a:t>25/03/2014</a:t>
+              <a:t>26/03/2014</a:t>
             </a:fld>
             <a:endParaRPr lang="pt-BR"/>
           </a:p>
@@ -9518,7 +10525,7 @@
             <a:fld id="{229FDC3E-7424-49CF-AF38-AA35F4C77C8D}" type="datetimeFigureOut">
               <a:rPr lang="pt-BR" smtClean="0"/>
               <a:pPr/>
-              <a:t>25/03/2014</a:t>
+              <a:t>26/03/2014</a:t>
             </a:fld>
             <a:endParaRPr lang="pt-BR"/>
           </a:p>
@@ -9610,7 +10617,7 @@
             <a:fld id="{229FDC3E-7424-49CF-AF38-AA35F4C77C8D}" type="datetimeFigureOut">
               <a:rPr lang="pt-BR" smtClean="0"/>
               <a:pPr/>
-              <a:t>25/03/2014</a:t>
+              <a:t>26/03/2014</a:t>
             </a:fld>
             <a:endParaRPr lang="pt-BR"/>
           </a:p>
@@ -9907,7 +10914,7 @@
             <a:fld id="{229FDC3E-7424-49CF-AF38-AA35F4C77C8D}" type="datetimeFigureOut">
               <a:rPr lang="pt-BR" smtClean="0"/>
               <a:pPr/>
-              <a:t>25/03/2014</a:t>
+              <a:t>26/03/2014</a:t>
             </a:fld>
             <a:endParaRPr lang="pt-BR"/>
           </a:p>
@@ -10043,7 +11050,7 @@
             <a:fld id="{229FDC3E-7424-49CF-AF38-AA35F4C77C8D}" type="datetimeFigureOut">
               <a:rPr lang="pt-BR" smtClean="0"/>
               <a:pPr/>
-              <a:t>25/03/2014</a:t>
+              <a:t>26/03/2014</a:t>
             </a:fld>
             <a:endParaRPr lang="pt-BR"/>
           </a:p>
@@ -10348,7 +11355,7 @@
             <a:fld id="{229FDC3E-7424-49CF-AF38-AA35F4C77C8D}" type="datetimeFigureOut">
               <a:rPr lang="pt-BR" smtClean="0"/>
               <a:pPr/>
-              <a:t>25/03/2014</a:t>
+              <a:t>26/03/2014</a:t>
             </a:fld>
             <a:endParaRPr lang="pt-BR"/>
           </a:p>
@@ -11242,11 +12249,164 @@
           </a:graphicData>
         </a:graphic>
       </p:graphicFrame>
+      <p:sp>
+        <p:nvSpPr>
+          <p:cNvPr id="14" name="Seta para a esquerda e para a direita 13"/>
+          <p:cNvSpPr/>
+          <p:nvPr/>
+        </p:nvSpPr>
+        <p:spPr>
+          <a:xfrm>
+            <a:off x="2555776" y="3573016"/>
+            <a:ext cx="936104" cy="548680"/>
+          </a:xfrm>
+          <a:prstGeom prst="leftRightArrow">
+            <a:avLst/>
+          </a:prstGeom>
+        </p:spPr>
+        <p:style>
+          <a:lnRef idx="0">
+            <a:schemeClr val="accent6"/>
+          </a:lnRef>
+          <a:fillRef idx="3">
+            <a:schemeClr val="accent6"/>
+          </a:fillRef>
+          <a:effectRef idx="3">
+            <a:schemeClr val="accent6"/>
+          </a:effectRef>
+          <a:fontRef idx="minor">
+            <a:schemeClr val="lt1"/>
+          </a:fontRef>
+        </p:style>
+        <p:txBody>
+          <a:bodyPr rtlCol="0" anchor="ctr"/>
+          <a:lstStyle/>
+          <a:p>
+            <a:pPr algn="ctr"/>
+            <a:endParaRPr lang="pt-BR"/>
+          </a:p>
+        </p:txBody>
+      </p:sp>
+      <p:sp>
+        <p:nvSpPr>
+          <p:cNvPr id="15" name="Seta para a esquerda e para a direita 14"/>
+          <p:cNvSpPr/>
+          <p:nvPr/>
+        </p:nvSpPr>
+        <p:spPr>
+          <a:xfrm>
+            <a:off x="5580112" y="3573016"/>
+            <a:ext cx="936104" cy="548680"/>
+          </a:xfrm>
+          <a:prstGeom prst="leftRightArrow">
+            <a:avLst/>
+          </a:prstGeom>
+        </p:spPr>
+        <p:style>
+          <a:lnRef idx="0">
+            <a:schemeClr val="accent6"/>
+          </a:lnRef>
+          <a:fillRef idx="3">
+            <a:schemeClr val="accent6"/>
+          </a:fillRef>
+          <a:effectRef idx="3">
+            <a:schemeClr val="accent6"/>
+          </a:effectRef>
+          <a:fontRef idx="minor">
+            <a:schemeClr val="lt1"/>
+          </a:fontRef>
+        </p:style>
+        <p:txBody>
+          <a:bodyPr rtlCol="0" anchor="ctr"/>
+          <a:lstStyle/>
+          <a:p>
+            <a:pPr algn="ctr"/>
+            <a:endParaRPr lang="pt-BR"/>
+          </a:p>
+        </p:txBody>
+      </p:sp>
     </p:spTree>
   </p:cSld>
   <p:clrMapOvr>
     <a:masterClrMapping/>
   </p:clrMapOvr>
+  <p:timing>
+    <p:tnLst>
+      <p:par>
+        <p:cTn id="1" dur="indefinite" restart="never" nodeType="tmRoot"/>
+      </p:par>
+    </p:tnLst>
+  </p:timing>
+</p:sld>
+</file>
+
+<file path=ppt/slides/slide5.xml><?xml version="1.0" encoding="utf-8"?>
+<p:sld xmlns:a="http://schemas.openxmlformats.org/drawingml/2006/main" xmlns:r="http://schemas.openxmlformats.org/officeDocument/2006/relationships" xmlns:p="http://schemas.openxmlformats.org/presentationml/2006/main">
+  <p:cSld>
+    <p:spTree>
+      <p:nvGrpSpPr>
+        <p:cNvPr id="1" name=""/>
+        <p:cNvGrpSpPr/>
+        <p:nvPr/>
+      </p:nvGrpSpPr>
+      <p:grpSpPr>
+        <a:xfrm>
+          <a:off x="0" y="0"/>
+          <a:ext cx="0" cy="0"/>
+          <a:chOff x="0" y="0"/>
+          <a:chExt cx="0" cy="0"/>
+        </a:xfrm>
+      </p:grpSpPr>
+      <p:sp>
+        <p:nvSpPr>
+          <p:cNvPr id="2" name="Título 1"/>
+          <p:cNvSpPr>
+            <a:spLocks noGrp="1"/>
+          </p:cNvSpPr>
+          <p:nvPr>
+            <p:ph type="title"/>
+          </p:nvPr>
+        </p:nvSpPr>
+        <p:spPr/>
+        <p:txBody>
+          <a:bodyPr/>
+          <a:lstStyle/>
+          <a:p>
+            <a:endParaRPr lang="pt-BR"/>
+          </a:p>
+        </p:txBody>
+      </p:sp>
+      <p:sp>
+        <p:nvSpPr>
+          <p:cNvPr id="3" name="Espaço Reservado para Conteúdo 2"/>
+          <p:cNvSpPr>
+            <a:spLocks noGrp="1"/>
+          </p:cNvSpPr>
+          <p:nvPr>
+            <p:ph idx="1"/>
+          </p:nvPr>
+        </p:nvSpPr>
+        <p:spPr/>
+        <p:txBody>
+          <a:bodyPr/>
+          <a:lstStyle/>
+          <a:p>
+            <a:endParaRPr lang="pt-BR" dirty="0"/>
+          </a:p>
+        </p:txBody>
+      </p:sp>
+    </p:spTree>
+  </p:cSld>
+  <p:clrMapOvr>
+    <a:masterClrMapping/>
+  </p:clrMapOvr>
+  <p:timing>
+    <p:tnLst>
+      <p:par>
+        <p:cTn id="1" dur="indefinite" restart="never" nodeType="tmRoot"/>
+      </p:par>
+    </p:tnLst>
+  </p:timing>
 </p:sld>
 </file>
 

</xml_diff>